<commit_message>
feat(api): add root route with API info
</commit_message>
<xml_diff>
--- a/pitch-deck/SwapPilot-Professional-PitchDeck.pptx
+++ b/pitch-deck/SwapPilot-Professional-PitchDeck.pptx
@@ -2701,16 +2701,85 @@
           </a:p>
         </p:txBody>
       </p:sp>
-      <p:sp>
-        <p:nvSpPr>
-          <p:cNvPr id="26" name="Text 24"/>
-          <p:cNvSpPr/>
-          <p:nvPr/>
-        </p:nvSpPr>
-        <p:spPr>
-          <a:xfrm>
-            <a:off x="6583680" y="3200400"/>
-            <a:ext cx="4937760" cy="914400"/>
+      <p:pic>
+        <p:nvPicPr>
+          <p:cNvPr id="26" name="Image 0" descr="./assets/hero-swap-wide.png">    </p:cNvPr>
+          <p:cNvPicPr>
+            <a:picLocks noChangeAspect="1"/>
+          </p:cNvPicPr>
+          <p:nvPr/>
+        </p:nvPicPr>
+        <p:blipFill>
+          <a:blip r:embed="rId3"/>
+          <a:stretch>
+            <a:fillRect/>
+          </a:stretch>
+        </p:blipFill>
+        <p:spPr>
+          <a:xfrm>
+            <a:off x="6537960" y="1554480"/>
+            <a:ext cx="5029200" cy="4480560"/>
+          </a:xfrm>
+          <a:prstGeom prst="rect">
+            <a:avLst/>
+          </a:prstGeom>
+        </p:spPr>
+      </p:pic>
+      <p:sp>
+        <p:nvSpPr>
+          <p:cNvPr id="27" name="Text 24">
+            <a:hlinkClick r:id="rId4" tooltip=""/>
+          </p:cNvPr>
+          <p:cNvSpPr/>
+          <p:nvPr/>
+        </p:nvSpPr>
+        <p:spPr>
+          <a:xfrm>
+            <a:off x="457200" y="6309360"/>
+            <a:ext cx="2011680" cy="274320"/>
+          </a:xfrm>
+          <a:prstGeom prst="rect">
+            <a:avLst/>
+          </a:prstGeom>
+          <a:noFill/>
+          <a:ln/>
+        </p:spPr>
+        <p:txBody>
+          <a:bodyPr wrap="square" rtlCol="0" anchor="ctr"/>
+          <a:lstStyle/>
+          <a:p>
+            <a:pPr indent="0" marL="0">
+              <a:buNone/>
+            </a:pPr>
+            <a:r>
+              <a:rPr lang="en-US" sz="1000" u="sng" dirty="0">
+                <a:solidFill>
+                  <a:srgbClr val="A0A0A0"/>
+                </a:solidFill>
+                <a:hlinkClick r:id="rId4" invalidUrl="" action="" tgtFrame="" tooltip="" history="1" highlightClick="0" endSnd="0">
+                  <a:extLst>
+                    <a:ext uri="{A12FA001-AC4F-418D-AE19-62706E023703}">
+                      <ahyp:hlinkClr xmlns:ahyp="http://schemas.microsoft.com/office/drawing/2018/hyperlinkcolor" val="tx"/>
+                    </a:ext>
+                  </a:extLst>
+                </a:hlinkClick>
+              </a:rPr>
+              <a:t>app-swappilot.xyz</a:t>
+            </a:r>
+            <a:endParaRPr lang="en-US" sz="1000" dirty="0"/>
+          </a:p>
+        </p:txBody>
+      </p:sp>
+      <p:sp>
+        <p:nvSpPr>
+          <p:cNvPr id="28" name="Text 25"/>
+          <p:cNvSpPr/>
+          <p:nvPr/>
+        </p:nvSpPr>
+        <p:spPr>
+          <a:xfrm>
+            <a:off x="2423160" y="6309360"/>
+            <a:ext cx="182880" cy="274320"/>
           </a:xfrm>
           <a:prstGeom prst="rect">
             <a:avLst/>
@@ -2726,48 +2795,219 @@
               <a:buNone/>
             </a:pPr>
             <a:r>
-              <a:rPr lang="en-US" sz="1400" dirty="0">
-                <a:solidFill>
-                  <a:srgbClr val="4A4A4A"/>
-                </a:solidFill>
-              </a:rPr>
-              <a:t>[ App Screenshot ]</a:t>
-            </a:r>
-            <a:endParaRPr lang="en-US" sz="1400" dirty="0"/>
-          </a:p>
-        </p:txBody>
-      </p:sp>
-      <p:sp>
-        <p:nvSpPr>
-          <p:cNvPr id="27" name="Text 25"/>
-          <p:cNvSpPr/>
-          <p:nvPr/>
-        </p:nvSpPr>
-        <p:spPr>
-          <a:xfrm>
-            <a:off x="457200" y="6309360"/>
-            <a:ext cx="10972800" cy="274320"/>
-          </a:xfrm>
-          <a:prstGeom prst="rect">
-            <a:avLst/>
-          </a:prstGeom>
-          <a:noFill/>
-          <a:ln/>
-        </p:spPr>
-        <p:txBody>
-          <a:bodyPr wrap="square" rtlCol="0" anchor="ctr"/>
-          <a:lstStyle/>
-          <a:p>
-            <a:pPr indent="0" marL="0">
-              <a:buNone/>
-            </a:pPr>
-            <a:r>
               <a:rPr lang="en-US" sz="1000" dirty="0">
                 <a:solidFill>
                   <a:srgbClr val="A0A0A0"/>
                 </a:solidFill>
               </a:rPr>
-              <a:t>app-swappilot.xyz  ·  x.com/swappilotdex  ·  github.com/BacBacta/SwapPilot</a:t>
+              <a:t>·</a:t>
+            </a:r>
+            <a:endParaRPr lang="en-US" sz="1000" dirty="0"/>
+          </a:p>
+        </p:txBody>
+      </p:sp>
+      <p:sp>
+        <p:nvSpPr>
+          <p:cNvPr id="29" name="Text 26">
+            <a:hlinkClick r:id="rId5" tooltip=""/>
+          </p:cNvPr>
+          <p:cNvSpPr/>
+          <p:nvPr/>
+        </p:nvSpPr>
+        <p:spPr>
+          <a:xfrm>
+            <a:off x="2606040" y="6309360"/>
+            <a:ext cx="2011680" cy="274320"/>
+          </a:xfrm>
+          <a:prstGeom prst="rect">
+            <a:avLst/>
+          </a:prstGeom>
+          <a:noFill/>
+          <a:ln/>
+        </p:spPr>
+        <p:txBody>
+          <a:bodyPr wrap="square" rtlCol="0" anchor="ctr"/>
+          <a:lstStyle/>
+          <a:p>
+            <a:pPr indent="0" marL="0">
+              <a:buNone/>
+            </a:pPr>
+            <a:r>
+              <a:rPr lang="en-US" sz="1000" u="sng" dirty="0">
+                <a:solidFill>
+                  <a:srgbClr val="A0A0A0"/>
+                </a:solidFill>
+                <a:hlinkClick r:id="rId5" invalidUrl="" action="" tgtFrame="" tooltip="" history="1" highlightClick="0" endSnd="0">
+                  <a:extLst>
+                    <a:ext uri="{A12FA001-AC4F-418D-AE19-62706E023703}">
+                      <ahyp:hlinkClr xmlns:ahyp="http://schemas.microsoft.com/office/drawing/2018/hyperlinkcolor" val="tx"/>
+                    </a:ext>
+                  </a:extLst>
+                </a:hlinkClick>
+              </a:rPr>
+              <a:t>x.com/swappilotdex</a:t>
+            </a:r>
+            <a:endParaRPr lang="en-US" sz="1000" dirty="0"/>
+          </a:p>
+        </p:txBody>
+      </p:sp>
+      <p:sp>
+        <p:nvSpPr>
+          <p:cNvPr id="30" name="Text 27"/>
+          <p:cNvSpPr/>
+          <p:nvPr/>
+        </p:nvSpPr>
+        <p:spPr>
+          <a:xfrm>
+            <a:off x="4617720" y="6309360"/>
+            <a:ext cx="182880" cy="274320"/>
+          </a:xfrm>
+          <a:prstGeom prst="rect">
+            <a:avLst/>
+          </a:prstGeom>
+          <a:noFill/>
+          <a:ln/>
+        </p:spPr>
+        <p:txBody>
+          <a:bodyPr wrap="square" rtlCol="0" anchor="ctr"/>
+          <a:lstStyle/>
+          <a:p>
+            <a:pPr algn="ctr" indent="0" marL="0">
+              <a:buNone/>
+            </a:pPr>
+            <a:r>
+              <a:rPr lang="en-US" sz="1000" dirty="0">
+                <a:solidFill>
+                  <a:srgbClr val="A0A0A0"/>
+                </a:solidFill>
+              </a:rPr>
+              <a:t>·</a:t>
+            </a:r>
+            <a:endParaRPr lang="en-US" sz="1000" dirty="0"/>
+          </a:p>
+        </p:txBody>
+      </p:sp>
+      <p:sp>
+        <p:nvSpPr>
+          <p:cNvPr id="31" name="Text 28">
+            <a:hlinkClick r:id="rId6" tooltip=""/>
+          </p:cNvPr>
+          <p:cNvSpPr/>
+          <p:nvPr/>
+        </p:nvSpPr>
+        <p:spPr>
+          <a:xfrm>
+            <a:off x="4800600" y="6309360"/>
+            <a:ext cx="1645920" cy="274320"/>
+          </a:xfrm>
+          <a:prstGeom prst="rect">
+            <a:avLst/>
+          </a:prstGeom>
+          <a:noFill/>
+          <a:ln/>
+        </p:spPr>
+        <p:txBody>
+          <a:bodyPr wrap="square" rtlCol="0" anchor="ctr"/>
+          <a:lstStyle/>
+          <a:p>
+            <a:pPr indent="0" marL="0">
+              <a:buNone/>
+            </a:pPr>
+            <a:r>
+              <a:rPr lang="en-US" sz="1000" u="sng" dirty="0">
+                <a:solidFill>
+                  <a:srgbClr val="A0A0A0"/>
+                </a:solidFill>
+                <a:hlinkClick r:id="rId6" invalidUrl="" action="" tgtFrame="" tooltip="" history="1" highlightClick="0" endSnd="0">
+                  <a:extLst>
+                    <a:ext uri="{A12FA001-AC4F-418D-AE19-62706E023703}">
+                      <ahyp:hlinkClr xmlns:ahyp="http://schemas.microsoft.com/office/drawing/2018/hyperlinkcolor" val="tx"/>
+                    </a:ext>
+                  </a:extLst>
+                </a:hlinkClick>
+              </a:rPr>
+              <a:t>t.me/swapPilot</a:t>
+            </a:r>
+            <a:endParaRPr lang="en-US" sz="1000" dirty="0"/>
+          </a:p>
+        </p:txBody>
+      </p:sp>
+      <p:sp>
+        <p:nvSpPr>
+          <p:cNvPr id="32" name="Text 29"/>
+          <p:cNvSpPr/>
+          <p:nvPr/>
+        </p:nvSpPr>
+        <p:spPr>
+          <a:xfrm>
+            <a:off x="6446520" y="6309360"/>
+            <a:ext cx="182880" cy="274320"/>
+          </a:xfrm>
+          <a:prstGeom prst="rect">
+            <a:avLst/>
+          </a:prstGeom>
+          <a:noFill/>
+          <a:ln/>
+        </p:spPr>
+        <p:txBody>
+          <a:bodyPr wrap="square" rtlCol="0" anchor="ctr"/>
+          <a:lstStyle/>
+          <a:p>
+            <a:pPr algn="ctr" indent="0" marL="0">
+              <a:buNone/>
+            </a:pPr>
+            <a:r>
+              <a:rPr lang="en-US" sz="1000" dirty="0">
+                <a:solidFill>
+                  <a:srgbClr val="A0A0A0"/>
+                </a:solidFill>
+              </a:rPr>
+              <a:t>·</a:t>
+            </a:r>
+            <a:endParaRPr lang="en-US" sz="1000" dirty="0"/>
+          </a:p>
+        </p:txBody>
+      </p:sp>
+      <p:sp>
+        <p:nvSpPr>
+          <p:cNvPr id="33" name="Text 30">
+            <a:hlinkClick r:id="rId7" tooltip=""/>
+          </p:cNvPr>
+          <p:cNvSpPr/>
+          <p:nvPr/>
+        </p:nvSpPr>
+        <p:spPr>
+          <a:xfrm>
+            <a:off x="6629400" y="6309360"/>
+            <a:ext cx="4754880" cy="274320"/>
+          </a:xfrm>
+          <a:prstGeom prst="rect">
+            <a:avLst/>
+          </a:prstGeom>
+          <a:noFill/>
+          <a:ln/>
+        </p:spPr>
+        <p:txBody>
+          <a:bodyPr wrap="square" rtlCol="0" anchor="ctr"/>
+          <a:lstStyle/>
+          <a:p>
+            <a:pPr indent="0" marL="0">
+              <a:buNone/>
+            </a:pPr>
+            <a:r>
+              <a:rPr lang="en-US" sz="1000" u="sng" dirty="0">
+                <a:solidFill>
+                  <a:srgbClr val="A0A0A0"/>
+                </a:solidFill>
+                <a:hlinkClick r:id="rId7" invalidUrl="" action="" tgtFrame="" tooltip="" history="1" highlightClick="0" endSnd="0">
+                  <a:extLst>
+                    <a:ext uri="{A12FA001-AC4F-418D-AE19-62706E023703}">
+                      <ahyp:hlinkClr xmlns:ahyp="http://schemas.microsoft.com/office/drawing/2018/hyperlinkcolor" val="tx"/>
+                    </a:ext>
+                  </a:extLst>
+                </a:hlinkClick>
+              </a:rPr>
+              <a:t>github.com/BacBacta/SwapPilot</a:t>
             </a:r>
             <a:endParaRPr lang="en-US" sz="1000" dirty="0"/>
           </a:p>
@@ -5470,7 +5710,7 @@
         </p:nvSpPr>
         <p:spPr>
           <a:xfrm>
-            <a:off x="3200400" y="4846320"/>
+            <a:off x="2194560" y="4846320"/>
             <a:ext cx="1828800" cy="502920"/>
           </a:xfrm>
           <a:prstGeom prst="roundRect">
@@ -5499,7 +5739,7 @@
         </p:nvSpPr>
         <p:spPr>
           <a:xfrm>
-            <a:off x="3200400" y="4846320"/>
+            <a:off x="2194560" y="4846320"/>
             <a:ext cx="1828800" cy="502920"/>
           </a:xfrm>
           <a:prstGeom prst="rect">
@@ -5542,7 +5782,7 @@
         </p:nvSpPr>
         <p:spPr>
           <a:xfrm>
-            <a:off x="5212080" y="4846320"/>
+            <a:off x="4206240" y="4846320"/>
             <a:ext cx="1828800" cy="502920"/>
           </a:xfrm>
           <a:prstGeom prst="roundRect">
@@ -5571,7 +5811,7 @@
         </p:nvSpPr>
         <p:spPr>
           <a:xfrm>
-            <a:off x="5212080" y="4846320"/>
+            <a:off x="4206240" y="4846320"/>
             <a:ext cx="1828800" cy="502920"/>
           </a:xfrm>
           <a:prstGeom prst="rect">
@@ -5614,7 +5854,7 @@
         </p:nvSpPr>
         <p:spPr>
           <a:xfrm>
-            <a:off x="7223760" y="4846320"/>
+            <a:off x="6217920" y="4846320"/>
             <a:ext cx="1828800" cy="502920"/>
           </a:xfrm>
           <a:prstGeom prst="roundRect">
@@ -5643,7 +5883,7 @@
         </p:nvSpPr>
         <p:spPr>
           <a:xfrm>
-            <a:off x="7223760" y="4846320"/>
+            <a:off x="6217920" y="4846320"/>
             <a:ext cx="1828800" cy="502920"/>
           </a:xfrm>
           <a:prstGeom prst="rect">
@@ -5672,7 +5912,7 @@
                   </a:extLst>
                 </a:hlinkClick>
               </a:rPr>
-              <a:t>Follow us →</a:t>
+              <a:t>Twitter →</a:t>
             </a:r>
             <a:endParaRPr lang="en-US" sz="1400" dirty="0"/>
           </a:p>
@@ -5680,14 +5920,43 @@
       </p:sp>
       <p:sp>
         <p:nvSpPr>
-          <p:cNvPr id="16" name="Text 14"/>
-          <p:cNvSpPr/>
-          <p:nvPr/>
-        </p:nvSpPr>
-        <p:spPr>
-          <a:xfrm>
-            <a:off x="457200" y="5943600"/>
-            <a:ext cx="10972800" cy="274320"/>
+          <p:cNvPr id="16" name="Shape 14"/>
+          <p:cNvSpPr/>
+          <p:nvPr/>
+        </p:nvSpPr>
+        <p:spPr>
+          <a:xfrm>
+            <a:off x="8229600" y="4846320"/>
+            <a:ext cx="1828800" cy="502920"/>
+          </a:xfrm>
+          <a:prstGeom prst="roundRect">
+            <a:avLst>
+              <a:gd name="adj" fmla="val 54545"/>
+            </a:avLst>
+          </a:prstGeom>
+          <a:solidFill>
+            <a:srgbClr val="0D1117"/>
+          </a:solidFill>
+          <a:ln w="12700">
+            <a:solidFill>
+              <a:srgbClr val="3A3A3A"/>
+            </a:solidFill>
+            <a:prstDash val="solid"/>
+          </a:ln>
+        </p:spPr>
+      </p:sp>
+      <p:sp>
+        <p:nvSpPr>
+          <p:cNvPr id="17" name="Text 15">
+            <a:hlinkClick r:id="rId4" tooltip=""/>
+          </p:cNvPr>
+          <p:cNvSpPr/>
+          <p:nvPr/>
+        </p:nvSpPr>
+        <p:spPr>
+          <a:xfrm>
+            <a:off x="8229600" y="4846320"/>
+            <a:ext cx="1828800" cy="502920"/>
           </a:xfrm>
           <a:prstGeom prst="rect">
             <a:avLst/>
@@ -5703,12 +5972,307 @@
               <a:buNone/>
             </a:pPr>
             <a:r>
+              <a:rPr lang="en-US" sz="1400" b="1" u="sng" dirty="0">
+                <a:solidFill>
+                  <a:srgbClr val="FFFFFF"/>
+                </a:solidFill>
+                <a:hlinkClick r:id="rId4" invalidUrl="" action="" tgtFrame="" tooltip="" history="1" highlightClick="0" endSnd="0">
+                  <a:extLst>
+                    <a:ext uri="{A12FA001-AC4F-418D-AE19-62706E023703}">
+                      <ahyp:hlinkClr xmlns:ahyp="http://schemas.microsoft.com/office/drawing/2018/hyperlinkcolor" val="tx"/>
+                    </a:ext>
+                  </a:extLst>
+                </a:hlinkClick>
+              </a:rPr>
+              <a:t>Telegram →</a:t>
+            </a:r>
+            <a:endParaRPr lang="en-US" sz="1400" dirty="0"/>
+          </a:p>
+        </p:txBody>
+      </p:sp>
+      <p:sp>
+        <p:nvSpPr>
+          <p:cNvPr id="18" name="Text 16">
+            <a:hlinkClick r:id="rId5" tooltip=""/>
+          </p:cNvPr>
+          <p:cNvSpPr/>
+          <p:nvPr/>
+        </p:nvSpPr>
+        <p:spPr>
+          <a:xfrm>
+            <a:off x="1005840" y="5943600"/>
+            <a:ext cx="2011680" cy="274320"/>
+          </a:xfrm>
+          <a:prstGeom prst="rect">
+            <a:avLst/>
+          </a:prstGeom>
+          <a:noFill/>
+          <a:ln/>
+        </p:spPr>
+        <p:txBody>
+          <a:bodyPr wrap="square" rtlCol="0" anchor="ctr"/>
+          <a:lstStyle/>
+          <a:p>
+            <a:pPr algn="l" indent="0" marL="0">
+              <a:buNone/>
+            </a:pPr>
+            <a:r>
+              <a:rPr lang="en-US" sz="1100" u="sng" dirty="0">
+                <a:solidFill>
+                  <a:srgbClr val="A0A0A0"/>
+                </a:solidFill>
+                <a:hlinkClick r:id="rId5" invalidUrl="" action="" tgtFrame="" tooltip="" history="1" highlightClick="0" endSnd="0">
+                  <a:extLst>
+                    <a:ext uri="{A12FA001-AC4F-418D-AE19-62706E023703}">
+                      <ahyp:hlinkClr xmlns:ahyp="http://schemas.microsoft.com/office/drawing/2018/hyperlinkcolor" val="tx"/>
+                    </a:ext>
+                  </a:extLst>
+                </a:hlinkClick>
+              </a:rPr>
+              <a:t>app-swappilot.xyz</a:t>
+            </a:r>
+            <a:endParaRPr lang="en-US" sz="1100" dirty="0"/>
+          </a:p>
+        </p:txBody>
+      </p:sp>
+      <p:sp>
+        <p:nvSpPr>
+          <p:cNvPr id="19" name="Text 17"/>
+          <p:cNvSpPr/>
+          <p:nvPr/>
+        </p:nvSpPr>
+        <p:spPr>
+          <a:xfrm>
+            <a:off x="2971800" y="5943600"/>
+            <a:ext cx="182880" cy="274320"/>
+          </a:xfrm>
+          <a:prstGeom prst="rect">
+            <a:avLst/>
+          </a:prstGeom>
+          <a:noFill/>
+          <a:ln/>
+        </p:spPr>
+        <p:txBody>
+          <a:bodyPr wrap="square" rtlCol="0" anchor="ctr"/>
+          <a:lstStyle/>
+          <a:p>
+            <a:pPr algn="ctr" indent="0" marL="0">
+              <a:buNone/>
+            </a:pPr>
+            <a:r>
               <a:rPr lang="en-US" sz="1100" dirty="0">
                 <a:solidFill>
                   <a:srgbClr val="A0A0A0"/>
                 </a:solidFill>
               </a:rPr>
-              <a:t>app-swappilot.xyz  ·  x.com/swappilotdex  ·  github.com/BacBacta/SwapPilot</a:t>
+              <a:t>·</a:t>
+            </a:r>
+            <a:endParaRPr lang="en-US" sz="1100" dirty="0"/>
+          </a:p>
+        </p:txBody>
+      </p:sp>
+      <p:sp>
+        <p:nvSpPr>
+          <p:cNvPr id="20" name="Text 18">
+            <a:hlinkClick r:id="rId6" tooltip=""/>
+          </p:cNvPr>
+          <p:cNvSpPr/>
+          <p:nvPr/>
+        </p:nvSpPr>
+        <p:spPr>
+          <a:xfrm>
+            <a:off x="3154680" y="5943600"/>
+            <a:ext cx="2011680" cy="274320"/>
+          </a:xfrm>
+          <a:prstGeom prst="rect">
+            <a:avLst/>
+          </a:prstGeom>
+          <a:noFill/>
+          <a:ln/>
+        </p:spPr>
+        <p:txBody>
+          <a:bodyPr wrap="square" rtlCol="0" anchor="ctr"/>
+          <a:lstStyle/>
+          <a:p>
+            <a:pPr algn="l" indent="0" marL="0">
+              <a:buNone/>
+            </a:pPr>
+            <a:r>
+              <a:rPr lang="en-US" sz="1100" u="sng" dirty="0">
+                <a:solidFill>
+                  <a:srgbClr val="A0A0A0"/>
+                </a:solidFill>
+                <a:hlinkClick r:id="rId6" invalidUrl="" action="" tgtFrame="" tooltip="" history="1" highlightClick="0" endSnd="0">
+                  <a:extLst>
+                    <a:ext uri="{A12FA001-AC4F-418D-AE19-62706E023703}">
+                      <ahyp:hlinkClr xmlns:ahyp="http://schemas.microsoft.com/office/drawing/2018/hyperlinkcolor" val="tx"/>
+                    </a:ext>
+                  </a:extLst>
+                </a:hlinkClick>
+              </a:rPr>
+              <a:t>x.com/swappilotdex</a:t>
+            </a:r>
+            <a:endParaRPr lang="en-US" sz="1100" dirty="0"/>
+          </a:p>
+        </p:txBody>
+      </p:sp>
+      <p:sp>
+        <p:nvSpPr>
+          <p:cNvPr id="21" name="Text 19"/>
+          <p:cNvSpPr/>
+          <p:nvPr/>
+        </p:nvSpPr>
+        <p:spPr>
+          <a:xfrm>
+            <a:off x="5166360" y="5943600"/>
+            <a:ext cx="182880" cy="274320"/>
+          </a:xfrm>
+          <a:prstGeom prst="rect">
+            <a:avLst/>
+          </a:prstGeom>
+          <a:noFill/>
+          <a:ln/>
+        </p:spPr>
+        <p:txBody>
+          <a:bodyPr wrap="square" rtlCol="0" anchor="ctr"/>
+          <a:lstStyle/>
+          <a:p>
+            <a:pPr algn="ctr" indent="0" marL="0">
+              <a:buNone/>
+            </a:pPr>
+            <a:r>
+              <a:rPr lang="en-US" sz="1100" dirty="0">
+                <a:solidFill>
+                  <a:srgbClr val="A0A0A0"/>
+                </a:solidFill>
+              </a:rPr>
+              <a:t>·</a:t>
+            </a:r>
+            <a:endParaRPr lang="en-US" sz="1100" dirty="0"/>
+          </a:p>
+        </p:txBody>
+      </p:sp>
+      <p:sp>
+        <p:nvSpPr>
+          <p:cNvPr id="22" name="Text 20">
+            <a:hlinkClick r:id="rId7" tooltip=""/>
+          </p:cNvPr>
+          <p:cNvSpPr/>
+          <p:nvPr/>
+        </p:nvSpPr>
+        <p:spPr>
+          <a:xfrm>
+            <a:off x="5349240" y="5943600"/>
+            <a:ext cx="1645920" cy="274320"/>
+          </a:xfrm>
+          <a:prstGeom prst="rect">
+            <a:avLst/>
+          </a:prstGeom>
+          <a:noFill/>
+          <a:ln/>
+        </p:spPr>
+        <p:txBody>
+          <a:bodyPr wrap="square" rtlCol="0" anchor="ctr"/>
+          <a:lstStyle/>
+          <a:p>
+            <a:pPr algn="l" indent="0" marL="0">
+              <a:buNone/>
+            </a:pPr>
+            <a:r>
+              <a:rPr lang="en-US" sz="1100" u="sng" dirty="0">
+                <a:solidFill>
+                  <a:srgbClr val="A0A0A0"/>
+                </a:solidFill>
+                <a:hlinkClick r:id="rId7" invalidUrl="" action="" tgtFrame="" tooltip="" history="1" highlightClick="0" endSnd="0">
+                  <a:extLst>
+                    <a:ext uri="{A12FA001-AC4F-418D-AE19-62706E023703}">
+                      <ahyp:hlinkClr xmlns:ahyp="http://schemas.microsoft.com/office/drawing/2018/hyperlinkcolor" val="tx"/>
+                    </a:ext>
+                  </a:extLst>
+                </a:hlinkClick>
+              </a:rPr>
+              <a:t>t.me/swapPilot</a:t>
+            </a:r>
+            <a:endParaRPr lang="en-US" sz="1100" dirty="0"/>
+          </a:p>
+        </p:txBody>
+      </p:sp>
+      <p:sp>
+        <p:nvSpPr>
+          <p:cNvPr id="23" name="Text 21"/>
+          <p:cNvSpPr/>
+          <p:nvPr/>
+        </p:nvSpPr>
+        <p:spPr>
+          <a:xfrm>
+            <a:off x="6995160" y="5943600"/>
+            <a:ext cx="182880" cy="274320"/>
+          </a:xfrm>
+          <a:prstGeom prst="rect">
+            <a:avLst/>
+          </a:prstGeom>
+          <a:noFill/>
+          <a:ln/>
+        </p:spPr>
+        <p:txBody>
+          <a:bodyPr wrap="square" rtlCol="0" anchor="ctr"/>
+          <a:lstStyle/>
+          <a:p>
+            <a:pPr algn="ctr" indent="0" marL="0">
+              <a:buNone/>
+            </a:pPr>
+            <a:r>
+              <a:rPr lang="en-US" sz="1100" dirty="0">
+                <a:solidFill>
+                  <a:srgbClr val="A0A0A0"/>
+                </a:solidFill>
+              </a:rPr>
+              <a:t>·</a:t>
+            </a:r>
+            <a:endParaRPr lang="en-US" sz="1100" dirty="0"/>
+          </a:p>
+        </p:txBody>
+      </p:sp>
+      <p:sp>
+        <p:nvSpPr>
+          <p:cNvPr id="24" name="Text 22">
+            <a:hlinkClick r:id="rId8" tooltip=""/>
+          </p:cNvPr>
+          <p:cNvSpPr/>
+          <p:nvPr/>
+        </p:nvSpPr>
+        <p:spPr>
+          <a:xfrm>
+            <a:off x="7178040" y="5943600"/>
+            <a:ext cx="4023360" cy="274320"/>
+          </a:xfrm>
+          <a:prstGeom prst="rect">
+            <a:avLst/>
+          </a:prstGeom>
+          <a:noFill/>
+          <a:ln/>
+        </p:spPr>
+        <p:txBody>
+          <a:bodyPr wrap="square" rtlCol="0" anchor="ctr"/>
+          <a:lstStyle/>
+          <a:p>
+            <a:pPr algn="l" indent="0" marL="0">
+              <a:buNone/>
+            </a:pPr>
+            <a:r>
+              <a:rPr lang="en-US" sz="1100" u="sng" dirty="0">
+                <a:solidFill>
+                  <a:srgbClr val="A0A0A0"/>
+                </a:solidFill>
+                <a:hlinkClick r:id="rId8" invalidUrl="" action="" tgtFrame="" tooltip="" history="1" highlightClick="0" endSnd="0">
+                  <a:extLst>
+                    <a:ext uri="{A12FA001-AC4F-418D-AE19-62706E023703}">
+                      <ahyp:hlinkClr xmlns:ahyp="http://schemas.microsoft.com/office/drawing/2018/hyperlinkcolor" val="tx"/>
+                    </a:ext>
+                  </a:extLst>
+                </a:hlinkClick>
+              </a:rPr>
+              <a:t>github.com/BacBacta/SwapPilot</a:t>
             </a:r>
             <a:endParaRPr lang="en-US" sz="1100" dirty="0"/>
           </a:p>

</xml_diff>

<commit_message>
chore(pitch-deck): regenerate PPTX with corrected paths
</commit_message>
<xml_diff>
--- a/pitch-deck/SwapPilot-Professional-PitchDeck.pptx
+++ b/pitch-deck/SwapPilot-Professional-PitchDeck.pptx
@@ -10570,7 +10570,7 @@
                   <a:srgbClr val="FFFFFF"/>
                 </a:solidFill>
               </a:rPr>
-              <a:t>/docs</a:t>
+              <a:t>/documentation</a:t>
             </a:r>
             <a:endParaRPr lang="en-US" sz="2200" dirty="0"/>
           </a:p>
@@ -10669,7 +10669,7 @@
                   <a:srgbClr val="FFFFFF"/>
                 </a:solidFill>
               </a:rPr>
-              <a:t>/docs/json</a:t>
+              <a:t>/documentation/json</a:t>
             </a:r>
             <a:endParaRPr lang="en-US" sz="2200" dirty="0"/>
           </a:p>

</xml_diff>

<commit_message>
fix(pitch-deck): bookmarks + layout fixes + correct allocation chart
</commit_message>
<xml_diff>
--- a/pitch-deck/SwapPilot-Professional-PitchDeck.pptx
+++ b/pitch-deck/SwapPilot-Professional-PitchDeck.pptx
@@ -117,6 +117,402 @@
     </a:lvl9pPr>
   </p:defaultTextStyle>
 </p:presentation>
+</file>
+
+<file path=ppt/charts/chart1.xml><?xml version="1.0" encoding="utf-8"?>
+<c:chartSpace xmlns:c="http://schemas.openxmlformats.org/drawingml/2006/chart" xmlns:a="http://schemas.openxmlformats.org/drawingml/2006/main" xmlns:r="http://schemas.openxmlformats.org/officeDocument/2006/relationships">
+  <c:date1904 val="0"/>
+  <c:roundedCorners val="1"/>
+  <c:chart>
+    <c:autoTitleDeleted val="1"/>
+    <c:plotArea>
+      <c:layout/>
+      <c:doughnutChart>
+        <c:varyColors val="1"/>
+        <c:ser>
+          <c:idx val="0"/>
+          <c:order val="0"/>
+          <c:tx>
+            <c:strRef>
+              <c:f>Sheet1!$B$1</c:f>
+              <c:strCache>
+                <c:ptCount val="1"/>
+                <c:pt idx="0">
+                  <c:v/>
+                </c:pt>
+              </c:strCache>
+            </c:strRef>
+          </c:tx>
+          <c:spPr>
+            <a:solidFill>
+              <a:schemeClr val="accent1"/>
+            </a:solidFill>
+            <a:ln w="9525" cap="flat">
+              <a:solidFill>
+                <a:srgbClr val="F9F9F9"/>
+              </a:solidFill>
+              <a:prstDash val="solid"/>
+              <a:round/>
+            </a:ln>
+            <a:effectLst/>
+          </c:spPr>
+          <c:dPt>
+            <c:idx val="0"/>
+            <c:bubble3D val="0"/>
+            <c:spPr>
+              <a:solidFill>
+                <a:srgbClr val="B6FF6A"/>
+              </a:solidFill>
+              <a:effectLst/>
+            </c:spPr>
+          </c:dPt>
+          <c:dPt>
+            <c:idx val="1"/>
+            <c:bubble3D val="0"/>
+            <c:spPr>
+              <a:solidFill>
+                <a:srgbClr val="8FCC55"/>
+              </a:solidFill>
+              <a:effectLst/>
+            </c:spPr>
+          </c:dPt>
+          <c:dPt>
+            <c:idx val="2"/>
+            <c:bubble3D val="0"/>
+            <c:spPr>
+              <a:solidFill>
+                <a:srgbClr val="7DD3FC"/>
+              </a:solidFill>
+              <a:effectLst/>
+            </c:spPr>
+          </c:dPt>
+          <c:dPt>
+            <c:idx val="3"/>
+            <c:bubble3D val="0"/>
+            <c:spPr>
+              <a:solidFill>
+                <a:srgbClr val="5AAFDC"/>
+              </a:solidFill>
+              <a:effectLst/>
+            </c:spPr>
+          </c:dPt>
+          <c:dPt>
+            <c:idx val="4"/>
+            <c:bubble3D val="0"/>
+            <c:spPr>
+              <a:solidFill>
+                <a:srgbClr val="5A5A5A"/>
+              </a:solidFill>
+              <a:effectLst/>
+            </c:spPr>
+          </c:dPt>
+          <c:dPt>
+            <c:idx val="5"/>
+            <c:bubble3D val="0"/>
+            <c:spPr>
+              <a:solidFill>
+                <a:srgbClr val="4A4A4A"/>
+              </a:solidFill>
+              <a:effectLst/>
+            </c:spPr>
+          </c:dPt>
+          <c:dPt>
+            <c:idx val="6"/>
+            <c:bubble3D val="0"/>
+            <c:spPr>
+              <a:solidFill>
+                <a:srgbClr val="3A3A3A"/>
+              </a:solidFill>
+              <a:effectLst/>
+            </c:spPr>
+          </c:dPt>
+          <c:dLbls>
+            <c:dLbl>
+              <c:idx val="0"/>
+              <c:numFmt formatCode="General" sourceLinked="0"/>
+              <c:spPr/>
+              <c:txPr>
+                <a:bodyPr/>
+                <a:lstStyle/>
+                <a:p>
+                  <a:pPr>
+                    <a:defRPr sz="1200" b="0" i="0" u="none" strike="noStrike">
+                      <a:solidFill>
+                        <a:srgbClr val="000000"/>
+                      </a:solidFill>
+                      <a:latin typeface="Arial"/>
+                    </a:defRPr>
+                  </a:pPr>
+                </a:p>
+              </c:txPr>
+              <c:showLegendKey val="0"/>
+              <c:showVal val="0"/>
+              <c:showCatName val="0"/>
+              <c:showSerName val="0"/>
+              <c:showPercent val="0"/>
+              <c:showBubbleSize val="0"/>
+            </c:dLbl>
+            <c:dLbl>
+              <c:idx val="1"/>
+              <c:numFmt formatCode="General" sourceLinked="0"/>
+              <c:spPr/>
+              <c:txPr>
+                <a:bodyPr/>
+                <a:lstStyle/>
+                <a:p>
+                  <a:pPr>
+                    <a:defRPr sz="1200" b="0" i="0" u="none" strike="noStrike">
+                      <a:solidFill>
+                        <a:srgbClr val="000000"/>
+                      </a:solidFill>
+                      <a:latin typeface="Arial"/>
+                    </a:defRPr>
+                  </a:pPr>
+                </a:p>
+              </c:txPr>
+              <c:showLegendKey val="0"/>
+              <c:showVal val="0"/>
+              <c:showCatName val="0"/>
+              <c:showSerName val="0"/>
+              <c:showPercent val="0"/>
+              <c:showBubbleSize val="0"/>
+            </c:dLbl>
+            <c:dLbl>
+              <c:idx val="2"/>
+              <c:numFmt formatCode="General" sourceLinked="0"/>
+              <c:spPr/>
+              <c:txPr>
+                <a:bodyPr/>
+                <a:lstStyle/>
+                <a:p>
+                  <a:pPr>
+                    <a:defRPr sz="1200" b="0" i="0" u="none" strike="noStrike">
+                      <a:solidFill>
+                        <a:srgbClr val="000000"/>
+                      </a:solidFill>
+                      <a:latin typeface="Arial"/>
+                    </a:defRPr>
+                  </a:pPr>
+                </a:p>
+              </c:txPr>
+              <c:showLegendKey val="0"/>
+              <c:showVal val="0"/>
+              <c:showCatName val="0"/>
+              <c:showSerName val="0"/>
+              <c:showPercent val="0"/>
+              <c:showBubbleSize val="0"/>
+            </c:dLbl>
+            <c:dLbl>
+              <c:idx val="3"/>
+              <c:numFmt formatCode="General" sourceLinked="0"/>
+              <c:spPr/>
+              <c:txPr>
+                <a:bodyPr/>
+                <a:lstStyle/>
+                <a:p>
+                  <a:pPr>
+                    <a:defRPr sz="1200" b="0" i="0" u="none" strike="noStrike">
+                      <a:solidFill>
+                        <a:srgbClr val="000000"/>
+                      </a:solidFill>
+                      <a:latin typeface="Arial"/>
+                    </a:defRPr>
+                  </a:pPr>
+                </a:p>
+              </c:txPr>
+              <c:showLegendKey val="0"/>
+              <c:showVal val="0"/>
+              <c:showCatName val="0"/>
+              <c:showSerName val="0"/>
+              <c:showPercent val="0"/>
+              <c:showBubbleSize val="0"/>
+            </c:dLbl>
+            <c:dLbl>
+              <c:idx val="4"/>
+              <c:numFmt formatCode="General" sourceLinked="0"/>
+              <c:spPr/>
+              <c:txPr>
+                <a:bodyPr/>
+                <a:lstStyle/>
+                <a:p>
+                  <a:pPr>
+                    <a:defRPr sz="1200" b="0" i="0" u="none" strike="noStrike">
+                      <a:solidFill>
+                        <a:srgbClr val="000000"/>
+                      </a:solidFill>
+                      <a:latin typeface="Arial"/>
+                    </a:defRPr>
+                  </a:pPr>
+                </a:p>
+              </c:txPr>
+              <c:showLegendKey val="0"/>
+              <c:showVal val="0"/>
+              <c:showCatName val="0"/>
+              <c:showSerName val="0"/>
+              <c:showPercent val="0"/>
+              <c:showBubbleSize val="0"/>
+            </c:dLbl>
+            <c:dLbl>
+              <c:idx val="5"/>
+              <c:numFmt formatCode="General" sourceLinked="0"/>
+              <c:spPr/>
+              <c:txPr>
+                <a:bodyPr/>
+                <a:lstStyle/>
+                <a:p>
+                  <a:pPr>
+                    <a:defRPr sz="1200" b="0" i="0" u="none" strike="noStrike">
+                      <a:solidFill>
+                        <a:srgbClr val="000000"/>
+                      </a:solidFill>
+                      <a:latin typeface="Arial"/>
+                    </a:defRPr>
+                  </a:pPr>
+                </a:p>
+              </c:txPr>
+              <c:showLegendKey val="0"/>
+              <c:showVal val="0"/>
+              <c:showCatName val="0"/>
+              <c:showSerName val="0"/>
+              <c:showPercent val="0"/>
+              <c:showBubbleSize val="0"/>
+            </c:dLbl>
+            <c:dLbl>
+              <c:idx val="6"/>
+              <c:numFmt formatCode="General" sourceLinked="0"/>
+              <c:spPr/>
+              <c:txPr>
+                <a:bodyPr/>
+                <a:lstStyle/>
+                <a:p>
+                  <a:pPr>
+                    <a:defRPr sz="1200" b="0" i="0" u="none" strike="noStrike">
+                      <a:solidFill>
+                        <a:srgbClr val="000000"/>
+                      </a:solidFill>
+                      <a:latin typeface="Arial"/>
+                    </a:defRPr>
+                  </a:pPr>
+                </a:p>
+              </c:txPr>
+              <c:showLegendKey val="0"/>
+              <c:showVal val="0"/>
+              <c:showCatName val="0"/>
+              <c:showSerName val="0"/>
+              <c:showPercent val="0"/>
+              <c:showBubbleSize val="0"/>
+            </c:dLbl>
+            <c:numFmt formatCode="General" sourceLinked="0"/>
+            <c:txPr>
+              <a:bodyPr/>
+              <a:lstStyle/>
+              <a:p>
+                <a:pPr>
+                  <a:defRPr sz="1800" b="0" i="0" u="none" strike="noStrike">
+                    <a:solidFill>
+                      <a:srgbClr val="000000"/>
+                    </a:solidFill>
+                    <a:latin typeface="Arial"/>
+                  </a:defRPr>
+                </a:pPr>
+              </a:p>
+            </c:txPr>
+            <c:showLegendKey val="0"/>
+            <c:showVal val="0"/>
+            <c:showCatName val="1"/>
+            <c:showSerName val="0"/>
+            <c:showPercent val="1"/>
+            <c:showBubbleSize val="0"/>
+            <c:showLeaderLines val="0"/>
+          </c:dLbls>
+          <c:cat>
+            <c:strRef>
+              <c:f>Sheet1!$A$2:$A$8</c:f>
+              <c:strCache>
+                <c:ptCount val="7"/>
+                <c:pt idx="0">
+                  <c:v>Public Sale</c:v>
+                </c:pt>
+                <c:pt idx="1">
+                  <c:v>Treasury</c:v>
+                </c:pt>
+                <c:pt idx="2">
+                  <c:v>CEX &amp; Marketing</c:v>
+                </c:pt>
+                <c:pt idx="3">
+                  <c:v>Liquidity</c:v>
+                </c:pt>
+                <c:pt idx="4">
+                  <c:v>Team</c:v>
+                </c:pt>
+                <c:pt idx="5">
+                  <c:v>Advisors</c:v>
+                </c:pt>
+                <c:pt idx="6">
+                  <c:v>Referral</c:v>
+                </c:pt>
+              </c:strCache>
+            </c:strRef>
+          </c:cat>
+          <c:val>
+            <c:numRef>
+              <c:f>Sheet1!$B$2:$B$8</c:f>
+              <c:numCache>
+                <c:ptCount val="7"/>
+                <c:pt idx="0">
+                  <c:v>35</c:v>
+                </c:pt>
+                <c:pt idx="1">
+                  <c:v>20</c:v>
+                </c:pt>
+                <c:pt idx="2">
+                  <c:v>12</c:v>
+                </c:pt>
+                <c:pt idx="3">
+                  <c:v>12</c:v>
+                </c:pt>
+                <c:pt idx="4">
+                  <c:v>11</c:v>
+                </c:pt>
+                <c:pt idx="5">
+                  <c:v>5</c:v>
+                </c:pt>
+                <c:pt idx="6">
+                  <c:v>5</c:v>
+                </c:pt>
+              </c:numCache>
+            </c:numRef>
+          </c:val>
+        </c:ser>
+        <c:firstSliceAng val="0"/>
+        <c:holeSize val="70"/>
+      </c:doughnutChart>
+      <c:spPr>
+        <a:solidFill>
+          <a:srgbClr val="07080B"/>
+        </a:solidFill>
+        <a:ln>
+          <a:noFill/>
+        </a:ln>
+        <a:effectLst/>
+      </c:spPr>
+    </c:plotArea>
+    <c:plotVisOnly val="1"/>
+    <c:dispBlanksAs val="span"/>
+  </c:chart>
+  <c:spPr>
+    <a:solidFill>
+      <a:srgbClr val="07080B"/>
+    </a:solidFill>
+    <a:ln>
+      <a:noFill/>
+    </a:ln>
+    <a:effectLst/>
+  </c:spPr>
+  <c:externalData r:id="rId1">
+    <c:autoUpdate val="0"/>
+  </c:externalData>
+</c:chartSpace>
 </file>
 
 <file path=ppt/notesMasters/notesMaster1.xml><?xml version="1.0" encoding="utf-8"?>
@@ -3245,7 +3641,7 @@
         <p:spPr>
           <a:xfrm>
             <a:off x="457200" y="1417320"/>
-            <a:ext cx="5486400" cy="914400"/>
+            <a:ext cx="5486400" cy="1234440"/>
           </a:xfrm>
           <a:prstGeom prst="rect">
             <a:avLst/>
@@ -6439,7 +6835,7 @@
                   <a:srgbClr val="A0A0A0"/>
                 </a:solidFill>
               </a:rPr>
-              <a:t>Disclaimer / 13</a:t>
+              <a:t>13 / 13</a:t>
             </a:r>
             <a:endParaRPr lang="en-US" sz="1100" dirty="0"/>
           </a:p>
@@ -6510,7 +6906,7 @@
         <p:spPr>
           <a:xfrm>
             <a:off x="457200" y="1417320"/>
-            <a:ext cx="5486400" cy="914400"/>
+            <a:ext cx="5486400" cy="1234440"/>
           </a:xfrm>
           <a:prstGeom prst="rect">
             <a:avLst/>
@@ -7374,7 +7770,7 @@
         <p:spPr>
           <a:xfrm>
             <a:off x="457200" y="1417320"/>
-            <a:ext cx="5486400" cy="914400"/>
+            <a:ext cx="5486400" cy="1234440"/>
           </a:xfrm>
           <a:prstGeom prst="rect">
             <a:avLst/>
@@ -7998,7 +8394,7 @@
         <p:spPr>
           <a:xfrm>
             <a:off x="457200" y="1417320"/>
-            <a:ext cx="5486400" cy="914400"/>
+            <a:ext cx="5486400" cy="1234440"/>
           </a:xfrm>
           <a:prstGeom prst="rect">
             <a:avLst/>
@@ -8053,7 +8449,7 @@
         </p:nvSpPr>
         <p:spPr>
           <a:xfrm>
-            <a:off x="457200" y="2423160"/>
+            <a:off x="457200" y="2651760"/>
             <a:ext cx="5029200" cy="914400"/>
           </a:xfrm>
           <a:prstGeom prst="rect">
@@ -8622,7 +9018,7 @@
         <p:spPr>
           <a:xfrm>
             <a:off x="457200" y="1417320"/>
-            <a:ext cx="5486400" cy="914400"/>
+            <a:ext cx="5486400" cy="1234440"/>
           </a:xfrm>
           <a:prstGeom prst="rect">
             <a:avLst/>
@@ -9382,7 +9778,7 @@
         <p:spPr>
           <a:xfrm>
             <a:off x="457200" y="1417320"/>
-            <a:ext cx="5486400" cy="914400"/>
+            <a:ext cx="5486400" cy="1234440"/>
           </a:xfrm>
           <a:prstGeom prst="rect">
             <a:avLst/>
@@ -10108,7 +10504,7 @@
         <p:spPr>
           <a:xfrm>
             <a:off x="457200" y="1417320"/>
-            <a:ext cx="5486400" cy="914400"/>
+            <a:ext cx="5486400" cy="1234440"/>
           </a:xfrm>
           <a:prstGeom prst="rect">
             <a:avLst/>
@@ -10287,8 +10683,8 @@
         </p:nvSpPr>
         <p:spPr>
           <a:xfrm>
-            <a:off x="6400800" y="1188720"/>
-            <a:ext cx="2560320" cy="1371600"/>
+            <a:off x="6126480" y="1188720"/>
+            <a:ext cx="2743200" cy="1371600"/>
           </a:xfrm>
           <a:prstGeom prst="roundRect">
             <a:avLst>
@@ -10314,8 +10710,8 @@
         </p:nvSpPr>
         <p:spPr>
           <a:xfrm>
-            <a:off x="6537960" y="1325880"/>
-            <a:ext cx="2286000" cy="228600"/>
+            <a:off x="6263640" y="1325880"/>
+            <a:ext cx="2468880" cy="228600"/>
           </a:xfrm>
           <a:prstGeom prst="rect">
             <a:avLst/>
@@ -10350,31 +10746,31 @@
         </p:nvSpPr>
         <p:spPr>
           <a:xfrm>
-            <a:off x="6537960" y="1554480"/>
-            <a:ext cx="2286000" cy="457200"/>
-          </a:xfrm>
-          <a:prstGeom prst="rect">
-            <a:avLst/>
-          </a:prstGeom>
-          <a:noFill/>
-          <a:ln/>
-        </p:spPr>
-        <p:txBody>
-          <a:bodyPr wrap="square" rtlCol="0" anchor="ctr"/>
-          <a:lstStyle/>
-          <a:p>
-            <a:pPr indent="0" marL="0">
-              <a:buNone/>
-            </a:pPr>
-            <a:r>
-              <a:rPr lang="en-US" sz="2200" b="1" dirty="0">
+            <a:off x="6263640" y="1536192"/>
+            <a:ext cx="2468880" cy="868680"/>
+          </a:xfrm>
+          <a:prstGeom prst="rect">
+            <a:avLst/>
+          </a:prstGeom>
+          <a:noFill/>
+          <a:ln/>
+        </p:spPr>
+        <p:txBody>
+          <a:bodyPr wrap="square" rtlCol="0" anchor="ctr"/>
+          <a:lstStyle/>
+          <a:p>
+            <a:pPr indent="0" marL="0">
+              <a:buNone/>
+            </a:pPr>
+            <a:r>
+              <a:rPr lang="en-US" sz="1800" b="1" dirty="0">
                 <a:solidFill>
                   <a:srgbClr val="FFFFFF"/>
                 </a:solidFill>
               </a:rPr>
               <a:t>app-swappilot.xyz</a:t>
             </a:r>
-            <a:endParaRPr lang="en-US" sz="2200" dirty="0"/>
+            <a:endParaRPr lang="en-US" sz="1800" dirty="0"/>
           </a:p>
         </p:txBody>
       </p:sp>
@@ -10386,8 +10782,8 @@
         </p:nvSpPr>
         <p:spPr>
           <a:xfrm>
-            <a:off x="9144000" y="1188720"/>
-            <a:ext cx="2560320" cy="1371600"/>
+            <a:off x="9098280" y="1188720"/>
+            <a:ext cx="2743200" cy="1371600"/>
           </a:xfrm>
           <a:prstGeom prst="roundRect">
             <a:avLst>
@@ -10413,8 +10809,8 @@
         </p:nvSpPr>
         <p:spPr>
           <a:xfrm>
-            <a:off x="9281160" y="1325880"/>
-            <a:ext cx="2286000" cy="228600"/>
+            <a:off x="9235440" y="1325880"/>
+            <a:ext cx="2468880" cy="228600"/>
           </a:xfrm>
           <a:prstGeom prst="rect">
             <a:avLst/>
@@ -10449,31 +10845,31 @@
         </p:nvSpPr>
         <p:spPr>
           <a:xfrm>
-            <a:off x="9281160" y="1554480"/>
-            <a:ext cx="2286000" cy="457200"/>
-          </a:xfrm>
-          <a:prstGeom prst="rect">
-            <a:avLst/>
-          </a:prstGeom>
-          <a:noFill/>
-          <a:ln/>
-        </p:spPr>
-        <p:txBody>
-          <a:bodyPr wrap="square" rtlCol="0" anchor="ctr"/>
-          <a:lstStyle/>
-          <a:p>
-            <a:pPr indent="0" marL="0">
-              <a:buNone/>
-            </a:pPr>
-            <a:r>
-              <a:rPr lang="en-US" sz="2200" b="1" dirty="0">
+            <a:off x="9235440" y="1536192"/>
+            <a:ext cx="2468880" cy="868680"/>
+          </a:xfrm>
+          <a:prstGeom prst="rect">
+            <a:avLst/>
+          </a:prstGeom>
+          <a:noFill/>
+          <a:ln/>
+        </p:spPr>
+        <p:txBody>
+          <a:bodyPr wrap="square" rtlCol="0" anchor="ctr"/>
+          <a:lstStyle/>
+          <a:p>
+            <a:pPr indent="0" marL="0">
+              <a:buNone/>
+            </a:pPr>
+            <a:r>
+              <a:rPr lang="en-US" sz="1800" b="1" dirty="0">
                 <a:solidFill>
                   <a:srgbClr val="FFFFFF"/>
                 </a:solidFill>
               </a:rPr>
               <a:t>swappilot-api.fly.dev</a:t>
             </a:r>
-            <a:endParaRPr lang="en-US" sz="2200" dirty="0"/>
+            <a:endParaRPr lang="en-US" sz="1800" dirty="0"/>
           </a:p>
         </p:txBody>
       </p:sp>
@@ -10485,8 +10881,8 @@
         </p:nvSpPr>
         <p:spPr>
           <a:xfrm>
-            <a:off x="6400800" y="2743200"/>
-            <a:ext cx="2560320" cy="1371600"/>
+            <a:off x="6126480" y="2743200"/>
+            <a:ext cx="2743200" cy="1371600"/>
           </a:xfrm>
           <a:prstGeom prst="roundRect">
             <a:avLst>
@@ -10512,8 +10908,8 @@
         </p:nvSpPr>
         <p:spPr>
           <a:xfrm>
-            <a:off x="6537960" y="2880360"/>
-            <a:ext cx="2286000" cy="228600"/>
+            <a:off x="6263640" y="2880360"/>
+            <a:ext cx="2468880" cy="228600"/>
           </a:xfrm>
           <a:prstGeom prst="rect">
             <a:avLst/>
@@ -10548,31 +10944,31 @@
         </p:nvSpPr>
         <p:spPr>
           <a:xfrm>
-            <a:off x="6537960" y="3108960"/>
-            <a:ext cx="2286000" cy="457200"/>
-          </a:xfrm>
-          <a:prstGeom prst="rect">
-            <a:avLst/>
-          </a:prstGeom>
-          <a:noFill/>
-          <a:ln/>
-        </p:spPr>
-        <p:txBody>
-          <a:bodyPr wrap="square" rtlCol="0" anchor="ctr"/>
-          <a:lstStyle/>
-          <a:p>
-            <a:pPr indent="0" marL="0">
-              <a:buNone/>
-            </a:pPr>
-            <a:r>
-              <a:rPr lang="en-US" sz="2200" b="1" dirty="0">
+            <a:off x="6263640" y="3090672"/>
+            <a:ext cx="2468880" cy="868680"/>
+          </a:xfrm>
+          <a:prstGeom prst="rect">
+            <a:avLst/>
+          </a:prstGeom>
+          <a:noFill/>
+          <a:ln/>
+        </p:spPr>
+        <p:txBody>
+          <a:bodyPr wrap="square" rtlCol="0" anchor="ctr"/>
+          <a:lstStyle/>
+          <a:p>
+            <a:pPr indent="0" marL="0">
+              <a:buNone/>
+            </a:pPr>
+            <a:r>
+              <a:rPr lang="en-US" sz="1800" b="1" dirty="0">
                 <a:solidFill>
                   <a:srgbClr val="FFFFFF"/>
                 </a:solidFill>
               </a:rPr>
               <a:t>/documentation</a:t>
             </a:r>
-            <a:endParaRPr lang="en-US" sz="2200" dirty="0"/>
+            <a:endParaRPr lang="en-US" sz="1800" dirty="0"/>
           </a:p>
         </p:txBody>
       </p:sp>
@@ -10584,8 +10980,8 @@
         </p:nvSpPr>
         <p:spPr>
           <a:xfrm>
-            <a:off x="9144000" y="2743200"/>
-            <a:ext cx="2560320" cy="1371600"/>
+            <a:off x="9098280" y="2743200"/>
+            <a:ext cx="2743200" cy="1371600"/>
           </a:xfrm>
           <a:prstGeom prst="roundRect">
             <a:avLst>
@@ -10611,8 +11007,8 @@
         </p:nvSpPr>
         <p:spPr>
           <a:xfrm>
-            <a:off x="9281160" y="2880360"/>
-            <a:ext cx="2286000" cy="228600"/>
+            <a:off x="9235440" y="2880360"/>
+            <a:ext cx="2468880" cy="228600"/>
           </a:xfrm>
           <a:prstGeom prst="rect">
             <a:avLst/>
@@ -10647,31 +11043,31 @@
         </p:nvSpPr>
         <p:spPr>
           <a:xfrm>
-            <a:off x="9281160" y="3108960"/>
-            <a:ext cx="2286000" cy="457200"/>
-          </a:xfrm>
-          <a:prstGeom prst="rect">
-            <a:avLst/>
-          </a:prstGeom>
-          <a:noFill/>
-          <a:ln/>
-        </p:spPr>
-        <p:txBody>
-          <a:bodyPr wrap="square" rtlCol="0" anchor="ctr"/>
-          <a:lstStyle/>
-          <a:p>
-            <a:pPr indent="0" marL="0">
-              <a:buNone/>
-            </a:pPr>
-            <a:r>
-              <a:rPr lang="en-US" sz="2200" b="1" dirty="0">
+            <a:off x="9235440" y="3090672"/>
+            <a:ext cx="2468880" cy="868680"/>
+          </a:xfrm>
+          <a:prstGeom prst="rect">
+            <a:avLst/>
+          </a:prstGeom>
+          <a:noFill/>
+          <a:ln/>
+        </p:spPr>
+        <p:txBody>
+          <a:bodyPr wrap="square" rtlCol="0" anchor="ctr"/>
+          <a:lstStyle/>
+          <a:p>
+            <a:pPr indent="0" marL="0">
+              <a:buNone/>
+            </a:pPr>
+            <a:r>
+              <a:rPr lang="en-US" sz="1800" b="1" dirty="0">
                 <a:solidFill>
                   <a:srgbClr val="FFFFFF"/>
                 </a:solidFill>
               </a:rPr>
               <a:t>/documentation/json</a:t>
             </a:r>
-            <a:endParaRPr lang="en-US" sz="2200" dirty="0"/>
+            <a:endParaRPr lang="en-US" sz="1800" dirty="0"/>
           </a:p>
         </p:txBody>
       </p:sp>
@@ -10683,8 +11079,8 @@
         </p:nvSpPr>
         <p:spPr>
           <a:xfrm>
-            <a:off x="6400800" y="4297680"/>
-            <a:ext cx="2560320" cy="1371600"/>
+            <a:off x="6126480" y="4297680"/>
+            <a:ext cx="2743200" cy="1371600"/>
           </a:xfrm>
           <a:prstGeom prst="roundRect">
             <a:avLst>
@@ -10710,8 +11106,8 @@
         </p:nvSpPr>
         <p:spPr>
           <a:xfrm>
-            <a:off x="6537960" y="4434840"/>
-            <a:ext cx="2286000" cy="228600"/>
+            <a:off x="6263640" y="4434840"/>
+            <a:ext cx="2468880" cy="228600"/>
           </a:xfrm>
           <a:prstGeom prst="rect">
             <a:avLst/>
@@ -10746,31 +11142,31 @@
         </p:nvSpPr>
         <p:spPr>
           <a:xfrm>
-            <a:off x="6537960" y="4663440"/>
-            <a:ext cx="2286000" cy="457200"/>
-          </a:xfrm>
-          <a:prstGeom prst="rect">
-            <a:avLst/>
-          </a:prstGeom>
-          <a:noFill/>
-          <a:ln/>
-        </p:spPr>
-        <p:txBody>
-          <a:bodyPr wrap="square" rtlCol="0" anchor="ctr"/>
-          <a:lstStyle/>
-          <a:p>
-            <a:pPr indent="0" marL="0">
-              <a:buNone/>
-            </a:pPr>
-            <a:r>
-              <a:rPr lang="en-US" sz="2200" b="1" dirty="0">
+            <a:off x="6263640" y="4645152"/>
+            <a:ext cx="2468880" cy="868680"/>
+          </a:xfrm>
+          <a:prstGeom prst="rect">
+            <a:avLst/>
+          </a:prstGeom>
+          <a:noFill/>
+          <a:ln/>
+        </p:spPr>
+        <p:txBody>
+          <a:bodyPr wrap="square" rtlCol="0" anchor="ctr"/>
+          <a:lstStyle/>
+          <a:p>
+            <a:pPr indent="0" marL="0">
+              <a:buNone/>
+            </a:pPr>
+            <a:r>
+              <a:rPr lang="en-US" sz="1800" b="1" dirty="0">
                 <a:solidFill>
                   <a:srgbClr val="FFFFFF"/>
                 </a:solidFill>
               </a:rPr>
               <a:t>/v1/quotes</a:t>
             </a:r>
-            <a:endParaRPr lang="en-US" sz="2200" dirty="0"/>
+            <a:endParaRPr lang="en-US" sz="1800" dirty="0"/>
           </a:p>
         </p:txBody>
       </p:sp>
@@ -10782,8 +11178,8 @@
         </p:nvSpPr>
         <p:spPr>
           <a:xfrm>
-            <a:off x="9144000" y="4297680"/>
-            <a:ext cx="2560320" cy="1371600"/>
+            <a:off x="9098280" y="4297680"/>
+            <a:ext cx="2743200" cy="1371600"/>
           </a:xfrm>
           <a:prstGeom prst="roundRect">
             <a:avLst>
@@ -10809,8 +11205,8 @@
         </p:nvSpPr>
         <p:spPr>
           <a:xfrm>
-            <a:off x="9281160" y="4434840"/>
-            <a:ext cx="2286000" cy="228600"/>
+            <a:off x="9235440" y="4434840"/>
+            <a:ext cx="2468880" cy="228600"/>
           </a:xfrm>
           <a:prstGeom prst="rect">
             <a:avLst/>
@@ -10845,31 +11241,31 @@
         </p:nvSpPr>
         <p:spPr>
           <a:xfrm>
-            <a:off x="9281160" y="4663440"/>
-            <a:ext cx="2286000" cy="457200"/>
-          </a:xfrm>
-          <a:prstGeom prst="rect">
-            <a:avLst/>
-          </a:prstGeom>
-          <a:noFill/>
-          <a:ln/>
-        </p:spPr>
-        <p:txBody>
-          <a:bodyPr wrap="square" rtlCol="0" anchor="ctr"/>
-          <a:lstStyle/>
-          <a:p>
-            <a:pPr indent="0" marL="0">
-              <a:buNone/>
-            </a:pPr>
-            <a:r>
-              <a:rPr lang="en-US" sz="2200" b="1" dirty="0">
+            <a:off x="9235440" y="4645152"/>
+            <a:ext cx="2468880" cy="868680"/>
+          </a:xfrm>
+          <a:prstGeom prst="rect">
+            <a:avLst/>
+          </a:prstGeom>
+          <a:noFill/>
+          <a:ln/>
+        </p:spPr>
+        <p:txBody>
+          <a:bodyPr wrap="square" rtlCol="0" anchor="ctr"/>
+          <a:lstStyle/>
+          <a:p>
+            <a:pPr indent="0" marL="0">
+              <a:buNone/>
+            </a:pPr>
+            <a:r>
+              <a:rPr lang="en-US" sz="1800" b="1" dirty="0">
                 <a:solidFill>
                   <a:srgbClr val="FFFFFF"/>
                 </a:solidFill>
               </a:rPr>
               <a:t>/v1/build-tx</a:t>
             </a:r>
-            <a:endParaRPr lang="en-US" sz="2200" dirty="0"/>
+            <a:endParaRPr lang="en-US" sz="1800" dirty="0"/>
           </a:p>
         </p:txBody>
       </p:sp>
@@ -11105,7 +11501,7 @@
         <p:spPr>
           <a:xfrm>
             <a:off x="457200" y="1417320"/>
-            <a:ext cx="5486400" cy="914400"/>
+            <a:ext cx="5486400" cy="1234440"/>
           </a:xfrm>
           <a:prstGeom prst="rect">
             <a:avLst/>
@@ -11729,7 +12125,7 @@
         <p:spPr>
           <a:xfrm>
             <a:off x="457200" y="1417320"/>
-            <a:ext cx="5486400" cy="914400"/>
+            <a:ext cx="5486400" cy="1234440"/>
           </a:xfrm>
           <a:prstGeom prst="rect">
             <a:avLst/>
@@ -11759,66 +12155,32 @@
           </a:p>
         </p:txBody>
       </p:sp>
-      <p:sp>
-        <p:nvSpPr>
-          <p:cNvPr id="9" name="Shape 7"/>
-          <p:cNvSpPr/>
-          <p:nvPr/>
-        </p:nvSpPr>
-        <p:spPr>
-          <a:xfrm>
-            <a:off x="1371600" y="2286000"/>
-            <a:ext cx="2560320" cy="2560320"/>
-          </a:xfrm>
-          <a:prstGeom prst="ellipse">
-            <a:avLst/>
-          </a:prstGeom>
-          <a:solidFill>
-            <a:srgbClr val="B6FF6A"/>
-          </a:solidFill>
-          <a:ln w="12700">
-            <a:solidFill>
-              <a:srgbClr val="1A1A1A"/>
-            </a:solidFill>
-            <a:prstDash val="solid"/>
-          </a:ln>
-        </p:spPr>
-      </p:sp>
-      <p:sp>
-        <p:nvSpPr>
-          <p:cNvPr id="10" name="Shape 8"/>
-          <p:cNvSpPr/>
-          <p:nvPr/>
-        </p:nvSpPr>
-        <p:spPr>
-          <a:xfrm>
-            <a:off x="1883664" y="2798064"/>
-            <a:ext cx="1536192" cy="1536192"/>
-          </a:xfrm>
-          <a:prstGeom prst="ellipse">
-            <a:avLst/>
-          </a:prstGeom>
-          <a:solidFill>
-            <a:srgbClr val="07080B"/>
-          </a:solidFill>
-          <a:ln w="12700">
-            <a:solidFill>
-              <a:srgbClr val="2A2A2A"/>
-            </a:solidFill>
-            <a:prstDash val="solid"/>
-          </a:ln>
-        </p:spPr>
-      </p:sp>
-      <p:sp>
-        <p:nvSpPr>
-          <p:cNvPr id="11" name="Text 9"/>
-          <p:cNvSpPr/>
-          <p:nvPr/>
-        </p:nvSpPr>
-        <p:spPr>
-          <a:xfrm>
-            <a:off x="1371600" y="3182112"/>
-            <a:ext cx="2560320" cy="457200"/>
+      <p:graphicFrame>
+        <p:nvGraphicFramePr>
+          <p:cNvPr id="9" name="Chart 0" descr=""/>
+          <p:cNvGraphicFramePr/>
+          <p:nvPr/>
+        </p:nvGraphicFramePr>
+        <p:xfrm>
+          <a:off x="777240" y="1965960"/>
+          <a:ext cx="3657600" cy="3657600"/>
+        </p:xfrm>
+        <a:graphic xmlns:a="http://schemas.openxmlformats.org/drawingml/2006/main">
+          <a:graphicData uri="http://schemas.openxmlformats.org/drawingml/2006/chart">
+            <c:chart xmlns:c="http://schemas.openxmlformats.org/drawingml/2006/chart" r:id="rId1"/>
+          </a:graphicData>
+        </a:graphic>
+      </p:graphicFrame>
+      <p:sp>
+        <p:nvSpPr>
+          <p:cNvPr id="10" name="Text 7"/>
+          <p:cNvSpPr/>
+          <p:nvPr/>
+        </p:nvSpPr>
+        <p:spPr>
+          <a:xfrm>
+            <a:off x="777240" y="3246120"/>
+            <a:ext cx="3657600" cy="457200"/>
           </a:xfrm>
           <a:prstGeom prst="rect">
             <a:avLst/>
@@ -11834,27 +12196,27 @@
               <a:buNone/>
             </a:pPr>
             <a:r>
-              <a:rPr lang="en-US" sz="2800" b="1" dirty="0">
+              <a:rPr lang="en-US" sz="3400" b="1" dirty="0">
                 <a:solidFill>
                   <a:srgbClr val="FFFFFF"/>
                 </a:solidFill>
               </a:rPr>
               <a:t>1B</a:t>
             </a:r>
-            <a:endParaRPr lang="en-US" sz="2800" dirty="0"/>
-          </a:p>
-        </p:txBody>
-      </p:sp>
-      <p:sp>
-        <p:nvSpPr>
-          <p:cNvPr id="12" name="Text 10"/>
-          <p:cNvSpPr/>
-          <p:nvPr/>
-        </p:nvSpPr>
-        <p:spPr>
-          <a:xfrm>
-            <a:off x="1371600" y="3694176"/>
-            <a:ext cx="2560320" cy="274320"/>
+            <a:endParaRPr lang="en-US" sz="3400" dirty="0"/>
+          </a:p>
+        </p:txBody>
+      </p:sp>
+      <p:sp>
+        <p:nvSpPr>
+          <p:cNvPr id="11" name="Text 8"/>
+          <p:cNvSpPr/>
+          <p:nvPr/>
+        </p:nvSpPr>
+        <p:spPr>
+          <a:xfrm>
+            <a:off x="777240" y="3703320"/>
+            <a:ext cx="3657600" cy="274320"/>
           </a:xfrm>
           <a:prstGeom prst="rect">
             <a:avLst/>
@@ -11870,20 +12232,20 @@
               <a:buNone/>
             </a:pPr>
             <a:r>
-              <a:rPr lang="en-US" sz="1000" b="1" dirty="0">
+              <a:rPr lang="en-US" sz="1200" b="1" dirty="0">
                 <a:solidFill>
                   <a:srgbClr val="A0A0A0"/>
                 </a:solidFill>
               </a:rPr>
               <a:t>PILOT</a:t>
             </a:r>
-            <a:endParaRPr lang="en-US" sz="1000" dirty="0"/>
-          </a:p>
-        </p:txBody>
-      </p:sp>
-      <p:sp>
-        <p:nvSpPr>
-          <p:cNvPr id="13" name="Text 11"/>
+            <a:endParaRPr lang="en-US" sz="1200" dirty="0"/>
+          </a:p>
+        </p:txBody>
+      </p:sp>
+      <p:sp>
+        <p:nvSpPr>
+          <p:cNvPr id="12" name="Text 9"/>
           <p:cNvSpPr/>
           <p:nvPr/>
         </p:nvSpPr>
@@ -11919,7 +12281,7 @@
       </p:sp>
       <p:sp>
         <p:nvSpPr>
-          <p:cNvPr id="14" name="Shape 12"/>
+          <p:cNvPr id="13" name="Shape 10"/>
           <p:cNvSpPr/>
           <p:nvPr/>
         </p:nvSpPr>
@@ -11946,7 +12308,7 @@
       </p:sp>
       <p:sp>
         <p:nvSpPr>
-          <p:cNvPr id="15" name="Shape 13"/>
+          <p:cNvPr id="14" name="Shape 11"/>
           <p:cNvSpPr/>
           <p:nvPr/>
         </p:nvSpPr>
@@ -11968,7 +12330,7 @@
       </p:sp>
       <p:sp>
         <p:nvSpPr>
-          <p:cNvPr id="16" name="Text 14"/>
+          <p:cNvPr id="15" name="Text 12"/>
           <p:cNvSpPr/>
           <p:nvPr/>
         </p:nvSpPr>
@@ -12004,7 +12366,7 @@
       </p:sp>
       <p:sp>
         <p:nvSpPr>
-          <p:cNvPr id="17" name="Text 15"/>
+          <p:cNvPr id="16" name="Text 13"/>
           <p:cNvSpPr/>
           <p:nvPr/>
         </p:nvSpPr>
@@ -12040,7 +12402,7 @@
       </p:sp>
       <p:sp>
         <p:nvSpPr>
-          <p:cNvPr id="18" name="Shape 16"/>
+          <p:cNvPr id="17" name="Shape 14"/>
           <p:cNvSpPr/>
           <p:nvPr/>
         </p:nvSpPr>
@@ -12062,7 +12424,7 @@
       </p:sp>
       <p:sp>
         <p:nvSpPr>
-          <p:cNvPr id="19" name="Text 17"/>
+          <p:cNvPr id="18" name="Text 15"/>
           <p:cNvSpPr/>
           <p:nvPr/>
         </p:nvSpPr>
@@ -12098,7 +12460,7 @@
       </p:sp>
       <p:sp>
         <p:nvSpPr>
-          <p:cNvPr id="20" name="Text 18"/>
+          <p:cNvPr id="19" name="Text 16"/>
           <p:cNvSpPr/>
           <p:nvPr/>
         </p:nvSpPr>
@@ -12134,7 +12496,7 @@
       </p:sp>
       <p:sp>
         <p:nvSpPr>
-          <p:cNvPr id="21" name="Shape 19"/>
+          <p:cNvPr id="20" name="Shape 17"/>
           <p:cNvSpPr/>
           <p:nvPr/>
         </p:nvSpPr>
@@ -12156,7 +12518,7 @@
       </p:sp>
       <p:sp>
         <p:nvSpPr>
-          <p:cNvPr id="22" name="Text 20"/>
+          <p:cNvPr id="21" name="Text 18"/>
           <p:cNvSpPr/>
           <p:nvPr/>
         </p:nvSpPr>
@@ -12192,7 +12554,7 @@
       </p:sp>
       <p:sp>
         <p:nvSpPr>
-          <p:cNvPr id="23" name="Text 21"/>
+          <p:cNvPr id="22" name="Text 19"/>
           <p:cNvSpPr/>
           <p:nvPr/>
         </p:nvSpPr>
@@ -12228,7 +12590,7 @@
       </p:sp>
       <p:sp>
         <p:nvSpPr>
-          <p:cNvPr id="24" name="Shape 22"/>
+          <p:cNvPr id="23" name="Shape 20"/>
           <p:cNvSpPr/>
           <p:nvPr/>
         </p:nvSpPr>
@@ -12250,7 +12612,7 @@
       </p:sp>
       <p:sp>
         <p:nvSpPr>
-          <p:cNvPr id="25" name="Text 23"/>
+          <p:cNvPr id="24" name="Text 21"/>
           <p:cNvSpPr/>
           <p:nvPr/>
         </p:nvSpPr>
@@ -12286,7 +12648,7 @@
       </p:sp>
       <p:sp>
         <p:nvSpPr>
-          <p:cNvPr id="26" name="Text 24"/>
+          <p:cNvPr id="25" name="Text 22"/>
           <p:cNvSpPr/>
           <p:nvPr/>
         </p:nvSpPr>
@@ -12322,7 +12684,7 @@
       </p:sp>
       <p:sp>
         <p:nvSpPr>
-          <p:cNvPr id="27" name="Shape 25"/>
+          <p:cNvPr id="26" name="Shape 23"/>
           <p:cNvSpPr/>
           <p:nvPr/>
         </p:nvSpPr>
@@ -12344,7 +12706,7 @@
       </p:sp>
       <p:sp>
         <p:nvSpPr>
-          <p:cNvPr id="28" name="Text 26"/>
+          <p:cNvPr id="27" name="Text 24"/>
           <p:cNvSpPr/>
           <p:nvPr/>
         </p:nvSpPr>
@@ -12380,7 +12742,7 @@
       </p:sp>
       <p:sp>
         <p:nvSpPr>
-          <p:cNvPr id="29" name="Text 27"/>
+          <p:cNvPr id="28" name="Text 25"/>
           <p:cNvSpPr/>
           <p:nvPr/>
         </p:nvSpPr>
@@ -12416,7 +12778,7 @@
       </p:sp>
       <p:sp>
         <p:nvSpPr>
-          <p:cNvPr id="30" name="Shape 28"/>
+          <p:cNvPr id="29" name="Shape 26"/>
           <p:cNvSpPr/>
           <p:nvPr/>
         </p:nvSpPr>
@@ -12438,7 +12800,7 @@
       </p:sp>
       <p:sp>
         <p:nvSpPr>
-          <p:cNvPr id="31" name="Text 29"/>
+          <p:cNvPr id="30" name="Text 27"/>
           <p:cNvSpPr/>
           <p:nvPr/>
         </p:nvSpPr>
@@ -12474,7 +12836,7 @@
       </p:sp>
       <p:sp>
         <p:nvSpPr>
-          <p:cNvPr id="32" name="Text 30"/>
+          <p:cNvPr id="31" name="Text 28"/>
           <p:cNvSpPr/>
           <p:nvPr/>
         </p:nvSpPr>
@@ -12510,7 +12872,7 @@
       </p:sp>
       <p:sp>
         <p:nvSpPr>
-          <p:cNvPr id="33" name="Shape 31"/>
+          <p:cNvPr id="32" name="Shape 29"/>
           <p:cNvSpPr/>
           <p:nvPr/>
         </p:nvSpPr>
@@ -12532,7 +12894,7 @@
       </p:sp>
       <p:sp>
         <p:nvSpPr>
-          <p:cNvPr id="34" name="Text 32"/>
+          <p:cNvPr id="33" name="Text 30"/>
           <p:cNvSpPr/>
           <p:nvPr/>
         </p:nvSpPr>
@@ -12568,7 +12930,7 @@
       </p:sp>
       <p:sp>
         <p:nvSpPr>
-          <p:cNvPr id="35" name="Text 33"/>
+          <p:cNvPr id="34" name="Text 31"/>
           <p:cNvSpPr/>
           <p:nvPr/>
         </p:nvSpPr>
@@ -12834,7 +13196,7 @@
         <p:spPr>
           <a:xfrm>
             <a:off x="457200" y="1417320"/>
-            <a:ext cx="5486400" cy="914400"/>
+            <a:ext cx="5486400" cy="1234440"/>
           </a:xfrm>
           <a:prstGeom prst="rect">
             <a:avLst/>
@@ -12974,8 +13336,8 @@
         </p:nvSpPr>
         <p:spPr>
           <a:xfrm>
-            <a:off x="6537960" y="1554480"/>
-            <a:ext cx="2286000" cy="457200"/>
+            <a:off x="6537960" y="1536192"/>
+            <a:ext cx="2286000" cy="960120"/>
           </a:xfrm>
           <a:prstGeom prst="rect">
             <a:avLst/>
@@ -13073,8 +13435,8 @@
         </p:nvSpPr>
         <p:spPr>
           <a:xfrm>
-            <a:off x="9281160" y="1554480"/>
-            <a:ext cx="2286000" cy="457200"/>
+            <a:off x="9281160" y="1536192"/>
+            <a:ext cx="2286000" cy="960120"/>
           </a:xfrm>
           <a:prstGeom prst="rect">
             <a:avLst/>
@@ -13172,8 +13534,8 @@
         </p:nvSpPr>
         <p:spPr>
           <a:xfrm>
-            <a:off x="6537960" y="3200400"/>
-            <a:ext cx="2286000" cy="457200"/>
+            <a:off x="6537960" y="3182112"/>
+            <a:ext cx="2286000" cy="960120"/>
           </a:xfrm>
           <a:prstGeom prst="rect">
             <a:avLst/>
@@ -13271,8 +13633,8 @@
         </p:nvSpPr>
         <p:spPr>
           <a:xfrm>
-            <a:off x="9281160" y="3200400"/>
-            <a:ext cx="2286000" cy="457200"/>
+            <a:off x="9281160" y="3182112"/>
+            <a:ext cx="2286000" cy="960120"/>
           </a:xfrm>
           <a:prstGeom prst="rect">
             <a:avLst/>

</xml_diff>

<commit_message>
fix(pitch-deck): correct overlays slides 3/6/13 + fix allocation chart colors slide 8
</commit_message>
<xml_diff>
--- a/pitch-deck/SwapPilot-Professional-PitchDeck.pptx
+++ b/pitch-deck/SwapPilot-Professional-PitchDeck.pptx
@@ -122,7 +122,7 @@
 <file path=ppt/charts/chart1.xml><?xml version="1.0" encoding="utf-8"?>
 <c:chartSpace xmlns:c="http://schemas.openxmlformats.org/drawingml/2006/chart" xmlns:a="http://schemas.openxmlformats.org/drawingml/2006/main" xmlns:r="http://schemas.openxmlformats.org/officeDocument/2006/relationships">
   <c:date1904 val="0"/>
-  <c:roundedCorners val="1"/>
+  <c:roundedCorners val="0"/>
   <c:chart>
     <c:autoTitleDeleted val="1"/>
     <c:plotArea>
@@ -138,7 +138,7 @@
               <c:strCache>
                 <c:ptCount val="1"/>
                 <c:pt idx="0">
-                  <c:v/>
+                  <c:v>Allocation</c:v>
                 </c:pt>
               </c:strCache>
             </c:strRef>
@@ -163,6 +163,13 @@
               <a:solidFill>
                 <a:srgbClr val="B6FF6A"/>
               </a:solidFill>
+              <a:ln w="12700" cap="flat">
+                <a:solidFill>
+                  <a:srgbClr val="07080B"/>
+                </a:solidFill>
+                <a:prstDash val="solid"/>
+                <a:round/>
+              </a:ln>
               <a:effectLst/>
             </c:spPr>
           </c:dPt>
@@ -173,6 +180,13 @@
               <a:solidFill>
                 <a:srgbClr val="8FCC55"/>
               </a:solidFill>
+              <a:ln w="12700" cap="flat">
+                <a:solidFill>
+                  <a:srgbClr val="07080B"/>
+                </a:solidFill>
+                <a:prstDash val="solid"/>
+                <a:round/>
+              </a:ln>
               <a:effectLst/>
             </c:spPr>
           </c:dPt>
@@ -183,6 +197,13 @@
               <a:solidFill>
                 <a:srgbClr val="7DD3FC"/>
               </a:solidFill>
+              <a:ln w="12700" cap="flat">
+                <a:solidFill>
+                  <a:srgbClr val="07080B"/>
+                </a:solidFill>
+                <a:prstDash val="solid"/>
+                <a:round/>
+              </a:ln>
               <a:effectLst/>
             </c:spPr>
           </c:dPt>
@@ -193,6 +214,13 @@
               <a:solidFill>
                 <a:srgbClr val="5AAFDC"/>
               </a:solidFill>
+              <a:ln w="12700" cap="flat">
+                <a:solidFill>
+                  <a:srgbClr val="07080B"/>
+                </a:solidFill>
+                <a:prstDash val="solid"/>
+                <a:round/>
+              </a:ln>
               <a:effectLst/>
             </c:spPr>
           </c:dPt>
@@ -203,6 +231,13 @@
               <a:solidFill>
                 <a:srgbClr val="5A5A5A"/>
               </a:solidFill>
+              <a:ln w="12700" cap="flat">
+                <a:solidFill>
+                  <a:srgbClr val="07080B"/>
+                </a:solidFill>
+                <a:prstDash val="solid"/>
+                <a:round/>
+              </a:ln>
               <a:effectLst/>
             </c:spPr>
           </c:dPt>
@@ -213,6 +248,13 @@
               <a:solidFill>
                 <a:srgbClr val="4A4A4A"/>
               </a:solidFill>
+              <a:ln w="12700" cap="flat">
+                <a:solidFill>
+                  <a:srgbClr val="07080B"/>
+                </a:solidFill>
+                <a:prstDash val="solid"/>
+                <a:round/>
+              </a:ln>
               <a:effectLst/>
             </c:spPr>
           </c:dPt>
@@ -223,6 +265,13 @@
               <a:solidFill>
                 <a:srgbClr val="3A3A3A"/>
               </a:solidFill>
+              <a:ln w="12700" cap="flat">
+                <a:solidFill>
+                  <a:srgbClr val="07080B"/>
+                </a:solidFill>
+                <a:prstDash val="solid"/>
+                <a:round/>
+              </a:ln>
               <a:effectLst/>
             </c:spPr>
           </c:dPt>
@@ -485,7 +534,7 @@
           </c:val>
         </c:ser>
         <c:firstSliceAng val="0"/>
-        <c:holeSize val="70"/>
+        <c:holeSize val="65"/>
       </c:doughnutChart>
       <c:spPr>
         <a:solidFill>
@@ -3641,7 +3690,7 @@
         <p:spPr>
           <a:xfrm>
             <a:off x="457200" y="1417320"/>
-            <a:ext cx="5486400" cy="1234440"/>
+            <a:ext cx="5486400" cy="914400"/>
           </a:xfrm>
           <a:prstGeom prst="rect">
             <a:avLst/>
@@ -6906,7 +6955,7 @@
         <p:spPr>
           <a:xfrm>
             <a:off x="457200" y="1417320"/>
-            <a:ext cx="5486400" cy="1234440"/>
+            <a:ext cx="5486400" cy="914400"/>
           </a:xfrm>
           <a:prstGeom prst="rect">
             <a:avLst/>
@@ -7000,12 +7049,12 @@
         </p:nvSpPr>
         <p:spPr>
           <a:xfrm>
-            <a:off x="6400800" y="1188720"/>
-            <a:ext cx="2560320" cy="1371600"/>
+            <a:off x="5943600" y="1188720"/>
+            <a:ext cx="2651760" cy="1463040"/>
           </a:xfrm>
           <a:prstGeom prst="roundRect">
             <a:avLst>
-              <a:gd name="adj" fmla="val 8000"/>
+              <a:gd name="adj" fmla="val 7500"/>
             </a:avLst>
           </a:prstGeom>
           <a:solidFill>
@@ -7027,8 +7076,8 @@
         </p:nvSpPr>
         <p:spPr>
           <a:xfrm>
-            <a:off x="6583680" y="1325880"/>
-            <a:ext cx="2194560" cy="320040"/>
+            <a:off x="6126480" y="1325880"/>
+            <a:ext cx="2286000" cy="320040"/>
           </a:xfrm>
           <a:prstGeom prst="rect">
             <a:avLst/>
@@ -7063,8 +7112,8 @@
         </p:nvSpPr>
         <p:spPr>
           <a:xfrm>
-            <a:off x="6583680" y="1645920"/>
-            <a:ext cx="2194560" cy="731520"/>
+            <a:off x="6126480" y="1645920"/>
+            <a:ext cx="2286000" cy="822960"/>
           </a:xfrm>
           <a:prstGeom prst="rect">
             <a:avLst/>
@@ -7102,12 +7151,12 @@
         </p:nvSpPr>
         <p:spPr>
           <a:xfrm>
-            <a:off x="6400800" y="2743200"/>
-            <a:ext cx="2560320" cy="1371600"/>
+            <a:off x="5943600" y="2743200"/>
+            <a:ext cx="2651760" cy="1463040"/>
           </a:xfrm>
           <a:prstGeom prst="roundRect">
             <a:avLst>
-              <a:gd name="adj" fmla="val 8000"/>
+              <a:gd name="adj" fmla="val 7500"/>
             </a:avLst>
           </a:prstGeom>
           <a:solidFill>
@@ -7129,8 +7178,8 @@
         </p:nvSpPr>
         <p:spPr>
           <a:xfrm>
-            <a:off x="6583680" y="2880360"/>
-            <a:ext cx="2194560" cy="320040"/>
+            <a:off x="6126480" y="2880360"/>
+            <a:ext cx="2286000" cy="320040"/>
           </a:xfrm>
           <a:prstGeom prst="rect">
             <a:avLst/>
@@ -7165,8 +7214,8 @@
         </p:nvSpPr>
         <p:spPr>
           <a:xfrm>
-            <a:off x="6583680" y="3200400"/>
-            <a:ext cx="2194560" cy="731520"/>
+            <a:off x="6126480" y="3200400"/>
+            <a:ext cx="2286000" cy="822960"/>
           </a:xfrm>
           <a:prstGeom prst="rect">
             <a:avLst/>
@@ -7204,12 +7253,12 @@
         </p:nvSpPr>
         <p:spPr>
           <a:xfrm>
-            <a:off x="6400800" y="4297680"/>
-            <a:ext cx="2560320" cy="1371600"/>
+            <a:off x="5943600" y="4297680"/>
+            <a:ext cx="2651760" cy="1463040"/>
           </a:xfrm>
           <a:prstGeom prst="roundRect">
             <a:avLst>
-              <a:gd name="adj" fmla="val 8000"/>
+              <a:gd name="adj" fmla="val 7500"/>
             </a:avLst>
           </a:prstGeom>
           <a:solidFill>
@@ -7231,8 +7280,8 @@
         </p:nvSpPr>
         <p:spPr>
           <a:xfrm>
-            <a:off x="6583680" y="4434840"/>
-            <a:ext cx="2194560" cy="320040"/>
+            <a:off x="6126480" y="4434840"/>
+            <a:ext cx="2286000" cy="320040"/>
           </a:xfrm>
           <a:prstGeom prst="rect">
             <a:avLst/>
@@ -7267,8 +7316,8 @@
         </p:nvSpPr>
         <p:spPr>
           <a:xfrm>
-            <a:off x="6583680" y="4754880"/>
-            <a:ext cx="2194560" cy="731520"/>
+            <a:off x="6126480" y="4754880"/>
+            <a:ext cx="2286000" cy="822960"/>
           </a:xfrm>
           <a:prstGeom prst="rect">
             <a:avLst/>
@@ -7306,12 +7355,12 @@
         </p:nvSpPr>
         <p:spPr>
           <a:xfrm>
-            <a:off x="9144000" y="1188720"/>
-            <a:ext cx="2560320" cy="1371600"/>
+            <a:off x="8778240" y="1188720"/>
+            <a:ext cx="2651760" cy="1463040"/>
           </a:xfrm>
           <a:prstGeom prst="roundRect">
             <a:avLst>
-              <a:gd name="adj" fmla="val 8000"/>
+              <a:gd name="adj" fmla="val 7500"/>
             </a:avLst>
           </a:prstGeom>
           <a:solidFill>
@@ -7333,8 +7382,8 @@
         </p:nvSpPr>
         <p:spPr>
           <a:xfrm>
-            <a:off x="9326880" y="1325880"/>
-            <a:ext cx="2194560" cy="320040"/>
+            <a:off x="8961120" y="1325880"/>
+            <a:ext cx="2286000" cy="320040"/>
           </a:xfrm>
           <a:prstGeom prst="rect">
             <a:avLst/>
@@ -7369,8 +7418,8 @@
         </p:nvSpPr>
         <p:spPr>
           <a:xfrm>
-            <a:off x="9326880" y="1645920"/>
-            <a:ext cx="2194560" cy="731520"/>
+            <a:off x="8961120" y="1645920"/>
+            <a:ext cx="2286000" cy="822960"/>
           </a:xfrm>
           <a:prstGeom prst="rect">
             <a:avLst/>
@@ -7408,12 +7457,12 @@
         </p:nvSpPr>
         <p:spPr>
           <a:xfrm>
-            <a:off x="9144000" y="2743200"/>
-            <a:ext cx="2560320" cy="1371600"/>
+            <a:off x="8778240" y="2743200"/>
+            <a:ext cx="2651760" cy="1463040"/>
           </a:xfrm>
           <a:prstGeom prst="roundRect">
             <a:avLst>
-              <a:gd name="adj" fmla="val 8000"/>
+              <a:gd name="adj" fmla="val 7500"/>
             </a:avLst>
           </a:prstGeom>
           <a:solidFill>
@@ -7435,8 +7484,8 @@
         </p:nvSpPr>
         <p:spPr>
           <a:xfrm>
-            <a:off x="9326880" y="2880360"/>
-            <a:ext cx="2194560" cy="320040"/>
+            <a:off x="8961120" y="2880360"/>
+            <a:ext cx="2286000" cy="320040"/>
           </a:xfrm>
           <a:prstGeom prst="rect">
             <a:avLst/>
@@ -7471,8 +7520,8 @@
         </p:nvSpPr>
         <p:spPr>
           <a:xfrm>
-            <a:off x="9326880" y="3200400"/>
-            <a:ext cx="2194560" cy="731520"/>
+            <a:off x="8961120" y="3200400"/>
+            <a:ext cx="2286000" cy="822960"/>
           </a:xfrm>
           <a:prstGeom prst="rect">
             <a:avLst/>
@@ -7770,7 +7819,7 @@
         <p:spPr>
           <a:xfrm>
             <a:off x="457200" y="1417320"/>
-            <a:ext cx="5486400" cy="1234440"/>
+            <a:ext cx="5486400" cy="914400"/>
           </a:xfrm>
           <a:prstGeom prst="rect">
             <a:avLst/>
@@ -8394,7 +8443,7 @@
         <p:spPr>
           <a:xfrm>
             <a:off x="457200" y="1417320"/>
-            <a:ext cx="5486400" cy="1234440"/>
+            <a:ext cx="5486400" cy="914400"/>
           </a:xfrm>
           <a:prstGeom prst="rect">
             <a:avLst/>
@@ -8449,7 +8498,7 @@
         </p:nvSpPr>
         <p:spPr>
           <a:xfrm>
-            <a:off x="457200" y="2651760"/>
+            <a:off x="457200" y="2423160"/>
             <a:ext cx="5029200" cy="914400"/>
           </a:xfrm>
           <a:prstGeom prst="rect">
@@ -9018,7 +9067,7 @@
         <p:spPr>
           <a:xfrm>
             <a:off x="457200" y="1417320"/>
-            <a:ext cx="5486400" cy="1234440"/>
+            <a:ext cx="5486400" cy="914400"/>
           </a:xfrm>
           <a:prstGeom prst="rect">
             <a:avLst/>
@@ -9778,7 +9827,7 @@
         <p:spPr>
           <a:xfrm>
             <a:off x="457200" y="1417320"/>
-            <a:ext cx="5486400" cy="1234440"/>
+            <a:ext cx="5486400" cy="914400"/>
           </a:xfrm>
           <a:prstGeom prst="rect">
             <a:avLst/>
@@ -10504,7 +10553,7 @@
         <p:spPr>
           <a:xfrm>
             <a:off x="457200" y="1417320"/>
-            <a:ext cx="5486400" cy="1234440"/>
+            <a:ext cx="5486400" cy="914400"/>
           </a:xfrm>
           <a:prstGeom prst="rect">
             <a:avLst/>
@@ -10542,7 +10591,7 @@
         </p:nvSpPr>
         <p:spPr>
           <a:xfrm>
-            <a:off x="457200" y="2286000"/>
+            <a:off x="457200" y="2423160"/>
             <a:ext cx="5029200" cy="914400"/>
           </a:xfrm>
           <a:prstGeom prst="rect">
@@ -10581,12 +10630,12 @@
         </p:nvSpPr>
         <p:spPr>
           <a:xfrm>
-            <a:off x="457200" y="3200400"/>
-            <a:ext cx="5029200" cy="1371600"/>
+            <a:off x="457200" y="3291840"/>
+            <a:ext cx="5029200" cy="1280160"/>
           </a:xfrm>
           <a:prstGeom prst="roundRect">
             <a:avLst>
-              <a:gd name="adj" fmla="val 8000"/>
+              <a:gd name="adj" fmla="val 8571"/>
             </a:avLst>
           </a:prstGeom>
           <a:solidFill>
@@ -10608,7 +10657,7 @@
         </p:nvSpPr>
         <p:spPr>
           <a:xfrm>
-            <a:off x="640080" y="3337560"/>
+            <a:off x="640080" y="3429000"/>
             <a:ext cx="4663440" cy="320040"/>
           </a:xfrm>
           <a:prstGeom prst="rect">
@@ -10644,8 +10693,8 @@
         </p:nvSpPr>
         <p:spPr>
           <a:xfrm>
-            <a:off x="640080" y="3657600"/>
-            <a:ext cx="4663440" cy="731520"/>
+            <a:off x="640080" y="3749040"/>
+            <a:ext cx="4663440" cy="640080"/>
           </a:xfrm>
           <a:prstGeom prst="rect">
             <a:avLst/>
@@ -10683,12 +10732,12 @@
         </p:nvSpPr>
         <p:spPr>
           <a:xfrm>
-            <a:off x="6126480" y="1188720"/>
-            <a:ext cx="2743200" cy="1371600"/>
+            <a:off x="5943600" y="1188720"/>
+            <a:ext cx="2834640" cy="1463040"/>
           </a:xfrm>
           <a:prstGeom prst="roundRect">
             <a:avLst>
-              <a:gd name="adj" fmla="val 5333"/>
+              <a:gd name="adj" fmla="val 5000"/>
             </a:avLst>
           </a:prstGeom>
           <a:solidFill>
@@ -10710,8 +10759,8 @@
         </p:nvSpPr>
         <p:spPr>
           <a:xfrm>
-            <a:off x="6263640" y="1325880"/>
-            <a:ext cx="2468880" cy="228600"/>
+            <a:off x="6080760" y="1325880"/>
+            <a:ext cx="2560320" cy="228600"/>
           </a:xfrm>
           <a:prstGeom prst="rect">
             <a:avLst/>
@@ -10746,17 +10795,17 @@
         </p:nvSpPr>
         <p:spPr>
           <a:xfrm>
-            <a:off x="6263640" y="1536192"/>
-            <a:ext cx="2468880" cy="868680"/>
-          </a:xfrm>
-          <a:prstGeom prst="rect">
-            <a:avLst/>
-          </a:prstGeom>
-          <a:noFill/>
-          <a:ln/>
-        </p:spPr>
-        <p:txBody>
-          <a:bodyPr wrap="square" rtlCol="0" anchor="ctr"/>
+            <a:off x="6080760" y="1554480"/>
+            <a:ext cx="2560320" cy="960120"/>
+          </a:xfrm>
+          <a:prstGeom prst="rect">
+            <a:avLst/>
+          </a:prstGeom>
+          <a:noFill/>
+          <a:ln/>
+        </p:spPr>
+        <p:txBody>
+          <a:bodyPr wrap="square" rtlCol="0" anchor="t"/>
           <a:lstStyle/>
           <a:p>
             <a:pPr indent="0" marL="0">
@@ -10782,12 +10831,12 @@
         </p:nvSpPr>
         <p:spPr>
           <a:xfrm>
-            <a:off x="9098280" y="1188720"/>
-            <a:ext cx="2743200" cy="1371600"/>
+            <a:off x="8961120" y="1188720"/>
+            <a:ext cx="2834640" cy="1463040"/>
           </a:xfrm>
           <a:prstGeom prst="roundRect">
             <a:avLst>
-              <a:gd name="adj" fmla="val 5333"/>
+              <a:gd name="adj" fmla="val 5000"/>
             </a:avLst>
           </a:prstGeom>
           <a:solidFill>
@@ -10809,8 +10858,8 @@
         </p:nvSpPr>
         <p:spPr>
           <a:xfrm>
-            <a:off x="9235440" y="1325880"/>
-            <a:ext cx="2468880" cy="228600"/>
+            <a:off x="9098280" y="1325880"/>
+            <a:ext cx="2560320" cy="228600"/>
           </a:xfrm>
           <a:prstGeom prst="rect">
             <a:avLst/>
@@ -10845,17 +10894,17 @@
         </p:nvSpPr>
         <p:spPr>
           <a:xfrm>
-            <a:off x="9235440" y="1536192"/>
-            <a:ext cx="2468880" cy="868680"/>
-          </a:xfrm>
-          <a:prstGeom prst="rect">
-            <a:avLst/>
-          </a:prstGeom>
-          <a:noFill/>
-          <a:ln/>
-        </p:spPr>
-        <p:txBody>
-          <a:bodyPr wrap="square" rtlCol="0" anchor="ctr"/>
+            <a:off x="9098280" y="1554480"/>
+            <a:ext cx="2560320" cy="960120"/>
+          </a:xfrm>
+          <a:prstGeom prst="rect">
+            <a:avLst/>
+          </a:prstGeom>
+          <a:noFill/>
+          <a:ln/>
+        </p:spPr>
+        <p:txBody>
+          <a:bodyPr wrap="square" rtlCol="0" anchor="t"/>
           <a:lstStyle/>
           <a:p>
             <a:pPr indent="0" marL="0">
@@ -10881,12 +10930,12 @@
         </p:nvSpPr>
         <p:spPr>
           <a:xfrm>
-            <a:off x="6126480" y="2743200"/>
-            <a:ext cx="2743200" cy="1371600"/>
+            <a:off x="5943600" y="2834640"/>
+            <a:ext cx="2834640" cy="1463040"/>
           </a:xfrm>
           <a:prstGeom prst="roundRect">
             <a:avLst>
-              <a:gd name="adj" fmla="val 5333"/>
+              <a:gd name="adj" fmla="val 5000"/>
             </a:avLst>
           </a:prstGeom>
           <a:solidFill>
@@ -10908,8 +10957,8 @@
         </p:nvSpPr>
         <p:spPr>
           <a:xfrm>
-            <a:off x="6263640" y="2880360"/>
-            <a:ext cx="2468880" cy="228600"/>
+            <a:off x="6080760" y="2971800"/>
+            <a:ext cx="2560320" cy="228600"/>
           </a:xfrm>
           <a:prstGeom prst="rect">
             <a:avLst/>
@@ -10944,17 +10993,17 @@
         </p:nvSpPr>
         <p:spPr>
           <a:xfrm>
-            <a:off x="6263640" y="3090672"/>
-            <a:ext cx="2468880" cy="868680"/>
-          </a:xfrm>
-          <a:prstGeom prst="rect">
-            <a:avLst/>
-          </a:prstGeom>
-          <a:noFill/>
-          <a:ln/>
-        </p:spPr>
-        <p:txBody>
-          <a:bodyPr wrap="square" rtlCol="0" anchor="ctr"/>
+            <a:off x="6080760" y="3200400"/>
+            <a:ext cx="2560320" cy="960120"/>
+          </a:xfrm>
+          <a:prstGeom prst="rect">
+            <a:avLst/>
+          </a:prstGeom>
+          <a:noFill/>
+          <a:ln/>
+        </p:spPr>
+        <p:txBody>
+          <a:bodyPr wrap="square" rtlCol="0" anchor="t"/>
           <a:lstStyle/>
           <a:p>
             <a:pPr indent="0" marL="0">
@@ -10980,12 +11029,12 @@
         </p:nvSpPr>
         <p:spPr>
           <a:xfrm>
-            <a:off x="9098280" y="2743200"/>
-            <a:ext cx="2743200" cy="1371600"/>
+            <a:off x="8961120" y="2834640"/>
+            <a:ext cx="2834640" cy="1463040"/>
           </a:xfrm>
           <a:prstGeom prst="roundRect">
             <a:avLst>
-              <a:gd name="adj" fmla="val 5333"/>
+              <a:gd name="adj" fmla="val 5000"/>
             </a:avLst>
           </a:prstGeom>
           <a:solidFill>
@@ -11007,8 +11056,8 @@
         </p:nvSpPr>
         <p:spPr>
           <a:xfrm>
-            <a:off x="9235440" y="2880360"/>
-            <a:ext cx="2468880" cy="228600"/>
+            <a:off x="9098280" y="2971800"/>
+            <a:ext cx="2560320" cy="228600"/>
           </a:xfrm>
           <a:prstGeom prst="rect">
             <a:avLst/>
@@ -11043,17 +11092,17 @@
         </p:nvSpPr>
         <p:spPr>
           <a:xfrm>
-            <a:off x="9235440" y="3090672"/>
-            <a:ext cx="2468880" cy="868680"/>
-          </a:xfrm>
-          <a:prstGeom prst="rect">
-            <a:avLst/>
-          </a:prstGeom>
-          <a:noFill/>
-          <a:ln/>
-        </p:spPr>
-        <p:txBody>
-          <a:bodyPr wrap="square" rtlCol="0" anchor="ctr"/>
+            <a:off x="9098280" y="3200400"/>
+            <a:ext cx="2560320" cy="960120"/>
+          </a:xfrm>
+          <a:prstGeom prst="rect">
+            <a:avLst/>
+          </a:prstGeom>
+          <a:noFill/>
+          <a:ln/>
+        </p:spPr>
+        <p:txBody>
+          <a:bodyPr wrap="square" rtlCol="0" anchor="t"/>
           <a:lstStyle/>
           <a:p>
             <a:pPr indent="0" marL="0">
@@ -11079,12 +11128,12 @@
         </p:nvSpPr>
         <p:spPr>
           <a:xfrm>
-            <a:off x="6126480" y="4297680"/>
-            <a:ext cx="2743200" cy="1371600"/>
+            <a:off x="5943600" y="4480560"/>
+            <a:ext cx="2834640" cy="1463040"/>
           </a:xfrm>
           <a:prstGeom prst="roundRect">
             <a:avLst>
-              <a:gd name="adj" fmla="val 5333"/>
+              <a:gd name="adj" fmla="val 5000"/>
             </a:avLst>
           </a:prstGeom>
           <a:solidFill>
@@ -11106,8 +11155,8 @@
         </p:nvSpPr>
         <p:spPr>
           <a:xfrm>
-            <a:off x="6263640" y="4434840"/>
-            <a:ext cx="2468880" cy="228600"/>
+            <a:off x="6080760" y="4617720"/>
+            <a:ext cx="2560320" cy="228600"/>
           </a:xfrm>
           <a:prstGeom prst="rect">
             <a:avLst/>
@@ -11142,17 +11191,17 @@
         </p:nvSpPr>
         <p:spPr>
           <a:xfrm>
-            <a:off x="6263640" y="4645152"/>
-            <a:ext cx="2468880" cy="868680"/>
-          </a:xfrm>
-          <a:prstGeom prst="rect">
-            <a:avLst/>
-          </a:prstGeom>
-          <a:noFill/>
-          <a:ln/>
-        </p:spPr>
-        <p:txBody>
-          <a:bodyPr wrap="square" rtlCol="0" anchor="ctr"/>
+            <a:off x="6080760" y="4846320"/>
+            <a:ext cx="2560320" cy="960120"/>
+          </a:xfrm>
+          <a:prstGeom prst="rect">
+            <a:avLst/>
+          </a:prstGeom>
+          <a:noFill/>
+          <a:ln/>
+        </p:spPr>
+        <p:txBody>
+          <a:bodyPr wrap="square" rtlCol="0" anchor="t"/>
           <a:lstStyle/>
           <a:p>
             <a:pPr indent="0" marL="0">
@@ -11178,12 +11227,12 @@
         </p:nvSpPr>
         <p:spPr>
           <a:xfrm>
-            <a:off x="9098280" y="4297680"/>
-            <a:ext cx="2743200" cy="1371600"/>
+            <a:off x="8961120" y="4480560"/>
+            <a:ext cx="2834640" cy="1463040"/>
           </a:xfrm>
           <a:prstGeom prst="roundRect">
             <a:avLst>
-              <a:gd name="adj" fmla="val 5333"/>
+              <a:gd name="adj" fmla="val 5000"/>
             </a:avLst>
           </a:prstGeom>
           <a:solidFill>
@@ -11205,8 +11254,8 @@
         </p:nvSpPr>
         <p:spPr>
           <a:xfrm>
-            <a:off x="9235440" y="4434840"/>
-            <a:ext cx="2468880" cy="228600"/>
+            <a:off x="9098280" y="4617720"/>
+            <a:ext cx="2560320" cy="228600"/>
           </a:xfrm>
           <a:prstGeom prst="rect">
             <a:avLst/>
@@ -11241,17 +11290,17 @@
         </p:nvSpPr>
         <p:spPr>
           <a:xfrm>
-            <a:off x="9235440" y="4645152"/>
-            <a:ext cx="2468880" cy="868680"/>
-          </a:xfrm>
-          <a:prstGeom prst="rect">
-            <a:avLst/>
-          </a:prstGeom>
-          <a:noFill/>
-          <a:ln/>
-        </p:spPr>
-        <p:txBody>
-          <a:bodyPr wrap="square" rtlCol="0" anchor="ctr"/>
+            <a:off x="9098280" y="4846320"/>
+            <a:ext cx="2560320" cy="960120"/>
+          </a:xfrm>
+          <a:prstGeom prst="rect">
+            <a:avLst/>
+          </a:prstGeom>
+          <a:noFill/>
+          <a:ln/>
+        </p:spPr>
+        <p:txBody>
+          <a:bodyPr wrap="square" rtlCol="0" anchor="t"/>
           <a:lstStyle/>
           <a:p>
             <a:pPr indent="0" marL="0">
@@ -11501,7 +11550,7 @@
         <p:spPr>
           <a:xfrm>
             <a:off x="457200" y="1417320"/>
-            <a:ext cx="5486400" cy="1234440"/>
+            <a:ext cx="5486400" cy="914400"/>
           </a:xfrm>
           <a:prstGeom prst="rect">
             <a:avLst/>
@@ -12125,7 +12174,7 @@
         <p:spPr>
           <a:xfrm>
             <a:off x="457200" y="1417320"/>
-            <a:ext cx="5486400" cy="1234440"/>
+            <a:ext cx="5486400" cy="914400"/>
           </a:xfrm>
           <a:prstGeom prst="rect">
             <a:avLst/>
@@ -12162,8 +12211,8 @@
           <p:nvPr/>
         </p:nvGraphicFramePr>
         <p:xfrm>
-          <a:off x="777240" y="1965960"/>
-          <a:ext cx="3657600" cy="3657600"/>
+          <a:off x="457200" y="1828800"/>
+          <a:ext cx="4114800" cy="4114800"/>
         </p:xfrm>
         <a:graphic xmlns:a="http://schemas.openxmlformats.org/drawingml/2006/main">
           <a:graphicData uri="http://schemas.openxmlformats.org/drawingml/2006/chart">
@@ -12179,8 +12228,8 @@
         </p:nvSpPr>
         <p:spPr>
           <a:xfrm>
-            <a:off x="777240" y="3246120"/>
-            <a:ext cx="3657600" cy="457200"/>
+            <a:off x="457200" y="3383280"/>
+            <a:ext cx="4114800" cy="548640"/>
           </a:xfrm>
           <a:prstGeom prst="rect">
             <a:avLst/>
@@ -12196,14 +12245,14 @@
               <a:buNone/>
             </a:pPr>
             <a:r>
-              <a:rPr lang="en-US" sz="3400" b="1" dirty="0">
+              <a:rPr lang="en-US" sz="3600" b="1" dirty="0">
                 <a:solidFill>
                   <a:srgbClr val="FFFFFF"/>
                 </a:solidFill>
               </a:rPr>
               <a:t>1B</a:t>
             </a:r>
-            <a:endParaRPr lang="en-US" sz="3400" dirty="0"/>
+            <a:endParaRPr lang="en-US" sz="3600" dirty="0"/>
           </a:p>
         </p:txBody>
       </p:sp>
@@ -12215,8 +12264,8 @@
         </p:nvSpPr>
         <p:spPr>
           <a:xfrm>
-            <a:off x="777240" y="3703320"/>
-            <a:ext cx="3657600" cy="274320"/>
+            <a:off x="457200" y="3886200"/>
+            <a:ext cx="4114800" cy="320040"/>
           </a:xfrm>
           <a:prstGeom prst="rect">
             <a:avLst/>
@@ -12251,8 +12300,8 @@
         </p:nvSpPr>
         <p:spPr>
           <a:xfrm>
-            <a:off x="457200" y="5120640"/>
-            <a:ext cx="4114800" cy="274320"/>
+            <a:off x="274320" y="6035040"/>
+            <a:ext cx="4572000" cy="274320"/>
           </a:xfrm>
           <a:prstGeom prst="rect">
             <a:avLst/>
@@ -12268,14 +12317,14 @@
               <a:buNone/>
             </a:pPr>
             <a:r>
-              <a:rPr lang="en-US" sz="1200" dirty="0">
+              <a:rPr lang="en-US" sz="1100" dirty="0">
                 <a:solidFill>
                   <a:srgbClr val="A0A0A0"/>
                 </a:solidFill>
               </a:rPr>
               <a:t>Fixed supply · No inflation · No mint function</a:t>
             </a:r>
-            <a:endParaRPr lang="en-US" sz="1200" dirty="0"/>
+            <a:endParaRPr lang="en-US" sz="1100" dirty="0"/>
           </a:p>
         </p:txBody>
       </p:sp>
@@ -13196,7 +13245,7 @@
         <p:spPr>
           <a:xfrm>
             <a:off x="457200" y="1417320"/>
-            <a:ext cx="5486400" cy="1234440"/>
+            <a:ext cx="5486400" cy="914400"/>
           </a:xfrm>
           <a:prstGeom prst="rect">
             <a:avLst/>
@@ -13336,7 +13385,7 @@
         </p:nvSpPr>
         <p:spPr>
           <a:xfrm>
-            <a:off x="6537960" y="1536192"/>
+            <a:off x="6537960" y="1554480"/>
             <a:ext cx="2286000" cy="960120"/>
           </a:xfrm>
           <a:prstGeom prst="rect">
@@ -13346,21 +13395,21 @@
           <a:ln/>
         </p:spPr>
         <p:txBody>
-          <a:bodyPr wrap="square" rtlCol="0" anchor="ctr"/>
-          <a:lstStyle/>
-          <a:p>
-            <a:pPr indent="0" marL="0">
-              <a:buNone/>
-            </a:pPr>
-            <a:r>
-              <a:rPr lang="en-US" sz="2200" b="1" dirty="0">
+          <a:bodyPr wrap="square" rtlCol="0" anchor="t"/>
+          <a:lstStyle/>
+          <a:p>
+            <a:pPr indent="0" marL="0">
+              <a:buNone/>
+            </a:pPr>
+            <a:r>
+              <a:rPr lang="en-US" sz="1800" b="1" dirty="0">
                 <a:solidFill>
                   <a:srgbClr val="FFFFFF"/>
                 </a:solidFill>
               </a:rPr>
               <a:t>1,000,000,000</a:t>
             </a:r>
-            <a:endParaRPr lang="en-US" sz="2200" dirty="0"/>
+            <a:endParaRPr lang="en-US" sz="1800" dirty="0"/>
           </a:p>
         </p:txBody>
       </p:sp>
@@ -13435,7 +13484,7 @@
         </p:nvSpPr>
         <p:spPr>
           <a:xfrm>
-            <a:off x="9281160" y="1536192"/>
+            <a:off x="9281160" y="1554480"/>
             <a:ext cx="2286000" cy="960120"/>
           </a:xfrm>
           <a:prstGeom prst="rect">
@@ -13445,21 +13494,21 @@
           <a:ln/>
         </p:spPr>
         <p:txBody>
-          <a:bodyPr wrap="square" rtlCol="0" anchor="ctr"/>
-          <a:lstStyle/>
-          <a:p>
-            <a:pPr indent="0" marL="0">
-              <a:buNone/>
-            </a:pPr>
-            <a:r>
-              <a:rPr lang="en-US" sz="2200" b="1" dirty="0">
+          <a:bodyPr wrap="square" rtlCol="0" anchor="t"/>
+          <a:lstStyle/>
+          <a:p>
+            <a:pPr indent="0" marL="0">
+              <a:buNone/>
+            </a:pPr>
+            <a:r>
+              <a:rPr lang="en-US" sz="1800" b="1" dirty="0">
                 <a:solidFill>
                   <a:srgbClr val="FFFFFF"/>
                 </a:solidFill>
               </a:rPr>
               <a:t>$0.0057</a:t>
             </a:r>
-            <a:endParaRPr lang="en-US" sz="2200" dirty="0"/>
+            <a:endParaRPr lang="en-US" sz="1800" dirty="0"/>
           </a:p>
         </p:txBody>
       </p:sp>
@@ -13534,7 +13583,7 @@
         </p:nvSpPr>
         <p:spPr>
           <a:xfrm>
-            <a:off x="6537960" y="3182112"/>
+            <a:off x="6537960" y="3200400"/>
             <a:ext cx="2286000" cy="960120"/>
           </a:xfrm>
           <a:prstGeom prst="rect">
@@ -13544,21 +13593,21 @@
           <a:ln/>
         </p:spPr>
         <p:txBody>
-          <a:bodyPr wrap="square" rtlCol="0" anchor="ctr"/>
-          <a:lstStyle/>
-          <a:p>
-            <a:pPr indent="0" marL="0">
-              <a:buNone/>
-            </a:pPr>
-            <a:r>
-              <a:rPr lang="en-US" sz="2200" b="1" dirty="0">
+          <a:bodyPr wrap="square" rtlCol="0" anchor="t"/>
+          <a:lstStyle/>
+          <a:p>
+            <a:pPr indent="0" marL="0">
+              <a:buNone/>
+            </a:pPr>
+            <a:r>
+              <a:rPr lang="en-US" sz="1800" b="1" dirty="0">
                 <a:solidFill>
                   <a:srgbClr val="FFFFFF"/>
                 </a:solidFill>
               </a:rPr>
               <a:t>$5.7M</a:t>
             </a:r>
-            <a:endParaRPr lang="en-US" sz="2200" dirty="0"/>
+            <a:endParaRPr lang="en-US" sz="1800" dirty="0"/>
           </a:p>
         </p:txBody>
       </p:sp>
@@ -13633,7 +13682,7 @@
         </p:nvSpPr>
         <p:spPr>
           <a:xfrm>
-            <a:off x="9281160" y="3182112"/>
+            <a:off x="9281160" y="3200400"/>
             <a:ext cx="2286000" cy="960120"/>
           </a:xfrm>
           <a:prstGeom prst="rect">
@@ -13643,21 +13692,21 @@
           <a:ln/>
         </p:spPr>
         <p:txBody>
-          <a:bodyPr wrap="square" rtlCol="0" anchor="ctr"/>
-          <a:lstStyle/>
-          <a:p>
-            <a:pPr indent="0" marL="0">
-              <a:buNone/>
-            </a:pPr>
-            <a:r>
-              <a:rPr lang="en-US" sz="2200" b="1" dirty="0">
+          <a:bodyPr wrap="square" rtlCol="0" anchor="t"/>
+          <a:lstStyle/>
+          <a:p>
+            <a:pPr indent="0" marL="0">
+              <a:buNone/>
+            </a:pPr>
+            <a:r>
+              <a:rPr lang="en-US" sz="1800" b="1" dirty="0">
                 <a:solidFill>
                   <a:srgbClr val="FFFFFF"/>
                 </a:solidFill>
               </a:rPr>
               <a:t>$966K</a:t>
             </a:r>
-            <a:endParaRPr lang="en-US" sz="2200" dirty="0"/>
+            <a:endParaRPr lang="en-US" sz="1800" dirty="0"/>
           </a:p>
         </p:txBody>
       </p:sp>

</xml_diff>

<commit_message>
fix(pitch-deck): slide 3 - move title down to avoid kicker overlay
</commit_message>
<xml_diff>
--- a/pitch-deck/SwapPilot-Professional-PitchDeck.pptx
+++ b/pitch-deck/SwapPilot-Professional-PitchDeck.pptx
@@ -8442,7 +8442,7 @@
         </p:nvSpPr>
         <p:spPr>
           <a:xfrm>
-            <a:off x="457200" y="1417320"/>
+            <a:off x="457200" y="1463040"/>
             <a:ext cx="5486400" cy="914400"/>
           </a:xfrm>
           <a:prstGeom prst="rect">
@@ -8498,7 +8498,7 @@
         </p:nvSpPr>
         <p:spPr>
           <a:xfrm>
-            <a:off x="457200" y="2743200"/>
+            <a:off x="457200" y="2834640"/>
             <a:ext cx="5029200" cy="914400"/>
           </a:xfrm>
           <a:prstGeom prst="rect">

</xml_diff>

<commit_message>
fix(pitch-deck): slide 3 - increase spacing between kicker and title
</commit_message>
<xml_diff>
--- a/pitch-deck/SwapPilot-Professional-PitchDeck.pptx
+++ b/pitch-deck/SwapPilot-Professional-PitchDeck.pptx
@@ -8442,7 +8442,7 @@
         </p:nvSpPr>
         <p:spPr>
           <a:xfrm>
-            <a:off x="457200" y="1463040"/>
+            <a:off x="457200" y="1645920"/>
             <a:ext cx="5486400" cy="914400"/>
           </a:xfrm>
           <a:prstGeom prst="rect">
@@ -8498,7 +8498,7 @@
         </p:nvSpPr>
         <p:spPr>
           <a:xfrm>
-            <a:off x="457200" y="2834640"/>
+            <a:off x="457200" y="3108960"/>
             <a:ext cx="5029200" cy="914400"/>
           </a:xfrm>
           <a:prstGeom prst="rect">

</xml_diff>

<commit_message>
fix(pitch-deck): slide 8 - align chart colors with legend, fix title overlay, improve contrast
</commit_message>
<xml_diff>
--- a/pitch-deck/SwapPilot-Professional-PitchDeck.pptx
+++ b/pitch-deck/SwapPilot-Professional-PitchDeck.pptx
@@ -161,9 +161,9 @@
             <c:bubble3D val="0"/>
             <c:spPr>
               <a:solidFill>
-                <a:srgbClr val="B6FF6A"/>
+                <a:srgbClr val="9AE66E"/>
               </a:solidFill>
-              <a:ln w="12700" cap="flat">
+              <a:ln w="25400" cap="flat">
                 <a:solidFill>
                   <a:srgbClr val="07080B"/>
                 </a:solidFill>
@@ -178,9 +178,9 @@
             <c:bubble3D val="0"/>
             <c:spPr>
               <a:solidFill>
-                <a:srgbClr val="8FCC55"/>
+                <a:srgbClr val="4CAF50"/>
               </a:solidFill>
-              <a:ln w="12700" cap="flat">
+              <a:ln w="25400" cap="flat">
                 <a:solidFill>
                   <a:srgbClr val="07080B"/>
                 </a:solidFill>
@@ -195,9 +195,9 @@
             <c:bubble3D val="0"/>
             <c:spPr>
               <a:solidFill>
-                <a:srgbClr val="7DD3FC"/>
+                <a:srgbClr val="42A5F5"/>
               </a:solidFill>
-              <a:ln w="12700" cap="flat">
+              <a:ln w="25400" cap="flat">
                 <a:solidFill>
                   <a:srgbClr val="07080B"/>
                 </a:solidFill>
@@ -212,9 +212,9 @@
             <c:bubble3D val="0"/>
             <c:spPr>
               <a:solidFill>
-                <a:srgbClr val="5AAFDC"/>
+                <a:srgbClr val="64B5F6"/>
               </a:solidFill>
-              <a:ln w="12700" cap="flat">
+              <a:ln w="25400" cap="flat">
                 <a:solidFill>
                   <a:srgbClr val="07080B"/>
                 </a:solidFill>
@@ -229,9 +229,9 @@
             <c:bubble3D val="0"/>
             <c:spPr>
               <a:solidFill>
-                <a:srgbClr val="5A5A5A"/>
+                <a:srgbClr val="78909C"/>
               </a:solidFill>
-              <a:ln w="12700" cap="flat">
+              <a:ln w="25400" cap="flat">
                 <a:solidFill>
                   <a:srgbClr val="07080B"/>
                 </a:solidFill>
@@ -246,9 +246,9 @@
             <c:bubble3D val="0"/>
             <c:spPr>
               <a:solidFill>
-                <a:srgbClr val="4A4A4A"/>
+                <a:srgbClr val="90A4AE"/>
               </a:solidFill>
-              <a:ln w="12700" cap="flat">
+              <a:ln w="25400" cap="flat">
                 <a:solidFill>
                   <a:srgbClr val="07080B"/>
                 </a:solidFill>
@@ -263,9 +263,9 @@
             <c:bubble3D val="0"/>
             <c:spPr>
               <a:solidFill>
-                <a:srgbClr val="3A3A3A"/>
+                <a:srgbClr val="B0BEC5"/>
               </a:solidFill>
-              <a:ln w="12700" cap="flat">
+              <a:ln w="25400" cap="flat">
                 <a:solidFill>
                   <a:srgbClr val="07080B"/>
                 </a:solidFill>
@@ -534,7 +534,7 @@
           </c:val>
         </c:ser>
         <c:firstSliceAng val="0"/>
-        <c:holeSize val="65"/>
+        <c:holeSize val="60"/>
       </c:doughnutChart>
       <c:spPr>
         <a:solidFill>
@@ -12173,7 +12173,7 @@
         </p:nvSpPr>
         <p:spPr>
           <a:xfrm>
-            <a:off x="457200" y="1417320"/>
+            <a:off x="457200" y="1645920"/>
             <a:ext cx="5486400" cy="914400"/>
           </a:xfrm>
           <a:prstGeom prst="rect">
@@ -12211,8 +12211,8 @@
           <p:nvPr/>
         </p:nvGraphicFramePr>
         <p:xfrm>
-          <a:off x="457200" y="1828800"/>
-          <a:ext cx="4114800" cy="4114800"/>
+          <a:off x="457200" y="2194560"/>
+          <a:ext cx="3840480" cy="3840480"/>
         </p:xfrm>
         <a:graphic xmlns:a="http://schemas.openxmlformats.org/drawingml/2006/main">
           <a:graphicData uri="http://schemas.openxmlformats.org/drawingml/2006/chart">
@@ -12228,8 +12228,8 @@
         </p:nvSpPr>
         <p:spPr>
           <a:xfrm>
-            <a:off x="457200" y="3383280"/>
-            <a:ext cx="4114800" cy="548640"/>
+            <a:off x="457200" y="3657600"/>
+            <a:ext cx="3840480" cy="548640"/>
           </a:xfrm>
           <a:prstGeom prst="rect">
             <a:avLst/>
@@ -12264,8 +12264,8 @@
         </p:nvSpPr>
         <p:spPr>
           <a:xfrm>
-            <a:off x="457200" y="3886200"/>
-            <a:ext cx="4114800" cy="320040"/>
+            <a:off x="457200" y="4160520"/>
+            <a:ext cx="3840480" cy="320040"/>
           </a:xfrm>
           <a:prstGeom prst="rect">
             <a:avLst/>
@@ -12300,8 +12300,8 @@
         </p:nvSpPr>
         <p:spPr>
           <a:xfrm>
-            <a:off x="274320" y="6035040"/>
-            <a:ext cx="4572000" cy="274320"/>
+            <a:off x="274320" y="6126480"/>
+            <a:ext cx="4206240" cy="274320"/>
           </a:xfrm>
           <a:prstGeom prst="rect">
             <a:avLst/>
@@ -12336,12 +12336,12 @@
         </p:nvSpPr>
         <p:spPr>
           <a:xfrm>
-            <a:off x="5943600" y="1188720"/>
-            <a:ext cx="5760720" cy="5029200"/>
+            <a:off x="5303520" y="1463040"/>
+            <a:ext cx="6400800" cy="4754880"/>
           </a:xfrm>
           <a:prstGeom prst="roundRect">
             <a:avLst>
-              <a:gd name="adj" fmla="val 2727"/>
+              <a:gd name="adj" fmla="val 2885"/>
             </a:avLst>
           </a:prstGeom>
           <a:solidFill>
@@ -12363,16 +12363,16 @@
         </p:nvSpPr>
         <p:spPr>
           <a:xfrm>
-            <a:off x="6217920" y="1600200"/>
-            <a:ext cx="164592" cy="164592"/>
+            <a:off x="5577840" y="1901952"/>
+            <a:ext cx="256032" cy="256032"/>
           </a:xfrm>
           <a:prstGeom prst="roundRect">
             <a:avLst>
-              <a:gd name="adj" fmla="val 22222"/>
+              <a:gd name="adj" fmla="val 17857"/>
             </a:avLst>
           </a:prstGeom>
           <a:solidFill>
-            <a:srgbClr val="B6FF6A"/>
+            <a:srgbClr val="9AE66E"/>
           </a:solidFill>
           <a:ln/>
         </p:spPr>
@@ -12385,31 +12385,31 @@
         </p:nvSpPr>
         <p:spPr>
           <a:xfrm>
-            <a:off x="6473952" y="1554480"/>
-            <a:ext cx="1645920" cy="256032"/>
-          </a:xfrm>
-          <a:prstGeom prst="rect">
-            <a:avLst/>
-          </a:prstGeom>
-          <a:noFill/>
-          <a:ln/>
-        </p:spPr>
-        <p:txBody>
-          <a:bodyPr wrap="square" rtlCol="0" anchor="ctr"/>
-          <a:lstStyle/>
-          <a:p>
-            <a:pPr indent="0" marL="0">
-              <a:buNone/>
-            </a:pPr>
-            <a:r>
-              <a:rPr lang="en-US" sz="1200" dirty="0">
+            <a:off x="5943600" y="1828800"/>
+            <a:ext cx="3200400" cy="365760"/>
+          </a:xfrm>
+          <a:prstGeom prst="rect">
+            <a:avLst/>
+          </a:prstGeom>
+          <a:noFill/>
+          <a:ln/>
+        </p:spPr>
+        <p:txBody>
+          <a:bodyPr wrap="square" rtlCol="0" anchor="ctr"/>
+          <a:lstStyle/>
+          <a:p>
+            <a:pPr indent="0" marL="0">
+              <a:buNone/>
+            </a:pPr>
+            <a:r>
+              <a:rPr lang="en-US" sz="1400" dirty="0">
                 <a:solidFill>
                   <a:srgbClr val="FFFFFF"/>
                 </a:solidFill>
               </a:rPr>
               <a:t>Public Sale</a:t>
             </a:r>
-            <a:endParaRPr lang="en-US" sz="1200" dirty="0"/>
+            <a:endParaRPr lang="en-US" sz="1400" dirty="0"/>
           </a:p>
         </p:txBody>
       </p:sp>
@@ -12421,8 +12421,8 @@
         </p:nvSpPr>
         <p:spPr>
           <a:xfrm>
-            <a:off x="8138160" y="1554480"/>
-            <a:ext cx="457200" cy="256032"/>
+            <a:off x="9601200" y="1828800"/>
+            <a:ext cx="1645920" cy="365760"/>
           </a:xfrm>
           <a:prstGeom prst="rect">
             <a:avLst/>
@@ -12438,14 +12438,14 @@
               <a:buNone/>
             </a:pPr>
             <a:r>
-              <a:rPr lang="en-US" sz="1200" b="1" dirty="0">
+              <a:rPr lang="en-US" sz="1400" b="1" dirty="0">
                 <a:solidFill>
                   <a:srgbClr val="FFFFFF"/>
                 </a:solidFill>
               </a:rPr>
               <a:t>35%</a:t>
             </a:r>
-            <a:endParaRPr lang="en-US" sz="1200" dirty="0"/>
+            <a:endParaRPr lang="en-US" sz="1400" dirty="0"/>
           </a:p>
         </p:txBody>
       </p:sp>
@@ -12457,16 +12457,16 @@
         </p:nvSpPr>
         <p:spPr>
           <a:xfrm>
-            <a:off x="6217920" y="2240280"/>
-            <a:ext cx="164592" cy="164592"/>
+            <a:off x="5577840" y="2496312"/>
+            <a:ext cx="256032" cy="256032"/>
           </a:xfrm>
           <a:prstGeom prst="roundRect">
             <a:avLst>
-              <a:gd name="adj" fmla="val 22222"/>
+              <a:gd name="adj" fmla="val 17857"/>
             </a:avLst>
           </a:prstGeom>
           <a:solidFill>
-            <a:srgbClr val="8FCC55"/>
+            <a:srgbClr val="4CAF50"/>
           </a:solidFill>
           <a:ln/>
         </p:spPr>
@@ -12479,31 +12479,31 @@
         </p:nvSpPr>
         <p:spPr>
           <a:xfrm>
-            <a:off x="6473952" y="2194560"/>
-            <a:ext cx="1645920" cy="256032"/>
-          </a:xfrm>
-          <a:prstGeom prst="rect">
-            <a:avLst/>
-          </a:prstGeom>
-          <a:noFill/>
-          <a:ln/>
-        </p:spPr>
-        <p:txBody>
-          <a:bodyPr wrap="square" rtlCol="0" anchor="ctr"/>
-          <a:lstStyle/>
-          <a:p>
-            <a:pPr indent="0" marL="0">
-              <a:buNone/>
-            </a:pPr>
-            <a:r>
-              <a:rPr lang="en-US" sz="1200" dirty="0">
+            <a:off x="5943600" y="2423160"/>
+            <a:ext cx="3200400" cy="365760"/>
+          </a:xfrm>
+          <a:prstGeom prst="rect">
+            <a:avLst/>
+          </a:prstGeom>
+          <a:noFill/>
+          <a:ln/>
+        </p:spPr>
+        <p:txBody>
+          <a:bodyPr wrap="square" rtlCol="0" anchor="ctr"/>
+          <a:lstStyle/>
+          <a:p>
+            <a:pPr indent="0" marL="0">
+              <a:buNone/>
+            </a:pPr>
+            <a:r>
+              <a:rPr lang="en-US" sz="1400" dirty="0">
                 <a:solidFill>
                   <a:srgbClr val="FFFFFF"/>
                 </a:solidFill>
               </a:rPr>
               <a:t>Treasury</a:t>
             </a:r>
-            <a:endParaRPr lang="en-US" sz="1200" dirty="0"/>
+            <a:endParaRPr lang="en-US" sz="1400" dirty="0"/>
           </a:p>
         </p:txBody>
       </p:sp>
@@ -12515,8 +12515,8 @@
         </p:nvSpPr>
         <p:spPr>
           <a:xfrm>
-            <a:off x="8138160" y="2194560"/>
-            <a:ext cx="457200" cy="256032"/>
+            <a:off x="9601200" y="2423160"/>
+            <a:ext cx="1645920" cy="365760"/>
           </a:xfrm>
           <a:prstGeom prst="rect">
             <a:avLst/>
@@ -12532,14 +12532,14 @@
               <a:buNone/>
             </a:pPr>
             <a:r>
-              <a:rPr lang="en-US" sz="1200" b="1" dirty="0">
+              <a:rPr lang="en-US" sz="1400" b="1" dirty="0">
                 <a:solidFill>
                   <a:srgbClr val="FFFFFF"/>
                 </a:solidFill>
               </a:rPr>
               <a:t>20%</a:t>
             </a:r>
-            <a:endParaRPr lang="en-US" sz="1200" dirty="0"/>
+            <a:endParaRPr lang="en-US" sz="1400" dirty="0"/>
           </a:p>
         </p:txBody>
       </p:sp>
@@ -12551,16 +12551,16 @@
         </p:nvSpPr>
         <p:spPr>
           <a:xfrm>
-            <a:off x="6217920" y="2880360"/>
-            <a:ext cx="164592" cy="164592"/>
+            <a:off x="5577840" y="3090672"/>
+            <a:ext cx="256032" cy="256032"/>
           </a:xfrm>
           <a:prstGeom prst="roundRect">
             <a:avLst>
-              <a:gd name="adj" fmla="val 22222"/>
+              <a:gd name="adj" fmla="val 17857"/>
             </a:avLst>
           </a:prstGeom>
           <a:solidFill>
-            <a:srgbClr val="7DD3FC"/>
+            <a:srgbClr val="42A5F5"/>
           </a:solidFill>
           <a:ln/>
         </p:spPr>
@@ -12573,31 +12573,31 @@
         </p:nvSpPr>
         <p:spPr>
           <a:xfrm>
-            <a:off x="6473952" y="2834640"/>
-            <a:ext cx="1645920" cy="256032"/>
-          </a:xfrm>
-          <a:prstGeom prst="rect">
-            <a:avLst/>
-          </a:prstGeom>
-          <a:noFill/>
-          <a:ln/>
-        </p:spPr>
-        <p:txBody>
-          <a:bodyPr wrap="square" rtlCol="0" anchor="ctr"/>
-          <a:lstStyle/>
-          <a:p>
-            <a:pPr indent="0" marL="0">
-              <a:buNone/>
-            </a:pPr>
-            <a:r>
-              <a:rPr lang="en-US" sz="1200" dirty="0">
+            <a:off x="5943600" y="3017520"/>
+            <a:ext cx="3200400" cy="365760"/>
+          </a:xfrm>
+          <a:prstGeom prst="rect">
+            <a:avLst/>
+          </a:prstGeom>
+          <a:noFill/>
+          <a:ln/>
+        </p:spPr>
+        <p:txBody>
+          <a:bodyPr wrap="square" rtlCol="0" anchor="ctr"/>
+          <a:lstStyle/>
+          <a:p>
+            <a:pPr indent="0" marL="0">
+              <a:buNone/>
+            </a:pPr>
+            <a:r>
+              <a:rPr lang="en-US" sz="1400" dirty="0">
                 <a:solidFill>
                   <a:srgbClr val="FFFFFF"/>
                 </a:solidFill>
               </a:rPr>
               <a:t>CEX &amp; Marketing</a:t>
             </a:r>
-            <a:endParaRPr lang="en-US" sz="1200" dirty="0"/>
+            <a:endParaRPr lang="en-US" sz="1400" dirty="0"/>
           </a:p>
         </p:txBody>
       </p:sp>
@@ -12609,8 +12609,8 @@
         </p:nvSpPr>
         <p:spPr>
           <a:xfrm>
-            <a:off x="8138160" y="2834640"/>
-            <a:ext cx="457200" cy="256032"/>
+            <a:off x="9601200" y="3017520"/>
+            <a:ext cx="1645920" cy="365760"/>
           </a:xfrm>
           <a:prstGeom prst="rect">
             <a:avLst/>
@@ -12626,14 +12626,14 @@
               <a:buNone/>
             </a:pPr>
             <a:r>
-              <a:rPr lang="en-US" sz="1200" b="1" dirty="0">
+              <a:rPr lang="en-US" sz="1400" b="1" dirty="0">
                 <a:solidFill>
                   <a:srgbClr val="FFFFFF"/>
                 </a:solidFill>
               </a:rPr>
               <a:t>12%</a:t>
             </a:r>
-            <a:endParaRPr lang="en-US" sz="1200" dirty="0"/>
+            <a:endParaRPr lang="en-US" sz="1400" dirty="0"/>
           </a:p>
         </p:txBody>
       </p:sp>
@@ -12645,16 +12645,16 @@
         </p:nvSpPr>
         <p:spPr>
           <a:xfrm>
-            <a:off x="6217920" y="3520440"/>
-            <a:ext cx="164592" cy="164592"/>
+            <a:off x="5577840" y="3685032"/>
+            <a:ext cx="256032" cy="256032"/>
           </a:xfrm>
           <a:prstGeom prst="roundRect">
             <a:avLst>
-              <a:gd name="adj" fmla="val 22222"/>
+              <a:gd name="adj" fmla="val 17857"/>
             </a:avLst>
           </a:prstGeom>
           <a:solidFill>
-            <a:srgbClr val="5AAFDC"/>
+            <a:srgbClr val="64B5F6"/>
           </a:solidFill>
           <a:ln/>
         </p:spPr>
@@ -12667,31 +12667,31 @@
         </p:nvSpPr>
         <p:spPr>
           <a:xfrm>
-            <a:off x="6473952" y="3474720"/>
-            <a:ext cx="1645920" cy="256032"/>
-          </a:xfrm>
-          <a:prstGeom prst="rect">
-            <a:avLst/>
-          </a:prstGeom>
-          <a:noFill/>
-          <a:ln/>
-        </p:spPr>
-        <p:txBody>
-          <a:bodyPr wrap="square" rtlCol="0" anchor="ctr"/>
-          <a:lstStyle/>
-          <a:p>
-            <a:pPr indent="0" marL="0">
-              <a:buNone/>
-            </a:pPr>
-            <a:r>
-              <a:rPr lang="en-US" sz="1200" dirty="0">
+            <a:off x="5943600" y="3611880"/>
+            <a:ext cx="3200400" cy="365760"/>
+          </a:xfrm>
+          <a:prstGeom prst="rect">
+            <a:avLst/>
+          </a:prstGeom>
+          <a:noFill/>
+          <a:ln/>
+        </p:spPr>
+        <p:txBody>
+          <a:bodyPr wrap="square" rtlCol="0" anchor="ctr"/>
+          <a:lstStyle/>
+          <a:p>
+            <a:pPr indent="0" marL="0">
+              <a:buNone/>
+            </a:pPr>
+            <a:r>
+              <a:rPr lang="en-US" sz="1400" dirty="0">
                 <a:solidFill>
                   <a:srgbClr val="FFFFFF"/>
                 </a:solidFill>
               </a:rPr>
               <a:t>Liquidity</a:t>
             </a:r>
-            <a:endParaRPr lang="en-US" sz="1200" dirty="0"/>
+            <a:endParaRPr lang="en-US" sz="1400" dirty="0"/>
           </a:p>
         </p:txBody>
       </p:sp>
@@ -12703,8 +12703,8 @@
         </p:nvSpPr>
         <p:spPr>
           <a:xfrm>
-            <a:off x="8138160" y="3474720"/>
-            <a:ext cx="457200" cy="256032"/>
+            <a:off x="9601200" y="3611880"/>
+            <a:ext cx="1645920" cy="365760"/>
           </a:xfrm>
           <a:prstGeom prst="rect">
             <a:avLst/>
@@ -12720,14 +12720,14 @@
               <a:buNone/>
             </a:pPr>
             <a:r>
-              <a:rPr lang="en-US" sz="1200" b="1" dirty="0">
+              <a:rPr lang="en-US" sz="1400" b="1" dirty="0">
                 <a:solidFill>
                   <a:srgbClr val="FFFFFF"/>
                 </a:solidFill>
               </a:rPr>
               <a:t>12%</a:t>
             </a:r>
-            <a:endParaRPr lang="en-US" sz="1200" dirty="0"/>
+            <a:endParaRPr lang="en-US" sz="1400" dirty="0"/>
           </a:p>
         </p:txBody>
       </p:sp>
@@ -12739,16 +12739,16 @@
         </p:nvSpPr>
         <p:spPr>
           <a:xfrm>
-            <a:off x="6217920" y="4160520"/>
-            <a:ext cx="164592" cy="164592"/>
+            <a:off x="5577840" y="4279392"/>
+            <a:ext cx="256032" cy="256032"/>
           </a:xfrm>
           <a:prstGeom prst="roundRect">
             <a:avLst>
-              <a:gd name="adj" fmla="val 22222"/>
+              <a:gd name="adj" fmla="val 17857"/>
             </a:avLst>
           </a:prstGeom>
           <a:solidFill>
-            <a:srgbClr val="5A5A5A"/>
+            <a:srgbClr val="78909C"/>
           </a:solidFill>
           <a:ln/>
         </p:spPr>
@@ -12761,31 +12761,31 @@
         </p:nvSpPr>
         <p:spPr>
           <a:xfrm>
-            <a:off x="6473952" y="4114800"/>
-            <a:ext cx="1645920" cy="256032"/>
-          </a:xfrm>
-          <a:prstGeom prst="rect">
-            <a:avLst/>
-          </a:prstGeom>
-          <a:noFill/>
-          <a:ln/>
-        </p:spPr>
-        <p:txBody>
-          <a:bodyPr wrap="square" rtlCol="0" anchor="ctr"/>
-          <a:lstStyle/>
-          <a:p>
-            <a:pPr indent="0" marL="0">
-              <a:buNone/>
-            </a:pPr>
-            <a:r>
-              <a:rPr lang="en-US" sz="1200" dirty="0">
+            <a:off x="5943600" y="4206240"/>
+            <a:ext cx="3200400" cy="365760"/>
+          </a:xfrm>
+          <a:prstGeom prst="rect">
+            <a:avLst/>
+          </a:prstGeom>
+          <a:noFill/>
+          <a:ln/>
+        </p:spPr>
+        <p:txBody>
+          <a:bodyPr wrap="square" rtlCol="0" anchor="ctr"/>
+          <a:lstStyle/>
+          <a:p>
+            <a:pPr indent="0" marL="0">
+              <a:buNone/>
+            </a:pPr>
+            <a:r>
+              <a:rPr lang="en-US" sz="1400" dirty="0">
                 <a:solidFill>
                   <a:srgbClr val="FFFFFF"/>
                 </a:solidFill>
               </a:rPr>
               <a:t>Team</a:t>
             </a:r>
-            <a:endParaRPr lang="en-US" sz="1200" dirty="0"/>
+            <a:endParaRPr lang="en-US" sz="1400" dirty="0"/>
           </a:p>
         </p:txBody>
       </p:sp>
@@ -12797,8 +12797,8 @@
         </p:nvSpPr>
         <p:spPr>
           <a:xfrm>
-            <a:off x="8138160" y="4114800"/>
-            <a:ext cx="457200" cy="256032"/>
+            <a:off x="9601200" y="4206240"/>
+            <a:ext cx="1645920" cy="365760"/>
           </a:xfrm>
           <a:prstGeom prst="rect">
             <a:avLst/>
@@ -12814,14 +12814,14 @@
               <a:buNone/>
             </a:pPr>
             <a:r>
-              <a:rPr lang="en-US" sz="1200" b="1" dirty="0">
+              <a:rPr lang="en-US" sz="1400" b="1" dirty="0">
                 <a:solidFill>
                   <a:srgbClr val="FFFFFF"/>
                 </a:solidFill>
               </a:rPr>
               <a:t>11%</a:t>
             </a:r>
-            <a:endParaRPr lang="en-US" sz="1200" dirty="0"/>
+            <a:endParaRPr lang="en-US" sz="1400" dirty="0"/>
           </a:p>
         </p:txBody>
       </p:sp>
@@ -12833,16 +12833,16 @@
         </p:nvSpPr>
         <p:spPr>
           <a:xfrm>
-            <a:off x="6217920" y="4800600"/>
-            <a:ext cx="164592" cy="164592"/>
+            <a:off x="5577840" y="4873752"/>
+            <a:ext cx="256032" cy="256032"/>
           </a:xfrm>
           <a:prstGeom prst="roundRect">
             <a:avLst>
-              <a:gd name="adj" fmla="val 22222"/>
+              <a:gd name="adj" fmla="val 17857"/>
             </a:avLst>
           </a:prstGeom>
           <a:solidFill>
-            <a:srgbClr val="4A4A4A"/>
+            <a:srgbClr val="90A4AE"/>
           </a:solidFill>
           <a:ln/>
         </p:spPr>
@@ -12855,31 +12855,31 @@
         </p:nvSpPr>
         <p:spPr>
           <a:xfrm>
-            <a:off x="6473952" y="4754880"/>
-            <a:ext cx="1645920" cy="256032"/>
-          </a:xfrm>
-          <a:prstGeom prst="rect">
-            <a:avLst/>
-          </a:prstGeom>
-          <a:noFill/>
-          <a:ln/>
-        </p:spPr>
-        <p:txBody>
-          <a:bodyPr wrap="square" rtlCol="0" anchor="ctr"/>
-          <a:lstStyle/>
-          <a:p>
-            <a:pPr indent="0" marL="0">
-              <a:buNone/>
-            </a:pPr>
-            <a:r>
-              <a:rPr lang="en-US" sz="1200" dirty="0">
+            <a:off x="5943600" y="4800600"/>
+            <a:ext cx="3200400" cy="365760"/>
+          </a:xfrm>
+          <a:prstGeom prst="rect">
+            <a:avLst/>
+          </a:prstGeom>
+          <a:noFill/>
+          <a:ln/>
+        </p:spPr>
+        <p:txBody>
+          <a:bodyPr wrap="square" rtlCol="0" anchor="ctr"/>
+          <a:lstStyle/>
+          <a:p>
+            <a:pPr indent="0" marL="0">
+              <a:buNone/>
+            </a:pPr>
+            <a:r>
+              <a:rPr lang="en-US" sz="1400" dirty="0">
                 <a:solidFill>
                   <a:srgbClr val="FFFFFF"/>
                 </a:solidFill>
               </a:rPr>
               <a:t>Advisors</a:t>
             </a:r>
-            <a:endParaRPr lang="en-US" sz="1200" dirty="0"/>
+            <a:endParaRPr lang="en-US" sz="1400" dirty="0"/>
           </a:p>
         </p:txBody>
       </p:sp>
@@ -12891,8 +12891,8 @@
         </p:nvSpPr>
         <p:spPr>
           <a:xfrm>
-            <a:off x="8138160" y="4754880"/>
-            <a:ext cx="457200" cy="256032"/>
+            <a:off x="9601200" y="4800600"/>
+            <a:ext cx="1645920" cy="365760"/>
           </a:xfrm>
           <a:prstGeom prst="rect">
             <a:avLst/>
@@ -12908,14 +12908,14 @@
               <a:buNone/>
             </a:pPr>
             <a:r>
-              <a:rPr lang="en-US" sz="1200" b="1" dirty="0">
+              <a:rPr lang="en-US" sz="1400" b="1" dirty="0">
                 <a:solidFill>
                   <a:srgbClr val="FFFFFF"/>
                 </a:solidFill>
               </a:rPr>
               <a:t>5%</a:t>
             </a:r>
-            <a:endParaRPr lang="en-US" sz="1200" dirty="0"/>
+            <a:endParaRPr lang="en-US" sz="1400" dirty="0"/>
           </a:p>
         </p:txBody>
       </p:sp>
@@ -12927,16 +12927,16 @@
         </p:nvSpPr>
         <p:spPr>
           <a:xfrm>
-            <a:off x="6217920" y="5440680"/>
-            <a:ext cx="164592" cy="164592"/>
+            <a:off x="5577840" y="5468112"/>
+            <a:ext cx="256032" cy="256032"/>
           </a:xfrm>
           <a:prstGeom prst="roundRect">
             <a:avLst>
-              <a:gd name="adj" fmla="val 22222"/>
+              <a:gd name="adj" fmla="val 17857"/>
             </a:avLst>
           </a:prstGeom>
           <a:solidFill>
-            <a:srgbClr val="3A3A3A"/>
+            <a:srgbClr val="B0BEC5"/>
           </a:solidFill>
           <a:ln/>
         </p:spPr>
@@ -12949,31 +12949,31 @@
         </p:nvSpPr>
         <p:spPr>
           <a:xfrm>
-            <a:off x="6473952" y="5394960"/>
-            <a:ext cx="1645920" cy="256032"/>
-          </a:xfrm>
-          <a:prstGeom prst="rect">
-            <a:avLst/>
-          </a:prstGeom>
-          <a:noFill/>
-          <a:ln/>
-        </p:spPr>
-        <p:txBody>
-          <a:bodyPr wrap="square" rtlCol="0" anchor="ctr"/>
-          <a:lstStyle/>
-          <a:p>
-            <a:pPr indent="0" marL="0">
-              <a:buNone/>
-            </a:pPr>
-            <a:r>
-              <a:rPr lang="en-US" sz="1200" dirty="0">
+            <a:off x="5943600" y="5394960"/>
+            <a:ext cx="3200400" cy="365760"/>
+          </a:xfrm>
+          <a:prstGeom prst="rect">
+            <a:avLst/>
+          </a:prstGeom>
+          <a:noFill/>
+          <a:ln/>
+        </p:spPr>
+        <p:txBody>
+          <a:bodyPr wrap="square" rtlCol="0" anchor="ctr"/>
+          <a:lstStyle/>
+          <a:p>
+            <a:pPr indent="0" marL="0">
+              <a:buNone/>
+            </a:pPr>
+            <a:r>
+              <a:rPr lang="en-US" sz="1400" dirty="0">
                 <a:solidFill>
                   <a:srgbClr val="FFFFFF"/>
                 </a:solidFill>
               </a:rPr>
               <a:t>Referral</a:t>
             </a:r>
-            <a:endParaRPr lang="en-US" sz="1200" dirty="0"/>
+            <a:endParaRPr lang="en-US" sz="1400" dirty="0"/>
           </a:p>
         </p:txBody>
       </p:sp>
@@ -12985,8 +12985,8 @@
         </p:nvSpPr>
         <p:spPr>
           <a:xfrm>
-            <a:off x="8138160" y="5394960"/>
-            <a:ext cx="457200" cy="256032"/>
+            <a:off x="9601200" y="5394960"/>
+            <a:ext cx="1645920" cy="365760"/>
           </a:xfrm>
           <a:prstGeom prst="rect">
             <a:avLst/>
@@ -13002,14 +13002,14 @@
               <a:buNone/>
             </a:pPr>
             <a:r>
-              <a:rPr lang="en-US" sz="1200" b="1" dirty="0">
+              <a:rPr lang="en-US" sz="1400" b="1" dirty="0">
                 <a:solidFill>
                   <a:srgbClr val="FFFFFF"/>
                 </a:solidFill>
               </a:rPr>
               <a:t>5%</a:t>
             </a:r>
-            <a:endParaRPr lang="en-US" sz="1200" dirty="0"/>
+            <a:endParaRPr lang="en-US" sz="1400" dirty="0"/>
           </a:p>
         </p:txBody>
       </p:sp>

</xml_diff>

<commit_message>
fix(pitch-deck): slide 13 disclaimer cards - larger dimensions and better text fit
</commit_message>
<xml_diff>
--- a/pitch-deck/SwapPilot-Professional-PitchDeck.pptx
+++ b/pitch-deck/SwapPilot-Professional-PitchDeck.pptx
@@ -3812,30 +3812,32 @@
         <p:spPr>
           <a:xfrm>
             <a:off x="640080" y="3611880"/>
-            <a:ext cx="4663440" cy="320040"/>
-          </a:xfrm>
-          <a:prstGeom prst="rect">
-            <a:avLst/>
-          </a:prstGeom>
-          <a:noFill/>
-          <a:ln/>
-        </p:spPr>
-        <p:txBody>
-          <a:bodyPr wrap="square" rtlCol="0" anchor="ctr"/>
-          <a:lstStyle/>
-          <a:p>
-            <a:pPr indent="0" marL="0">
-              <a:buNone/>
-            </a:pPr>
-            <a:r>
-              <a:rPr lang="en-US" sz="1400" b="1" dirty="0">
+            <a:ext cx="4663440" cy="365760"/>
+          </a:xfrm>
+          <a:prstGeom prst="rect">
+            <a:avLst/>
+          </a:prstGeom>
+          <a:noFill/>
+          <a:ln/>
+        </p:spPr>
+        <p:txBody>
+          <a:bodyPr wrap="square" rtlCol="0" anchor="ctr">
+            <a:normAutofit/>
+          </a:bodyPr>
+          <a:lstStyle/>
+          <a:p>
+            <a:pPr indent="0" marL="0">
+              <a:buNone/>
+            </a:pPr>
+            <a:r>
+              <a:rPr lang="en-US" sz="1300" b="1" dirty="0">
                 <a:solidFill>
                   <a:srgbClr val="FFFFFF"/>
                 </a:solidFill>
               </a:rPr>
               <a:t>📅  Milestones</a:t>
             </a:r>
-            <a:endParaRPr lang="en-US" sz="1400" dirty="0"/>
+            <a:endParaRPr lang="en-US" sz="1300" dirty="0"/>
           </a:p>
         </p:txBody>
       </p:sp>
@@ -3847,8 +3849,8 @@
         </p:nvSpPr>
         <p:spPr>
           <a:xfrm>
-            <a:off x="640080" y="3931920"/>
-            <a:ext cx="4663440" cy="1005840"/>
+            <a:off x="640080" y="3977640"/>
+            <a:ext cx="4663440" cy="960120"/>
           </a:xfrm>
           <a:prstGeom prst="rect">
             <a:avLst/>
@@ -3862,53 +3864,53 @@
           <a:p>
             <a:pPr indent="0" marL="0">
               <a:lnSpc>
-                <a:spcPts val="1800"/>
+                <a:spcPts val="1600"/>
               </a:lnSpc>
               <a:buNone/>
             </a:pPr>
             <a:r>
-              <a:rPr lang="en-US" sz="1200" dirty="0">
+              <a:rPr lang="en-US" sz="1100" dirty="0">
                 <a:solidFill>
                   <a:srgbClr val="A0A0A0"/>
                 </a:solidFill>
               </a:rPr>
               <a:t>16.95% at TGE</a:t>
             </a:r>
-            <a:endParaRPr lang="en-US" sz="1200" dirty="0"/>
+            <a:endParaRPr lang="en-US" sz="1100" dirty="0"/>
           </a:p>
           <a:p>
             <a:pPr indent="0" marL="0">
               <a:lnSpc>
-                <a:spcPts val="1800"/>
+                <a:spcPts val="1600"/>
               </a:lnSpc>
               <a:buNone/>
             </a:pPr>
             <a:r>
-              <a:rPr lang="en-US" sz="1200" dirty="0">
+              <a:rPr lang="en-US" sz="1100" dirty="0">
                 <a:solidFill>
                   <a:srgbClr val="A0A0A0"/>
                 </a:solidFill>
               </a:rPr>
               <a:t>52.83% at Month 6</a:t>
             </a:r>
-            <a:endParaRPr lang="en-US" sz="1200" dirty="0"/>
+            <a:endParaRPr lang="en-US" sz="1100" dirty="0"/>
           </a:p>
           <a:p>
             <a:pPr indent="0" marL="0">
               <a:lnSpc>
-                <a:spcPts val="1800"/>
+                <a:spcPts val="1600"/>
               </a:lnSpc>
               <a:buNone/>
             </a:pPr>
             <a:r>
-              <a:rPr lang="en-US" sz="1200" dirty="0">
+              <a:rPr lang="en-US" sz="1100" dirty="0">
                 <a:solidFill>
                   <a:srgbClr val="A0A0A0"/>
                 </a:solidFill>
               </a:rPr>
               <a:t>78.67% at Month 12</a:t>
             </a:r>
-            <a:endParaRPr lang="en-US" sz="1200" dirty="0"/>
+            <a:endParaRPr lang="en-US" sz="1100" dirty="0"/>
           </a:p>
         </p:txBody>
       </p:sp>
@@ -7049,12 +7051,12 @@
         </p:nvSpPr>
         <p:spPr>
           <a:xfrm>
-            <a:off x="5943600" y="1188720"/>
-            <a:ext cx="2651760" cy="1463040"/>
+            <a:off x="4389120" y="1188720"/>
+            <a:ext cx="3657600" cy="1554480"/>
           </a:xfrm>
           <a:prstGeom prst="roundRect">
             <a:avLst>
-              <a:gd name="adj" fmla="val 7500"/>
+              <a:gd name="adj" fmla="val 7059"/>
             </a:avLst>
           </a:prstGeom>
           <a:solidFill>
@@ -7076,31 +7078,33 @@
         </p:nvSpPr>
         <p:spPr>
           <a:xfrm>
-            <a:off x="6126480" y="1325880"/>
-            <a:ext cx="2286000" cy="320040"/>
-          </a:xfrm>
-          <a:prstGeom prst="rect">
-            <a:avLst/>
-          </a:prstGeom>
-          <a:noFill/>
-          <a:ln/>
-        </p:spPr>
-        <p:txBody>
-          <a:bodyPr wrap="square" rtlCol="0" anchor="ctr"/>
-          <a:lstStyle/>
-          <a:p>
-            <a:pPr indent="0" marL="0">
-              <a:buNone/>
-            </a:pPr>
-            <a:r>
-              <a:rPr lang="en-US" sz="1400" b="1" dirty="0">
+            <a:off x="4572000" y="1325880"/>
+            <a:ext cx="3291840" cy="365760"/>
+          </a:xfrm>
+          <a:prstGeom prst="rect">
+            <a:avLst/>
+          </a:prstGeom>
+          <a:noFill/>
+          <a:ln/>
+        </p:spPr>
+        <p:txBody>
+          <a:bodyPr wrap="square" rtlCol="0" anchor="ctr">
+            <a:normAutofit/>
+          </a:bodyPr>
+          <a:lstStyle/>
+          <a:p>
+            <a:pPr indent="0" marL="0">
+              <a:buNone/>
+            </a:pPr>
+            <a:r>
+              <a:rPr lang="en-US" sz="1300" b="1" dirty="0">
                 <a:solidFill>
                   <a:srgbClr val="FFFFFF"/>
                 </a:solidFill>
               </a:rPr>
               <a:t>⚠️  Not financial advice</a:t>
             </a:r>
-            <a:endParaRPr lang="en-US" sz="1400" dirty="0"/>
+            <a:endParaRPr lang="en-US" sz="1300" dirty="0"/>
           </a:p>
         </p:txBody>
       </p:sp>
@@ -7112,8 +7116,8 @@
         </p:nvSpPr>
         <p:spPr>
           <a:xfrm>
-            <a:off x="6126480" y="1645920"/>
-            <a:ext cx="2286000" cy="822960"/>
+            <a:off x="4572000" y="1691640"/>
+            <a:ext cx="3291840" cy="868680"/>
           </a:xfrm>
           <a:prstGeom prst="rect">
             <a:avLst/>
@@ -7127,19 +7131,19 @@
           <a:p>
             <a:pPr indent="0" marL="0">
               <a:lnSpc>
-                <a:spcPts val="1800"/>
+                <a:spcPts val="1600"/>
               </a:lnSpc>
               <a:buNone/>
             </a:pPr>
             <a:r>
-              <a:rPr lang="en-US" sz="1200" dirty="0">
+              <a:rPr lang="en-US" sz="1100" dirty="0">
                 <a:solidFill>
                   <a:srgbClr val="A0A0A0"/>
                 </a:solidFill>
               </a:rPr>
               <a:t>This document is for informational purposes only. Nothing herein constitutes investment advice.</a:t>
             </a:r>
-            <a:endParaRPr lang="en-US" sz="1200" dirty="0"/>
+            <a:endParaRPr lang="en-US" sz="1100" dirty="0"/>
           </a:p>
         </p:txBody>
       </p:sp>
@@ -7151,12 +7155,12 @@
         </p:nvSpPr>
         <p:spPr>
           <a:xfrm>
-            <a:off x="5943600" y="2743200"/>
-            <a:ext cx="2651760" cy="1463040"/>
+            <a:off x="4389120" y="2834640"/>
+            <a:ext cx="3657600" cy="1554480"/>
           </a:xfrm>
           <a:prstGeom prst="roundRect">
             <a:avLst>
-              <a:gd name="adj" fmla="val 7500"/>
+              <a:gd name="adj" fmla="val 7059"/>
             </a:avLst>
           </a:prstGeom>
           <a:solidFill>
@@ -7178,31 +7182,33 @@
         </p:nvSpPr>
         <p:spPr>
           <a:xfrm>
-            <a:off x="6126480" y="2880360"/>
-            <a:ext cx="2286000" cy="320040"/>
-          </a:xfrm>
-          <a:prstGeom prst="rect">
-            <a:avLst/>
-          </a:prstGeom>
-          <a:noFill/>
-          <a:ln/>
-        </p:spPr>
-        <p:txBody>
-          <a:bodyPr wrap="square" rtlCol="0" anchor="ctr"/>
-          <a:lstStyle/>
-          <a:p>
-            <a:pPr indent="0" marL="0">
-              <a:buNone/>
-            </a:pPr>
-            <a:r>
-              <a:rPr lang="en-US" sz="1400" b="1" dirty="0">
+            <a:off x="4572000" y="2971800"/>
+            <a:ext cx="3291840" cy="365760"/>
+          </a:xfrm>
+          <a:prstGeom prst="rect">
+            <a:avLst/>
+          </a:prstGeom>
+          <a:noFill/>
+          <a:ln/>
+        </p:spPr>
+        <p:txBody>
+          <a:bodyPr wrap="square" rtlCol="0" anchor="ctr">
+            <a:normAutofit/>
+          </a:bodyPr>
+          <a:lstStyle/>
+          <a:p>
+            <a:pPr indent="0" marL="0">
+              <a:buNone/>
+            </a:pPr>
+            <a:r>
+              <a:rPr lang="en-US" sz="1300" b="1" dirty="0">
                 <a:solidFill>
                   <a:srgbClr val="FFFFFF"/>
                 </a:solidFill>
               </a:rPr>
               <a:t>📉  No guarantees</a:t>
             </a:r>
-            <a:endParaRPr lang="en-US" sz="1400" dirty="0"/>
+            <a:endParaRPr lang="en-US" sz="1300" dirty="0"/>
           </a:p>
         </p:txBody>
       </p:sp>
@@ -7214,8 +7220,8 @@
         </p:nvSpPr>
         <p:spPr>
           <a:xfrm>
-            <a:off x="6126480" y="3200400"/>
-            <a:ext cx="2286000" cy="822960"/>
+            <a:off x="4572000" y="3337560"/>
+            <a:ext cx="3291840" cy="868680"/>
           </a:xfrm>
           <a:prstGeom prst="rect">
             <a:avLst/>
@@ -7229,19 +7235,19 @@
           <a:p>
             <a:pPr indent="0" marL="0">
               <a:lnSpc>
-                <a:spcPts val="1800"/>
+                <a:spcPts val="1600"/>
               </a:lnSpc>
               <a:buNone/>
             </a:pPr>
             <a:r>
-              <a:rPr lang="en-US" sz="1200" dirty="0">
+              <a:rPr lang="en-US" sz="1100" dirty="0">
                 <a:solidFill>
                   <a:srgbClr val="A0A0A0"/>
                 </a:solidFill>
               </a:rPr>
               <a:t>PILOT token value may fluctuate. Past performance is not indicative of future results.</a:t>
             </a:r>
-            <a:endParaRPr lang="en-US" sz="1200" dirty="0"/>
+            <a:endParaRPr lang="en-US" sz="1100" dirty="0"/>
           </a:p>
         </p:txBody>
       </p:sp>
@@ -7253,12 +7259,12 @@
         </p:nvSpPr>
         <p:spPr>
           <a:xfrm>
-            <a:off x="5943600" y="4297680"/>
-            <a:ext cx="2651760" cy="1463040"/>
+            <a:off x="4389120" y="4480560"/>
+            <a:ext cx="3657600" cy="1554480"/>
           </a:xfrm>
           <a:prstGeom prst="roundRect">
             <a:avLst>
-              <a:gd name="adj" fmla="val 7500"/>
+              <a:gd name="adj" fmla="val 7059"/>
             </a:avLst>
           </a:prstGeom>
           <a:solidFill>
@@ -7280,31 +7286,33 @@
         </p:nvSpPr>
         <p:spPr>
           <a:xfrm>
-            <a:off x="6126480" y="4434840"/>
-            <a:ext cx="2286000" cy="320040"/>
-          </a:xfrm>
-          <a:prstGeom prst="rect">
-            <a:avLst/>
-          </a:prstGeom>
-          <a:noFill/>
-          <a:ln/>
-        </p:spPr>
-        <p:txBody>
-          <a:bodyPr wrap="square" rtlCol="0" anchor="ctr"/>
-          <a:lstStyle/>
-          <a:p>
-            <a:pPr indent="0" marL="0">
-              <a:buNone/>
-            </a:pPr>
-            <a:r>
-              <a:rPr lang="en-US" sz="1400" b="1" dirty="0">
+            <a:off x="4572000" y="4617720"/>
+            <a:ext cx="3291840" cy="365760"/>
+          </a:xfrm>
+          <a:prstGeom prst="rect">
+            <a:avLst/>
+          </a:prstGeom>
+          <a:noFill/>
+          <a:ln/>
+        </p:spPr>
+        <p:txBody>
+          <a:bodyPr wrap="square" rtlCol="0" anchor="ctr">
+            <a:normAutofit/>
+          </a:bodyPr>
+          <a:lstStyle/>
+          <a:p>
+            <a:pPr indent="0" marL="0">
+              <a:buNone/>
+            </a:pPr>
+            <a:r>
+              <a:rPr lang="en-US" sz="1300" b="1" dirty="0">
                 <a:solidFill>
                   <a:srgbClr val="FFFFFF"/>
                 </a:solidFill>
               </a:rPr>
               <a:t>⚖️  Regulatory uncertainty</a:t>
             </a:r>
-            <a:endParaRPr lang="en-US" sz="1400" dirty="0"/>
+            <a:endParaRPr lang="en-US" sz="1300" dirty="0"/>
           </a:p>
         </p:txBody>
       </p:sp>
@@ -7316,8 +7324,8 @@
         </p:nvSpPr>
         <p:spPr>
           <a:xfrm>
-            <a:off x="6126480" y="4754880"/>
-            <a:ext cx="2286000" cy="822960"/>
+            <a:off x="4572000" y="4983480"/>
+            <a:ext cx="3291840" cy="868680"/>
           </a:xfrm>
           <a:prstGeom prst="rect">
             <a:avLst/>
@@ -7331,19 +7339,19 @@
           <a:p>
             <a:pPr indent="0" marL="0">
               <a:lnSpc>
-                <a:spcPts val="1800"/>
+                <a:spcPts val="1600"/>
               </a:lnSpc>
               <a:buNone/>
             </a:pPr>
             <a:r>
-              <a:rPr lang="en-US" sz="1200" dirty="0">
+              <a:rPr lang="en-US" sz="1100" dirty="0">
                 <a:solidFill>
                   <a:srgbClr val="A0A0A0"/>
                 </a:solidFill>
               </a:rPr>
               <a:t>Cryptocurrency regulations vary by jurisdiction and are subject to change.</a:t>
             </a:r>
-            <a:endParaRPr lang="en-US" sz="1200" dirty="0"/>
+            <a:endParaRPr lang="en-US" sz="1100" dirty="0"/>
           </a:p>
         </p:txBody>
       </p:sp>
@@ -7355,12 +7363,12 @@
         </p:nvSpPr>
         <p:spPr>
           <a:xfrm>
-            <a:off x="8778240" y="1188720"/>
-            <a:ext cx="2651760" cy="1463040"/>
+            <a:off x="8229600" y="1188720"/>
+            <a:ext cx="3657600" cy="1554480"/>
           </a:xfrm>
           <a:prstGeom prst="roundRect">
             <a:avLst>
-              <a:gd name="adj" fmla="val 7500"/>
+              <a:gd name="adj" fmla="val 7059"/>
             </a:avLst>
           </a:prstGeom>
           <a:solidFill>
@@ -7382,31 +7390,33 @@
         </p:nvSpPr>
         <p:spPr>
           <a:xfrm>
-            <a:off x="8961120" y="1325880"/>
-            <a:ext cx="2286000" cy="320040"/>
-          </a:xfrm>
-          <a:prstGeom prst="rect">
-            <a:avLst/>
-          </a:prstGeom>
-          <a:noFill/>
-          <a:ln/>
-        </p:spPr>
-        <p:txBody>
-          <a:bodyPr wrap="square" rtlCol="0" anchor="ctr"/>
-          <a:lstStyle/>
-          <a:p>
-            <a:pPr indent="0" marL="0">
-              <a:buNone/>
-            </a:pPr>
-            <a:r>
-              <a:rPr lang="en-US" sz="1400" b="1" dirty="0">
+            <a:off x="8412480" y="1325880"/>
+            <a:ext cx="3291840" cy="365760"/>
+          </a:xfrm>
+          <a:prstGeom prst="rect">
+            <a:avLst/>
+          </a:prstGeom>
+          <a:noFill/>
+          <a:ln/>
+        </p:spPr>
+        <p:txBody>
+          <a:bodyPr wrap="square" rtlCol="0" anchor="ctr">
+            <a:normAutofit/>
+          </a:bodyPr>
+          <a:lstStyle/>
+          <a:p>
+            <a:pPr indent="0" marL="0">
+              <a:buNone/>
+            </a:pPr>
+            <a:r>
+              <a:rPr lang="en-US" sz="1300" b="1" dirty="0">
                 <a:solidFill>
                   <a:srgbClr val="FFFFFF"/>
                 </a:solidFill>
               </a:rPr>
               <a:t>🔧  Technology risks</a:t>
             </a:r>
-            <a:endParaRPr lang="en-US" sz="1400" dirty="0"/>
+            <a:endParaRPr lang="en-US" sz="1300" dirty="0"/>
           </a:p>
         </p:txBody>
       </p:sp>
@@ -7418,8 +7428,8 @@
         </p:nvSpPr>
         <p:spPr>
           <a:xfrm>
-            <a:off x="8961120" y="1645920"/>
-            <a:ext cx="2286000" cy="822960"/>
+            <a:off x="8412480" y="1691640"/>
+            <a:ext cx="3291840" cy="868680"/>
           </a:xfrm>
           <a:prstGeom prst="rect">
             <a:avLst/>
@@ -7433,19 +7443,19 @@
           <a:p>
             <a:pPr indent="0" marL="0">
               <a:lnSpc>
-                <a:spcPts val="1800"/>
+                <a:spcPts val="1600"/>
               </a:lnSpc>
               <a:buNone/>
             </a:pPr>
             <a:r>
-              <a:rPr lang="en-US" sz="1200" dirty="0">
+              <a:rPr lang="en-US" sz="1100" dirty="0">
                 <a:solidFill>
                   <a:srgbClr val="A0A0A0"/>
                 </a:solidFill>
               </a:rPr>
               <a:t>Smart contracts carry inherent risks including bugs and exploits.</a:t>
             </a:r>
-            <a:endParaRPr lang="en-US" sz="1200" dirty="0"/>
+            <a:endParaRPr lang="en-US" sz="1100" dirty="0"/>
           </a:p>
         </p:txBody>
       </p:sp>
@@ -7457,12 +7467,12 @@
         </p:nvSpPr>
         <p:spPr>
           <a:xfrm>
-            <a:off x="8778240" y="2743200"/>
-            <a:ext cx="2651760" cy="1463040"/>
+            <a:off x="8229600" y="2834640"/>
+            <a:ext cx="3657600" cy="1554480"/>
           </a:xfrm>
           <a:prstGeom prst="roundRect">
             <a:avLst>
-              <a:gd name="adj" fmla="val 7500"/>
+              <a:gd name="adj" fmla="val 7059"/>
             </a:avLst>
           </a:prstGeom>
           <a:solidFill>
@@ -7484,31 +7494,33 @@
         </p:nvSpPr>
         <p:spPr>
           <a:xfrm>
-            <a:off x="8961120" y="2880360"/>
-            <a:ext cx="2286000" cy="320040"/>
-          </a:xfrm>
-          <a:prstGeom prst="rect">
-            <a:avLst/>
-          </a:prstGeom>
-          <a:noFill/>
-          <a:ln/>
-        </p:spPr>
-        <p:txBody>
-          <a:bodyPr wrap="square" rtlCol="0" anchor="ctr"/>
-          <a:lstStyle/>
-          <a:p>
-            <a:pPr indent="0" marL="0">
-              <a:buNone/>
-            </a:pPr>
-            <a:r>
-              <a:rPr lang="en-US" sz="1400" b="1" dirty="0">
+            <a:off x="8412480" y="2971800"/>
+            <a:ext cx="3291840" cy="365760"/>
+          </a:xfrm>
+          <a:prstGeom prst="rect">
+            <a:avLst/>
+          </a:prstGeom>
+          <a:noFill/>
+          <a:ln/>
+        </p:spPr>
+        <p:txBody>
+          <a:bodyPr wrap="square" rtlCol="0" anchor="ctr">
+            <a:normAutofit/>
+          </a:bodyPr>
+          <a:lstStyle/>
+          <a:p>
+            <a:pPr indent="0" marL="0">
+              <a:buNone/>
+            </a:pPr>
+            <a:r>
+              <a:rPr lang="en-US" sz="1300" b="1" dirty="0">
                 <a:solidFill>
                   <a:srgbClr val="FFFFFF"/>
                 </a:solidFill>
               </a:rPr>
               <a:t>🔮  Forward-looking statements</a:t>
             </a:r>
-            <a:endParaRPr lang="en-US" sz="1400" dirty="0"/>
+            <a:endParaRPr lang="en-US" sz="1300" dirty="0"/>
           </a:p>
         </p:txBody>
       </p:sp>
@@ -7520,8 +7532,8 @@
         </p:nvSpPr>
         <p:spPr>
           <a:xfrm>
-            <a:off x="8961120" y="3200400"/>
-            <a:ext cx="2286000" cy="822960"/>
+            <a:off x="8412480" y="3337560"/>
+            <a:ext cx="3291840" cy="868680"/>
           </a:xfrm>
           <a:prstGeom prst="rect">
             <a:avLst/>
@@ -7535,19 +7547,19 @@
           <a:p>
             <a:pPr indent="0" marL="0">
               <a:lnSpc>
-                <a:spcPts val="1800"/>
+                <a:spcPts val="1600"/>
               </a:lnSpc>
               <a:buNone/>
             </a:pPr>
             <a:r>
-              <a:rPr lang="en-US" sz="1200" dirty="0">
+              <a:rPr lang="en-US" sz="1100" dirty="0">
                 <a:solidFill>
                   <a:srgbClr val="A0A0A0"/>
                 </a:solidFill>
               </a:rPr>
               <a:t>Roadmap and projections are subject to change.</a:t>
             </a:r>
-            <a:endParaRPr lang="en-US" sz="1200" dirty="0"/>
+            <a:endParaRPr lang="en-US" sz="1100" dirty="0"/>
           </a:p>
         </p:txBody>
       </p:sp>
@@ -7941,30 +7953,32 @@
         <p:spPr>
           <a:xfrm>
             <a:off x="6583680" y="1325880"/>
-            <a:ext cx="4937760" cy="320040"/>
-          </a:xfrm>
-          <a:prstGeom prst="rect">
-            <a:avLst/>
-          </a:prstGeom>
-          <a:noFill/>
-          <a:ln/>
-        </p:spPr>
-        <p:txBody>
-          <a:bodyPr wrap="square" rtlCol="0" anchor="ctr"/>
-          <a:lstStyle/>
-          <a:p>
-            <a:pPr indent="0" marL="0">
-              <a:buNone/>
-            </a:pPr>
-            <a:r>
-              <a:rPr lang="en-US" sz="1400" b="1" dirty="0">
+            <a:ext cx="4937760" cy="365760"/>
+          </a:xfrm>
+          <a:prstGeom prst="rect">
+            <a:avLst/>
+          </a:prstGeom>
+          <a:noFill/>
+          <a:ln/>
+        </p:spPr>
+        <p:txBody>
+          <a:bodyPr wrap="square" rtlCol="0" anchor="ctr">
+            <a:normAutofit/>
+          </a:bodyPr>
+          <a:lstStyle/>
+          <a:p>
+            <a:pPr indent="0" marL="0">
+              <a:buNone/>
+            </a:pPr>
+            <a:r>
+              <a:rPr lang="en-US" sz="1300" b="1" dirty="0">
                 <a:solidFill>
                   <a:srgbClr val="FFFFFF"/>
                 </a:solidFill>
               </a:rPr>
               <a:t>🔀  Fragmented liquidity</a:t>
             </a:r>
-            <a:endParaRPr lang="en-US" sz="1400" dirty="0"/>
+            <a:endParaRPr lang="en-US" sz="1300" dirty="0"/>
           </a:p>
         </p:txBody>
       </p:sp>
@@ -7976,8 +7990,8 @@
         </p:nvSpPr>
         <p:spPr>
           <a:xfrm>
-            <a:off x="6583680" y="1645920"/>
-            <a:ext cx="4937760" cy="822960"/>
+            <a:off x="6583680" y="1691640"/>
+            <a:ext cx="4937760" cy="777240"/>
           </a:xfrm>
           <a:prstGeom prst="rect">
             <a:avLst/>
@@ -7991,19 +8005,19 @@
           <a:p>
             <a:pPr indent="0" marL="0">
               <a:lnSpc>
-                <a:spcPts val="1800"/>
+                <a:spcPts val="1600"/>
               </a:lnSpc>
               <a:buNone/>
             </a:pPr>
             <a:r>
-              <a:rPr lang="en-US" sz="1200" dirty="0">
+              <a:rPr lang="en-US" sz="1100" dirty="0">
                 <a:solidFill>
                   <a:srgbClr val="A0A0A0"/>
                 </a:solidFill>
               </a:rPr>
               <a:t>Prices differ per DEX. Manual comparison is slow and error-prone. Users waste time checking multiple platforms.</a:t>
             </a:r>
-            <a:endParaRPr lang="en-US" sz="1200" dirty="0"/>
+            <a:endParaRPr lang="en-US" sz="1100" dirty="0"/>
           </a:p>
         </p:txBody>
       </p:sp>
@@ -8043,30 +8057,32 @@
         <p:spPr>
           <a:xfrm>
             <a:off x="6583680" y="2971800"/>
-            <a:ext cx="4937760" cy="320040"/>
-          </a:xfrm>
-          <a:prstGeom prst="rect">
-            <a:avLst/>
-          </a:prstGeom>
-          <a:noFill/>
-          <a:ln/>
-        </p:spPr>
-        <p:txBody>
-          <a:bodyPr wrap="square" rtlCol="0" anchor="ctr"/>
-          <a:lstStyle/>
-          <a:p>
-            <a:pPr indent="0" marL="0">
-              <a:buNone/>
-            </a:pPr>
-            <a:r>
-              <a:rPr lang="en-US" sz="1400" b="1" dirty="0">
+            <a:ext cx="4937760" cy="365760"/>
+          </a:xfrm>
+          <a:prstGeom prst="rect">
+            <a:avLst/>
+          </a:prstGeom>
+          <a:noFill/>
+          <a:ln/>
+        </p:spPr>
+        <p:txBody>
+          <a:bodyPr wrap="square" rtlCol="0" anchor="ctr">
+            <a:normAutofit/>
+          </a:bodyPr>
+          <a:lstStyle/>
+          <a:p>
+            <a:pPr indent="0" marL="0">
+              <a:buNone/>
+            </a:pPr>
+            <a:r>
+              <a:rPr lang="en-US" sz="1300" b="1" dirty="0">
                 <a:solidFill>
                   <a:srgbClr val="FFFFFF"/>
                 </a:solidFill>
               </a:rPr>
               <a:t>💸  Hidden costs</a:t>
             </a:r>
-            <a:endParaRPr lang="en-US" sz="1400" dirty="0"/>
+            <a:endParaRPr lang="en-US" sz="1300" dirty="0"/>
           </a:p>
         </p:txBody>
       </p:sp>
@@ -8078,8 +8094,8 @@
         </p:nvSpPr>
         <p:spPr>
           <a:xfrm>
-            <a:off x="6583680" y="3291840"/>
-            <a:ext cx="4937760" cy="822960"/>
+            <a:off x="6583680" y="3337560"/>
+            <a:ext cx="4937760" cy="777240"/>
           </a:xfrm>
           <a:prstGeom prst="rect">
             <a:avLst/>
@@ -8093,19 +8109,19 @@
           <a:p>
             <a:pPr indent="0" marL="0">
               <a:lnSpc>
-                <a:spcPts val="1800"/>
+                <a:spcPts val="1600"/>
               </a:lnSpc>
               <a:buNone/>
             </a:pPr>
             <a:r>
-              <a:rPr lang="en-US" sz="1200" dirty="0">
+              <a:rPr lang="en-US" sz="1100" dirty="0">
                 <a:solidFill>
                   <a:srgbClr val="A0A0A0"/>
                 </a:solidFill>
               </a:rPr>
               <a:t>Slippage + token transfer taxes reduce net output after execution. What you see is not what you get.</a:t>
             </a:r>
-            <a:endParaRPr lang="en-US" sz="1200" dirty="0"/>
+            <a:endParaRPr lang="en-US" sz="1100" dirty="0"/>
           </a:p>
         </p:txBody>
       </p:sp>
@@ -8145,30 +8161,32 @@
         <p:spPr>
           <a:xfrm>
             <a:off x="6583680" y="4617720"/>
-            <a:ext cx="4937760" cy="320040"/>
-          </a:xfrm>
-          <a:prstGeom prst="rect">
-            <a:avLst/>
-          </a:prstGeom>
-          <a:noFill/>
-          <a:ln/>
-        </p:spPr>
-        <p:txBody>
-          <a:bodyPr wrap="square" rtlCol="0" anchor="ctr"/>
-          <a:lstStyle/>
-          <a:p>
-            <a:pPr indent="0" marL="0">
-              <a:buNone/>
-            </a:pPr>
-            <a:r>
-              <a:rPr lang="en-US" sz="1400" b="1" dirty="0">
+            <a:ext cx="4937760" cy="365760"/>
+          </a:xfrm>
+          <a:prstGeom prst="rect">
+            <a:avLst/>
+          </a:prstGeom>
+          <a:noFill/>
+          <a:ln/>
+        </p:spPr>
+        <p:txBody>
+          <a:bodyPr wrap="square" rtlCol="0" anchor="ctr">
+            <a:normAutofit/>
+          </a:bodyPr>
+          <a:lstStyle/>
+          <a:p>
+            <a:pPr indent="0" marL="0">
+              <a:buNone/>
+            </a:pPr>
+            <a:r>
+              <a:rPr lang="en-US" sz="1300" b="1" dirty="0">
                 <a:solidFill>
                   <a:srgbClr val="FFFFFF"/>
                 </a:solidFill>
               </a:rPr>
               <a:t>⚠️  Execution risk</a:t>
             </a:r>
-            <a:endParaRPr lang="en-US" sz="1400" dirty="0"/>
+            <a:endParaRPr lang="en-US" sz="1300" dirty="0"/>
           </a:p>
         </p:txBody>
       </p:sp>
@@ -8180,8 +8198,8 @@
         </p:nvSpPr>
         <p:spPr>
           <a:xfrm>
-            <a:off x="6583680" y="4937760"/>
-            <a:ext cx="4937760" cy="822960"/>
+            <a:off x="6583680" y="4983480"/>
+            <a:ext cx="4937760" cy="777240"/>
           </a:xfrm>
           <a:prstGeom prst="rect">
             <a:avLst/>
@@ -8195,19 +8213,19 @@
           <a:p>
             <a:pPr indent="0" marL="0">
               <a:lnSpc>
-                <a:spcPts val="1800"/>
+                <a:spcPts val="1600"/>
               </a:lnSpc>
               <a:buNone/>
             </a:pPr>
             <a:r>
-              <a:rPr lang="en-US" sz="1200" dirty="0">
+              <a:rPr lang="en-US" sz="1100" dirty="0">
                 <a:solidFill>
                   <a:srgbClr val="A0A0A0"/>
                 </a:solidFill>
               </a:rPr>
               <a:t>Routes can fail; users need preflight signals and clear warnings before signing transactions.</a:t>
             </a:r>
-            <a:endParaRPr lang="en-US" sz="1200" dirty="0"/>
+            <a:endParaRPr lang="en-US" sz="1100" dirty="0"/>
           </a:p>
         </p:txBody>
       </p:sp>
@@ -8565,30 +8583,32 @@
         <p:spPr>
           <a:xfrm>
             <a:off x="6583680" y="1325880"/>
-            <a:ext cx="4937760" cy="320040"/>
-          </a:xfrm>
-          <a:prstGeom prst="rect">
-            <a:avLst/>
-          </a:prstGeom>
-          <a:noFill/>
-          <a:ln/>
-        </p:spPr>
-        <p:txBody>
-          <a:bodyPr wrap="square" rtlCol="0" anchor="ctr"/>
-          <a:lstStyle/>
-          <a:p>
-            <a:pPr indent="0" marL="0">
-              <a:buNone/>
-            </a:pPr>
-            <a:r>
-              <a:rPr lang="en-US" sz="1400" b="1" dirty="0">
+            <a:ext cx="4937760" cy="365760"/>
+          </a:xfrm>
+          <a:prstGeom prst="rect">
+            <a:avLst/>
+          </a:prstGeom>
+          <a:noFill/>
+          <a:ln/>
+        </p:spPr>
+        <p:txBody>
+          <a:bodyPr wrap="square" rtlCol="0" anchor="ctr">
+            <a:normAutofit/>
+          </a:bodyPr>
+          <a:lstStyle/>
+          <a:p>
+            <a:pPr indent="0" marL="0">
+              <a:buNone/>
+            </a:pPr>
+            <a:r>
+              <a:rPr lang="en-US" sz="1300" b="1" dirty="0">
                 <a:solidFill>
                   <a:srgbClr val="FFFFFF"/>
                 </a:solidFill>
               </a:rPr>
               <a:t>🏆  BEQ (Best Executable Quote)</a:t>
             </a:r>
-            <a:endParaRPr lang="en-US" sz="1400" dirty="0"/>
+            <a:endParaRPr lang="en-US" sz="1300" dirty="0"/>
           </a:p>
         </p:txBody>
       </p:sp>
@@ -8600,8 +8620,8 @@
         </p:nvSpPr>
         <p:spPr>
           <a:xfrm>
-            <a:off x="6583680" y="1645920"/>
-            <a:ext cx="4937760" cy="822960"/>
+            <a:off x="6583680" y="1691640"/>
+            <a:ext cx="4937760" cy="777240"/>
           </a:xfrm>
           <a:prstGeom prst="rect">
             <a:avLst/>
@@ -8615,19 +8635,19 @@
           <a:p>
             <a:pPr indent="0" marL="0">
               <a:lnSpc>
-                <a:spcPts val="1800"/>
+                <a:spcPts val="1600"/>
               </a:lnSpc>
               <a:buNone/>
             </a:pPr>
             <a:r>
-              <a:rPr lang="en-US" sz="1200" dirty="0">
+              <a:rPr lang="en-US" sz="1100" dirty="0">
                 <a:solidFill>
                   <a:srgbClr val="A0A0A0"/>
                 </a:solidFill>
               </a:rPr>
               <a:t>Optimizes for executability first — then for output. Not just the highest number, but the safest path.</a:t>
             </a:r>
-            <a:endParaRPr lang="en-US" sz="1200" dirty="0"/>
+            <a:endParaRPr lang="en-US" sz="1100" dirty="0"/>
           </a:p>
         </p:txBody>
       </p:sp>
@@ -8667,30 +8687,32 @@
         <p:spPr>
           <a:xfrm>
             <a:off x="6583680" y="2971800"/>
-            <a:ext cx="4937760" cy="320040"/>
-          </a:xfrm>
-          <a:prstGeom prst="rect">
-            <a:avLst/>
-          </a:prstGeom>
-          <a:noFill/>
-          <a:ln/>
-        </p:spPr>
-        <p:txBody>
-          <a:bodyPr wrap="square" rtlCol="0" anchor="ctr"/>
-          <a:lstStyle/>
-          <a:p>
-            <a:pPr indent="0" marL="0">
-              <a:buNone/>
-            </a:pPr>
-            <a:r>
-              <a:rPr lang="en-US" sz="1400" b="1" dirty="0">
+            <a:ext cx="4937760" cy="365760"/>
+          </a:xfrm>
+          <a:prstGeom prst="rect">
+            <a:avLst/>
+          </a:prstGeom>
+          <a:noFill/>
+          <a:ln/>
+        </p:spPr>
+        <p:txBody>
+          <a:bodyPr wrap="square" rtlCol="0" anchor="ctr">
+            <a:normAutofit/>
+          </a:bodyPr>
+          <a:lstStyle/>
+          <a:p>
+            <a:pPr indent="0" marL="0">
+              <a:buNone/>
+            </a:pPr>
+            <a:r>
+              <a:rPr lang="en-US" sz="1300" b="1" dirty="0">
                 <a:solidFill>
                   <a:srgbClr val="FFFFFF"/>
                 </a:solidFill>
               </a:rPr>
               <a:t>🧾  Decision transparency</a:t>
             </a:r>
-            <a:endParaRPr lang="en-US" sz="1400" dirty="0"/>
+            <a:endParaRPr lang="en-US" sz="1300" dirty="0"/>
           </a:p>
         </p:txBody>
       </p:sp>
@@ -8702,8 +8724,8 @@
         </p:nvSpPr>
         <p:spPr>
           <a:xfrm>
-            <a:off x="6583680" y="3291840"/>
-            <a:ext cx="4937760" cy="822960"/>
+            <a:off x="6583680" y="3337560"/>
+            <a:ext cx="4937760" cy="777240"/>
           </a:xfrm>
           <a:prstGeom prst="rect">
             <a:avLst/>
@@ -8717,19 +8739,19 @@
           <a:p>
             <a:pPr indent="0" marL="0">
               <a:lnSpc>
-                <a:spcPts val="1800"/>
+                <a:spcPts val="1600"/>
               </a:lnSpc>
               <a:buNone/>
             </a:pPr>
             <a:r>
-              <a:rPr lang="en-US" sz="1200" dirty="0">
+              <a:rPr lang="en-US" sz="1100" dirty="0">
                 <a:solidFill>
                   <a:srgbClr val="A0A0A0"/>
                 </a:solidFill>
               </a:rPr>
               <a:t>Every quote returns detailed reasoning: whyWinner · warnings · ranking rationale · assumptions.</a:t>
             </a:r>
-            <a:endParaRPr lang="en-US" sz="1200" dirty="0"/>
+            <a:endParaRPr lang="en-US" sz="1100" dirty="0"/>
           </a:p>
         </p:txBody>
       </p:sp>
@@ -8769,30 +8791,32 @@
         <p:spPr>
           <a:xfrm>
             <a:off x="6583680" y="4617720"/>
-            <a:ext cx="4937760" cy="320040"/>
-          </a:xfrm>
-          <a:prstGeom prst="rect">
-            <a:avLst/>
-          </a:prstGeom>
-          <a:noFill/>
-          <a:ln/>
-        </p:spPr>
-        <p:txBody>
-          <a:bodyPr wrap="square" rtlCol="0" anchor="ctr"/>
-          <a:lstStyle/>
-          <a:p>
-            <a:pPr indent="0" marL="0">
-              <a:buNone/>
-            </a:pPr>
-            <a:r>
-              <a:rPr lang="en-US" sz="1400" b="1" dirty="0">
+            <a:ext cx="4937760" cy="365760"/>
+          </a:xfrm>
+          <a:prstGeom prst="rect">
+            <a:avLst/>
+          </a:prstGeom>
+          <a:noFill/>
+          <a:ln/>
+        </p:spPr>
+        <p:txBody>
+          <a:bodyPr wrap="square" rtlCol="0" anchor="ctr">
+            <a:normAutofit/>
+          </a:bodyPr>
+          <a:lstStyle/>
+          <a:p>
+            <a:pPr indent="0" marL="0">
+              <a:buNone/>
+            </a:pPr>
+            <a:r>
+              <a:rPr lang="en-US" sz="1300" b="1" dirty="0">
                 <a:solidFill>
                   <a:srgbClr val="FFFFFF"/>
                 </a:solidFill>
               </a:rPr>
               <a:t>🎚️  Risk modes</a:t>
             </a:r>
-            <a:endParaRPr lang="en-US" sz="1400" dirty="0"/>
+            <a:endParaRPr lang="en-US" sz="1300" dirty="0"/>
           </a:p>
         </p:txBody>
       </p:sp>
@@ -8804,8 +8828,8 @@
         </p:nvSpPr>
         <p:spPr>
           <a:xfrm>
-            <a:off x="6583680" y="4937760"/>
-            <a:ext cx="4937760" cy="822960"/>
+            <a:off x="6583680" y="4983480"/>
+            <a:ext cx="4937760" cy="777240"/>
           </a:xfrm>
           <a:prstGeom prst="rect">
             <a:avLst/>
@@ -8819,19 +8843,19 @@
           <a:p>
             <a:pPr indent="0" marL="0">
               <a:lnSpc>
-                <a:spcPts val="1800"/>
+                <a:spcPts val="1600"/>
               </a:lnSpc>
               <a:buNone/>
             </a:pPr>
             <a:r>
-              <a:rPr lang="en-US" sz="1200" dirty="0">
+              <a:rPr lang="en-US" sz="1100" dirty="0">
                 <a:solidFill>
                   <a:srgbClr val="A0A0A0"/>
                 </a:solidFill>
               </a:rPr>
               <a:t>SAFE / NORMAL / DEGEN switch the BEQ weights — reasoning stays fully transparent.</a:t>
             </a:r>
-            <a:endParaRPr lang="en-US" sz="1200" dirty="0"/>
+            <a:endParaRPr lang="en-US" sz="1100" dirty="0"/>
           </a:p>
         </p:txBody>
       </p:sp>
@@ -9189,30 +9213,32 @@
         <p:spPr>
           <a:xfrm>
             <a:off x="6583680" y="1325880"/>
-            <a:ext cx="2194560" cy="320040"/>
-          </a:xfrm>
-          <a:prstGeom prst="rect">
-            <a:avLst/>
-          </a:prstGeom>
-          <a:noFill/>
-          <a:ln/>
-        </p:spPr>
-        <p:txBody>
-          <a:bodyPr wrap="square" rtlCol="0" anchor="ctr"/>
-          <a:lstStyle/>
-          <a:p>
-            <a:pPr indent="0" marL="0">
-              <a:buNone/>
-            </a:pPr>
-            <a:r>
-              <a:rPr lang="en-US" sz="1400" b="1" dirty="0">
+            <a:ext cx="2194560" cy="365760"/>
+          </a:xfrm>
+          <a:prstGeom prst="rect">
+            <a:avLst/>
+          </a:prstGeom>
+          <a:noFill/>
+          <a:ln/>
+        </p:spPr>
+        <p:txBody>
+          <a:bodyPr wrap="square" rtlCol="0" anchor="ctr">
+            <a:normAutofit/>
+          </a:bodyPr>
+          <a:lstStyle/>
+          <a:p>
+            <a:pPr indent="0" marL="0">
+              <a:buNone/>
+            </a:pPr>
+            <a:r>
+              <a:rPr lang="en-US" sz="1300" b="1" dirty="0">
                 <a:solidFill>
                   <a:srgbClr val="FFFFFF"/>
                 </a:solidFill>
               </a:rPr>
               <a:t>1. Quote</a:t>
             </a:r>
-            <a:endParaRPr lang="en-US" sz="1400" dirty="0"/>
+            <a:endParaRPr lang="en-US" sz="1300" dirty="0"/>
           </a:p>
         </p:txBody>
       </p:sp>
@@ -9224,8 +9250,8 @@
         </p:nvSpPr>
         <p:spPr>
           <a:xfrm>
-            <a:off x="6583680" y="1645920"/>
-            <a:ext cx="2194560" cy="1645920"/>
+            <a:off x="6583680" y="1691640"/>
+            <a:ext cx="2194560" cy="1600200"/>
           </a:xfrm>
           <a:prstGeom prst="rect">
             <a:avLst/>
@@ -9239,36 +9265,36 @@
           <a:p>
             <a:pPr indent="0" marL="0">
               <a:lnSpc>
-                <a:spcPts val="1800"/>
+                <a:spcPts val="1600"/>
               </a:lnSpc>
               <a:buNone/>
             </a:pPr>
             <a:r>
-              <a:rPr lang="en-US" sz="1200" dirty="0">
+              <a:rPr lang="en-US" sz="1100" dirty="0">
                 <a:solidFill>
                   <a:srgbClr val="A0A0A0"/>
                 </a:solidFill>
               </a:rPr>
               <a:t>POST /v1/quotes</a:t>
             </a:r>
-            <a:endParaRPr lang="en-US" sz="1200" dirty="0"/>
+            <a:endParaRPr lang="en-US" sz="1100" dirty="0"/>
           </a:p>
           <a:p>
             <a:pPr indent="0" marL="0">
               <a:lnSpc>
-                <a:spcPts val="1800"/>
+                <a:spcPts val="1600"/>
               </a:lnSpc>
               <a:buNone/>
             </a:pPr>
             <a:r>
-              <a:rPr lang="en-US" sz="1200" dirty="0">
+              <a:rPr lang="en-US" sz="1100" dirty="0">
                 <a:solidFill>
                   <a:srgbClr val="A0A0A0"/>
                 </a:solidFill>
               </a:rPr>
               <a:t>Fan-out to multiple providers in parallel on BSC (chainId 56).</a:t>
             </a:r>
-            <a:endParaRPr lang="en-US" sz="1200" dirty="0"/>
+            <a:endParaRPr lang="en-US" sz="1100" dirty="0"/>
           </a:p>
         </p:txBody>
       </p:sp>
@@ -9308,30 +9334,32 @@
         <p:spPr>
           <a:xfrm>
             <a:off x="9326880" y="1325880"/>
-            <a:ext cx="2194560" cy="320040"/>
-          </a:xfrm>
-          <a:prstGeom prst="rect">
-            <a:avLst/>
-          </a:prstGeom>
-          <a:noFill/>
-          <a:ln/>
-        </p:spPr>
-        <p:txBody>
-          <a:bodyPr wrap="square" rtlCol="0" anchor="ctr"/>
-          <a:lstStyle/>
-          <a:p>
-            <a:pPr indent="0" marL="0">
-              <a:buNone/>
-            </a:pPr>
-            <a:r>
-              <a:rPr lang="en-US" sz="1400" b="1" dirty="0">
+            <a:ext cx="2194560" cy="365760"/>
+          </a:xfrm>
+          <a:prstGeom prst="rect">
+            <a:avLst/>
+          </a:prstGeom>
+          <a:noFill/>
+          <a:ln/>
+        </p:spPr>
+        <p:txBody>
+          <a:bodyPr wrap="square" rtlCol="0" anchor="ctr">
+            <a:normAutofit/>
+          </a:bodyPr>
+          <a:lstStyle/>
+          <a:p>
+            <a:pPr indent="0" marL="0">
+              <a:buNone/>
+            </a:pPr>
+            <a:r>
+              <a:rPr lang="en-US" sz="1300" b="1" dirty="0">
                 <a:solidFill>
                   <a:srgbClr val="FFFFFF"/>
                 </a:solidFill>
               </a:rPr>
               <a:t>2. Rank</a:t>
             </a:r>
-            <a:endParaRPr lang="en-US" sz="1400" dirty="0"/>
+            <a:endParaRPr lang="en-US" sz="1300" dirty="0"/>
           </a:p>
         </p:txBody>
       </p:sp>
@@ -9343,8 +9371,8 @@
         </p:nvSpPr>
         <p:spPr>
           <a:xfrm>
-            <a:off x="9326880" y="1645920"/>
-            <a:ext cx="2194560" cy="1645920"/>
+            <a:off x="9326880" y="1691640"/>
+            <a:ext cx="2194560" cy="1600200"/>
           </a:xfrm>
           <a:prstGeom prst="rect">
             <a:avLst/>
@@ -9358,19 +9386,19 @@
           <a:p>
             <a:pPr indent="0" marL="0">
               <a:lnSpc>
-                <a:spcPts val="1800"/>
+                <a:spcPts val="1600"/>
               </a:lnSpc>
               <a:buNone/>
             </a:pPr>
             <a:r>
-              <a:rPr lang="en-US" sz="1200" dirty="0">
+              <a:rPr lang="en-US" sz="1100" dirty="0">
                 <a:solidFill>
                   <a:srgbClr val="A0A0A0"/>
                 </a:solidFill>
               </a:rPr>
               <a:t>Return rankedQuotes (BEQ) + bestRawQuotes + recommended provider.</a:t>
             </a:r>
-            <a:endParaRPr lang="en-US" sz="1200" dirty="0"/>
+            <a:endParaRPr lang="en-US" sz="1100" dirty="0"/>
           </a:p>
         </p:txBody>
       </p:sp>
@@ -9410,30 +9438,32 @@
         <p:spPr>
           <a:xfrm>
             <a:off x="6583680" y="3886200"/>
-            <a:ext cx="2194560" cy="320040"/>
-          </a:xfrm>
-          <a:prstGeom prst="rect">
-            <a:avLst/>
-          </a:prstGeom>
-          <a:noFill/>
-          <a:ln/>
-        </p:spPr>
-        <p:txBody>
-          <a:bodyPr wrap="square" rtlCol="0" anchor="ctr"/>
-          <a:lstStyle/>
-          <a:p>
-            <a:pPr indent="0" marL="0">
-              <a:buNone/>
-            </a:pPr>
-            <a:r>
-              <a:rPr lang="en-US" sz="1400" b="1" dirty="0">
+            <a:ext cx="2194560" cy="365760"/>
+          </a:xfrm>
+          <a:prstGeom prst="rect">
+            <a:avLst/>
+          </a:prstGeom>
+          <a:noFill/>
+          <a:ln/>
+        </p:spPr>
+        <p:txBody>
+          <a:bodyPr wrap="square" rtlCol="0" anchor="ctr">
+            <a:normAutofit/>
+          </a:bodyPr>
+          <a:lstStyle/>
+          <a:p>
+            <a:pPr indent="0" marL="0">
+              <a:buNone/>
+            </a:pPr>
+            <a:r>
+              <a:rPr lang="en-US" sz="1300" b="1" dirty="0">
                 <a:solidFill>
                   <a:srgbClr val="FFFFFF"/>
                 </a:solidFill>
               </a:rPr>
               <a:t>3. Explain</a:t>
             </a:r>
-            <a:endParaRPr lang="en-US" sz="1400" dirty="0"/>
+            <a:endParaRPr lang="en-US" sz="1300" dirty="0"/>
           </a:p>
         </p:txBody>
       </p:sp>
@@ -9445,8 +9475,8 @@
         </p:nvSpPr>
         <p:spPr>
           <a:xfrm>
-            <a:off x="6583680" y="4206240"/>
-            <a:ext cx="2194560" cy="1645920"/>
+            <a:off x="6583680" y="4251960"/>
+            <a:ext cx="2194560" cy="1600200"/>
           </a:xfrm>
           <a:prstGeom prst="rect">
             <a:avLst/>
@@ -9460,36 +9490,36 @@
           <a:p>
             <a:pPr indent="0" marL="0">
               <a:lnSpc>
-                <a:spcPts val="1800"/>
+                <a:spcPts val="1600"/>
               </a:lnSpc>
               <a:buNone/>
             </a:pPr>
             <a:r>
-              <a:rPr lang="en-US" sz="1200" dirty="0">
+              <a:rPr lang="en-US" sz="1100" dirty="0">
                 <a:solidFill>
                   <a:srgbClr val="A0A0A0"/>
                 </a:solidFill>
               </a:rPr>
               <a:t>GET /v1/receipts/:id</a:t>
             </a:r>
-            <a:endParaRPr lang="en-US" sz="1200" dirty="0"/>
+            <a:endParaRPr lang="en-US" sz="1100" dirty="0"/>
           </a:p>
           <a:p>
             <a:pPr indent="0" marL="0">
               <a:lnSpc>
-                <a:spcPts val="1800"/>
+                <a:spcPts val="1600"/>
               </a:lnSpc>
               <a:buNone/>
             </a:pPr>
             <a:r>
-              <a:rPr lang="en-US" sz="1200" dirty="0">
+              <a:rPr lang="en-US" sz="1100" dirty="0">
                 <a:solidFill>
                   <a:srgbClr val="A0A0A0"/>
                 </a:solidFill>
               </a:rPr>
               <a:t>whyWinner + warnings + assumptions in one artifact.</a:t>
             </a:r>
-            <a:endParaRPr lang="en-US" sz="1200" dirty="0"/>
+            <a:endParaRPr lang="en-US" sz="1100" dirty="0"/>
           </a:p>
         </p:txBody>
       </p:sp>
@@ -9529,30 +9559,32 @@
         <p:spPr>
           <a:xfrm>
             <a:off x="9326880" y="3886200"/>
-            <a:ext cx="2194560" cy="320040"/>
-          </a:xfrm>
-          <a:prstGeom prst="rect">
-            <a:avLst/>
-          </a:prstGeom>
-          <a:noFill/>
-          <a:ln/>
-        </p:spPr>
-        <p:txBody>
-          <a:bodyPr wrap="square" rtlCol="0" anchor="ctr"/>
-          <a:lstStyle/>
-          <a:p>
-            <a:pPr indent="0" marL="0">
-              <a:buNone/>
-            </a:pPr>
-            <a:r>
-              <a:rPr lang="en-US" sz="1400" b="1" dirty="0">
+            <a:ext cx="2194560" cy="365760"/>
+          </a:xfrm>
+          <a:prstGeom prst="rect">
+            <a:avLst/>
+          </a:prstGeom>
+          <a:noFill/>
+          <a:ln/>
+        </p:spPr>
+        <p:txBody>
+          <a:bodyPr wrap="square" rtlCol="0" anchor="ctr">
+            <a:normAutofit/>
+          </a:bodyPr>
+          <a:lstStyle/>
+          <a:p>
+            <a:pPr indent="0" marL="0">
+              <a:buNone/>
+            </a:pPr>
+            <a:r>
+              <a:rPr lang="en-US" sz="1300" b="1" dirty="0">
                 <a:solidFill>
                   <a:srgbClr val="FFFFFF"/>
                 </a:solidFill>
               </a:rPr>
               <a:t>4. Execute</a:t>
             </a:r>
-            <a:endParaRPr lang="en-US" sz="1400" dirty="0"/>
+            <a:endParaRPr lang="en-US" sz="1300" dirty="0"/>
           </a:p>
         </p:txBody>
       </p:sp>
@@ -9564,8 +9596,8 @@
         </p:nvSpPr>
         <p:spPr>
           <a:xfrm>
-            <a:off x="9326880" y="4206240"/>
-            <a:ext cx="2194560" cy="1645920"/>
+            <a:off x="9326880" y="4251960"/>
+            <a:ext cx="2194560" cy="1600200"/>
           </a:xfrm>
           <a:prstGeom prst="rect">
             <a:avLst/>
@@ -9579,19 +9611,19 @@
           <a:p>
             <a:pPr indent="0" marL="0">
               <a:lnSpc>
-                <a:spcPts val="1800"/>
+                <a:spcPts val="1600"/>
               </a:lnSpc>
               <a:buNone/>
             </a:pPr>
             <a:r>
-              <a:rPr lang="en-US" sz="1200" dirty="0">
+              <a:rPr lang="en-US" sz="1100" dirty="0">
                 <a:solidFill>
                   <a:srgbClr val="A0A0A0"/>
                 </a:solidFill>
               </a:rPr>
               <a:t>Use /v1/build-tx for ready-to-sign tx or open provider via deepLink.</a:t>
             </a:r>
-            <a:endParaRPr lang="en-US" sz="1200" dirty="0"/>
+            <a:endParaRPr lang="en-US" sz="1100" dirty="0"/>
           </a:p>
         </p:txBody>
       </p:sp>
@@ -9949,30 +9981,32 @@
         <p:spPr>
           <a:xfrm>
             <a:off x="6583680" y="1325880"/>
-            <a:ext cx="2194560" cy="320040"/>
-          </a:xfrm>
-          <a:prstGeom prst="rect">
-            <a:avLst/>
-          </a:prstGeom>
-          <a:noFill/>
-          <a:ln/>
-        </p:spPr>
-        <p:txBody>
-          <a:bodyPr wrap="square" rtlCol="0" anchor="ctr"/>
-          <a:lstStyle/>
-          <a:p>
-            <a:pPr indent="0" marL="0">
-              <a:buNone/>
-            </a:pPr>
-            <a:r>
-              <a:rPr lang="en-US" sz="1400" b="1" dirty="0">
+            <a:ext cx="2194560" cy="365760"/>
+          </a:xfrm>
+          <a:prstGeom prst="rect">
+            <a:avLst/>
+          </a:prstGeom>
+          <a:noFill/>
+          <a:ln/>
+        </p:spPr>
+        <p:txBody>
+          <a:bodyPr wrap="square" rtlCol="0" anchor="ctr">
+            <a:normAutofit/>
+          </a:bodyPr>
+          <a:lstStyle/>
+          <a:p>
+            <a:pPr indent="0" marL="0">
+              <a:buNone/>
+            </a:pPr>
+            <a:r>
+              <a:rPr lang="en-US" sz="1300" b="1" dirty="0">
                 <a:solidFill>
                   <a:srgbClr val="FFFFFF"/>
                 </a:solidFill>
               </a:rPr>
               <a:t>🔗  10+ Providers</a:t>
             </a:r>
-            <a:endParaRPr lang="en-US" sz="1400" dirty="0"/>
+            <a:endParaRPr lang="en-US" sz="1300" dirty="0"/>
           </a:p>
         </p:txBody>
       </p:sp>
@@ -9984,8 +10018,8 @@
         </p:nvSpPr>
         <p:spPr>
           <a:xfrm>
-            <a:off x="6583680" y="1645920"/>
-            <a:ext cx="2194560" cy="1645920"/>
+            <a:off x="6583680" y="1691640"/>
+            <a:ext cx="2194560" cy="1600200"/>
           </a:xfrm>
           <a:prstGeom prst="rect">
             <a:avLst/>
@@ -9999,19 +10033,19 @@
           <a:p>
             <a:pPr indent="0" marL="0">
               <a:lnSpc>
-                <a:spcPts val="1800"/>
+                <a:spcPts val="1600"/>
               </a:lnSpc>
               <a:buNone/>
             </a:pPr>
             <a:r>
-              <a:rPr lang="en-US" sz="1200" dirty="0">
+              <a:rPr lang="en-US" sz="1100" dirty="0">
                 <a:solidFill>
                   <a:srgbClr val="A0A0A0"/>
                 </a:solidFill>
               </a:rPr>
               <a:t>PancakeSwap · 1inch · OKX DEX · KyberSwap · ParaSwap · Odos · OpenOcean · 0x · Uniswap V2 · Uniswap V3</a:t>
             </a:r>
-            <a:endParaRPr lang="en-US" sz="1200" dirty="0"/>
+            <a:endParaRPr lang="en-US" sz="1100" dirty="0"/>
           </a:p>
         </p:txBody>
       </p:sp>
@@ -10051,30 +10085,32 @@
         <p:spPr>
           <a:xfrm>
             <a:off x="9326880" y="1325880"/>
-            <a:ext cx="2194560" cy="320040"/>
-          </a:xfrm>
-          <a:prstGeom prst="rect">
-            <a:avLst/>
-          </a:prstGeom>
-          <a:noFill/>
-          <a:ln/>
-        </p:spPr>
-        <p:txBody>
-          <a:bodyPr wrap="square" rtlCol="0" anchor="ctr"/>
-          <a:lstStyle/>
-          <a:p>
-            <a:pPr indent="0" marL="0">
-              <a:buNone/>
-            </a:pPr>
-            <a:r>
-              <a:rPr lang="en-US" sz="1400" b="1" dirty="0">
+            <a:ext cx="2194560" cy="365760"/>
+          </a:xfrm>
+          <a:prstGeom prst="rect">
+            <a:avLst/>
+          </a:prstGeom>
+          <a:noFill/>
+          <a:ln/>
+        </p:spPr>
+        <p:txBody>
+          <a:bodyPr wrap="square" rtlCol="0" anchor="ctr">
+            <a:normAutofit/>
+          </a:bodyPr>
+          <a:lstStyle/>
+          <a:p>
+            <a:pPr indent="0" marL="0">
+              <a:buNone/>
+            </a:pPr>
+            <a:r>
+              <a:rPr lang="en-US" sz="1300" b="1" dirty="0">
                 <a:solidFill>
                   <a:srgbClr val="FFFFFF"/>
                 </a:solidFill>
               </a:rPr>
               <a:t>⚙️  Capabilities</a:t>
             </a:r>
-            <a:endParaRPr lang="en-US" sz="1400" dirty="0"/>
+            <a:endParaRPr lang="en-US" sz="1300" dirty="0"/>
           </a:p>
         </p:txBody>
       </p:sp>
@@ -10086,8 +10122,8 @@
         </p:nvSpPr>
         <p:spPr>
           <a:xfrm>
-            <a:off x="9326880" y="1645920"/>
-            <a:ext cx="2194560" cy="1645920"/>
+            <a:off x="9326880" y="1691640"/>
+            <a:ext cx="2194560" cy="1600200"/>
           </a:xfrm>
           <a:prstGeom prst="rect">
             <a:avLst/>
@@ -10101,19 +10137,19 @@
           <a:p>
             <a:pPr indent="0" marL="0">
               <a:lnSpc>
-                <a:spcPts val="1800"/>
+                <a:spcPts val="1600"/>
               </a:lnSpc>
               <a:buNone/>
             </a:pPr>
             <a:r>
-              <a:rPr lang="en-US" sz="1200" dirty="0">
+              <a:rPr lang="en-US" sz="1100" dirty="0">
                 <a:solidFill>
                   <a:srgbClr val="A0A0A0"/>
                 </a:solidFill>
               </a:rPr>
               <a:t>Quotes + ranking · buildTx where supported · deep-links as fallback · health endpoint /v1/providers/status</a:t>
             </a:r>
-            <a:endParaRPr lang="en-US" sz="1200" dirty="0"/>
+            <a:endParaRPr lang="en-US" sz="1100" dirty="0"/>
           </a:p>
         </p:txBody>
       </p:sp>
@@ -10153,30 +10189,32 @@
         <p:spPr>
           <a:xfrm>
             <a:off x="6583680" y="3886200"/>
-            <a:ext cx="2194560" cy="320040"/>
-          </a:xfrm>
-          <a:prstGeom prst="rect">
-            <a:avLst/>
-          </a:prstGeom>
-          <a:noFill/>
-          <a:ln/>
-        </p:spPr>
-        <p:txBody>
-          <a:bodyPr wrap="square" rtlCol="0" anchor="ctr"/>
-          <a:lstStyle/>
-          <a:p>
-            <a:pPr indent="0" marL="0">
-              <a:buNone/>
-            </a:pPr>
-            <a:r>
-              <a:rPr lang="en-US" sz="1400" b="1" dirty="0">
+            <a:ext cx="2194560" cy="365760"/>
+          </a:xfrm>
+          <a:prstGeom prst="rect">
+            <a:avLst/>
+          </a:prstGeom>
+          <a:noFill/>
+          <a:ln/>
+        </p:spPr>
+        <p:txBody>
+          <a:bodyPr wrap="square" rtlCol="0" anchor="ctr">
+            <a:normAutofit/>
+          </a:bodyPr>
+          <a:lstStyle/>
+          <a:p>
+            <a:pPr indent="0" marL="0">
+              <a:buNone/>
+            </a:pPr>
+            <a:r>
+              <a:rPr lang="en-US" sz="1300" b="1" dirty="0">
                 <a:solidFill>
                   <a:srgbClr val="FFFFFF"/>
                 </a:solidFill>
               </a:rPr>
               <a:t>🛡️  Risk signals</a:t>
             </a:r>
-            <a:endParaRPr lang="en-US" sz="1400" dirty="0"/>
+            <a:endParaRPr lang="en-US" sz="1300" dirty="0"/>
           </a:p>
         </p:txBody>
       </p:sp>
@@ -10188,8 +10226,8 @@
         </p:nvSpPr>
         <p:spPr>
           <a:xfrm>
-            <a:off x="6583680" y="4206240"/>
-            <a:ext cx="2194560" cy="1645920"/>
+            <a:off x="6583680" y="4251960"/>
+            <a:ext cx="2194560" cy="1600200"/>
           </a:xfrm>
           <a:prstGeom prst="rect">
             <a:avLst/>
@@ -10203,19 +10241,19 @@
           <a:p>
             <a:pPr indent="0" marL="0">
               <a:lnSpc>
-                <a:spcPts val="1800"/>
+                <a:spcPts val="1600"/>
               </a:lnSpc>
               <a:buNone/>
             </a:pPr>
             <a:r>
-              <a:rPr lang="en-US" sz="1200" dirty="0">
+              <a:rPr lang="en-US" sz="1100" dirty="0">
                 <a:solidFill>
                   <a:srgbClr val="A0A0A0"/>
                 </a:solidFill>
               </a:rPr>
               <a:t>Sellability · revert risk · MEV exposure · churn · optional token security (GoPlus / Honeypot.is)</a:t>
             </a:r>
-            <a:endParaRPr lang="en-US" sz="1200" dirty="0"/>
+            <a:endParaRPr lang="en-US" sz="1100" dirty="0"/>
           </a:p>
         </p:txBody>
       </p:sp>
@@ -10255,30 +10293,32 @@
         <p:spPr>
           <a:xfrm>
             <a:off x="9326880" y="3886200"/>
-            <a:ext cx="2194560" cy="320040"/>
-          </a:xfrm>
-          <a:prstGeom prst="rect">
-            <a:avLst/>
-          </a:prstGeom>
-          <a:noFill/>
-          <a:ln/>
-        </p:spPr>
-        <p:txBody>
-          <a:bodyPr wrap="square" rtlCol="0" anchor="ctr"/>
-          <a:lstStyle/>
-          <a:p>
-            <a:pPr indent="0" marL="0">
-              <a:buNone/>
-            </a:pPr>
-            <a:r>
-              <a:rPr lang="en-US" sz="1400" b="1" dirty="0">
+            <a:ext cx="2194560" cy="365760"/>
+          </a:xfrm>
+          <a:prstGeom prst="rect">
+            <a:avLst/>
+          </a:prstGeom>
+          <a:noFill/>
+          <a:ln/>
+        </p:spPr>
+        <p:txBody>
+          <a:bodyPr wrap="square" rtlCol="0" anchor="ctr">
+            <a:normAutofit/>
+          </a:bodyPr>
+          <a:lstStyle/>
+          <a:p>
+            <a:pPr indent="0" marL="0">
+              <a:buNone/>
+            </a:pPr>
+            <a:r>
+              <a:rPr lang="en-US" sz="1300" b="1" dirty="0">
                 <a:solidFill>
                   <a:srgbClr val="FFFFFF"/>
                 </a:solidFill>
               </a:rPr>
               <a:t>🔐  Non-custodial</a:t>
             </a:r>
-            <a:endParaRPr lang="en-US" sz="1400" dirty="0"/>
+            <a:endParaRPr lang="en-US" sz="1300" dirty="0"/>
           </a:p>
         </p:txBody>
       </p:sp>
@@ -10290,8 +10330,8 @@
         </p:nvSpPr>
         <p:spPr>
           <a:xfrm>
-            <a:off x="9326880" y="4206240"/>
-            <a:ext cx="2194560" cy="1645920"/>
+            <a:off x="9326880" y="4251960"/>
+            <a:ext cx="2194560" cy="1600200"/>
           </a:xfrm>
           <a:prstGeom prst="rect">
             <a:avLst/>
@@ -10305,19 +10345,19 @@
           <a:p>
             <a:pPr indent="0" marL="0">
               <a:lnSpc>
-                <a:spcPts val="1800"/>
+                <a:spcPts val="1600"/>
               </a:lnSpc>
               <a:buNone/>
             </a:pPr>
             <a:r>
-              <a:rPr lang="en-US" sz="1200" dirty="0">
+              <a:rPr lang="en-US" sz="1100" dirty="0">
                 <a:solidFill>
                   <a:srgbClr val="A0A0A0"/>
                 </a:solidFill>
               </a:rPr>
               <a:t>Users sign in their wallet. SwapPilot does not hold keys or funds. Your keys, your crypto.</a:t>
             </a:r>
-            <a:endParaRPr lang="en-US" sz="1200" dirty="0"/>
+            <a:endParaRPr lang="en-US" sz="1100" dirty="0"/>
           </a:p>
         </p:txBody>
       </p:sp>
@@ -10658,30 +10698,32 @@
         <p:spPr>
           <a:xfrm>
             <a:off x="640080" y="3429000"/>
-            <a:ext cx="4663440" cy="320040"/>
-          </a:xfrm>
-          <a:prstGeom prst="rect">
-            <a:avLst/>
-          </a:prstGeom>
-          <a:noFill/>
-          <a:ln/>
-        </p:spPr>
-        <p:txBody>
-          <a:bodyPr wrap="square" rtlCol="0" anchor="ctr"/>
-          <a:lstStyle/>
-          <a:p>
-            <a:pPr indent="0" marL="0">
-              <a:buNone/>
-            </a:pPr>
-            <a:r>
-              <a:rPr lang="en-US" sz="1400" b="1" dirty="0">
+            <a:ext cx="4663440" cy="365760"/>
+          </a:xfrm>
+          <a:prstGeom prst="rect">
+            <a:avLst/>
+          </a:prstGeom>
+          <a:noFill/>
+          <a:ln/>
+        </p:spPr>
+        <p:txBody>
+          <a:bodyPr wrap="square" rtlCol="0" anchor="ctr">
+            <a:normAutofit/>
+          </a:bodyPr>
+          <a:lstStyle/>
+          <a:p>
+            <a:pPr indent="0" marL="0">
+              <a:buNone/>
+            </a:pPr>
+            <a:r>
+              <a:rPr lang="en-US" sz="1300" b="1" dirty="0">
                 <a:solidFill>
                   <a:srgbClr val="FFFFFF"/>
                 </a:solidFill>
               </a:rPr>
               <a:t>📋  Decision data includes</a:t>
             </a:r>
-            <a:endParaRPr lang="en-US" sz="1400" dirty="0"/>
+            <a:endParaRPr lang="en-US" sz="1300" dirty="0"/>
           </a:p>
         </p:txBody>
       </p:sp>
@@ -10693,8 +10735,8 @@
         </p:nvSpPr>
         <p:spPr>
           <a:xfrm>
-            <a:off x="640080" y="3749040"/>
-            <a:ext cx="4663440" cy="640080"/>
+            <a:off x="640080" y="3794760"/>
+            <a:ext cx="4663440" cy="594360"/>
           </a:xfrm>
           <a:prstGeom prst="rect">
             <a:avLst/>
@@ -10708,19 +10750,19 @@
           <a:p>
             <a:pPr indent="0" marL="0">
               <a:lnSpc>
-                <a:spcPts val="1800"/>
+                <a:spcPts val="1600"/>
               </a:lnSpc>
               <a:buNone/>
             </a:pPr>
             <a:r>
-              <a:rPr lang="en-US" sz="1200" dirty="0">
+              <a:rPr lang="en-US" sz="1100" dirty="0">
                 <a:solidFill>
                   <a:srgbClr val="A0A0A0"/>
                 </a:solidFill>
               </a:rPr>
               <a:t>rankedQuotes · beqRecommendedProviderId · whyWinner · warnings · ranking.mode · preflight signals</a:t>
             </a:r>
-            <a:endParaRPr lang="en-US" sz="1200" dirty="0"/>
+            <a:endParaRPr lang="en-US" sz="1100" dirty="0"/>
           </a:p>
         </p:txBody>
       </p:sp>
@@ -11672,30 +11714,32 @@
         <p:spPr>
           <a:xfrm>
             <a:off x="6583680" y="1325880"/>
-            <a:ext cx="4937760" cy="320040"/>
-          </a:xfrm>
-          <a:prstGeom prst="rect">
-            <a:avLst/>
-          </a:prstGeom>
-          <a:noFill/>
-          <a:ln/>
-        </p:spPr>
-        <p:txBody>
-          <a:bodyPr wrap="square" rtlCol="0" anchor="ctr"/>
-          <a:lstStyle/>
-          <a:p>
-            <a:pPr indent="0" marL="0">
-              <a:buNone/>
-            </a:pPr>
-            <a:r>
-              <a:rPr lang="en-US" sz="1400" b="1" dirty="0">
+            <a:ext cx="4937760" cy="365760"/>
+          </a:xfrm>
+          <a:prstGeom prst="rect">
+            <a:avLst/>
+          </a:prstGeom>
+          <a:noFill/>
+          <a:ln/>
+        </p:spPr>
+        <p:txBody>
+          <a:bodyPr wrap="square" rtlCol="0" anchor="ctr">
+            <a:normAutofit/>
+          </a:bodyPr>
+          <a:lstStyle/>
+          <a:p>
+            <a:pPr indent="0" marL="0">
+              <a:buNone/>
+            </a:pPr>
+            <a:r>
+              <a:rPr lang="en-US" sz="1300" b="1" dirty="0">
                 <a:solidFill>
                   <a:srgbClr val="FFFFFF"/>
                 </a:solidFill>
               </a:rPr>
               <a:t>💰  Fee engine (API)</a:t>
             </a:r>
-            <a:endParaRPr lang="en-US" sz="1400" dirty="0"/>
+            <a:endParaRPr lang="en-US" sz="1300" dirty="0"/>
           </a:p>
         </p:txBody>
       </p:sp>
@@ -11707,8 +11751,8 @@
         </p:nvSpPr>
         <p:spPr>
           <a:xfrm>
-            <a:off x="6583680" y="1645920"/>
-            <a:ext cx="4937760" cy="822960"/>
+            <a:off x="6583680" y="1691640"/>
+            <a:ext cx="4937760" cy="777240"/>
           </a:xfrm>
           <a:prstGeom prst="rect">
             <a:avLst/>
@@ -11722,19 +11766,19 @@
           <a:p>
             <a:pPr indent="0" marL="0">
               <a:lnSpc>
-                <a:spcPts val="1800"/>
+                <a:spcPts val="1600"/>
               </a:lnSpc>
               <a:buNone/>
             </a:pPr>
             <a:r>
-              <a:rPr lang="en-US" sz="1200" dirty="0">
+              <a:rPr lang="en-US" sz="1100" dirty="0">
                 <a:solidFill>
                   <a:srgbClr val="A0A0A0"/>
                 </a:solidFill>
               </a:rPr>
               <a:t>Endpoints /v1/fees/calculate and /v1/pilot/tier compute fees and holding-based discounts dynamically.</a:t>
             </a:r>
-            <a:endParaRPr lang="en-US" sz="1200" dirty="0"/>
+            <a:endParaRPr lang="en-US" sz="1100" dirty="0"/>
           </a:p>
         </p:txBody>
       </p:sp>
@@ -11774,30 +11818,32 @@
         <p:spPr>
           <a:xfrm>
             <a:off x="6583680" y="2971800"/>
-            <a:ext cx="4937760" cy="320040"/>
-          </a:xfrm>
-          <a:prstGeom prst="rect">
-            <a:avLst/>
-          </a:prstGeom>
-          <a:noFill/>
-          <a:ln/>
-        </p:spPr>
-        <p:txBody>
-          <a:bodyPr wrap="square" rtlCol="0" anchor="ctr"/>
-          <a:lstStyle/>
-          <a:p>
-            <a:pPr indent="0" marL="0">
-              <a:buNone/>
-            </a:pPr>
-            <a:r>
-              <a:rPr lang="en-US" sz="1400" b="1" dirty="0">
+            <a:ext cx="4937760" cy="365760"/>
+          </a:xfrm>
+          <a:prstGeom prst="rect">
+            <a:avLst/>
+          </a:prstGeom>
+          <a:noFill/>
+          <a:ln/>
+        </p:spPr>
+        <p:txBody>
+          <a:bodyPr wrap="square" rtlCol="0" anchor="ctr">
+            <a:normAutofit/>
+          </a:bodyPr>
+          <a:lstStyle/>
+          <a:p>
+            <a:pPr indent="0" marL="0">
+              <a:buNone/>
+            </a:pPr>
+            <a:r>
+              <a:rPr lang="en-US" sz="1300" b="1" dirty="0">
                 <a:solidFill>
                   <a:srgbClr val="FFFFFF"/>
                 </a:solidFill>
               </a:rPr>
               <a:t>🔥  Fee distribution (Contracts)</a:t>
             </a:r>
-            <a:endParaRPr lang="en-US" sz="1400" dirty="0"/>
+            <a:endParaRPr lang="en-US" sz="1300" dirty="0"/>
           </a:p>
         </p:txBody>
       </p:sp>
@@ -11809,8 +11855,8 @@
         </p:nvSpPr>
         <p:spPr>
           <a:xfrm>
-            <a:off x="6583680" y="3291840"/>
-            <a:ext cx="4937760" cy="822960"/>
+            <a:off x="6583680" y="3337560"/>
+            <a:ext cx="4937760" cy="777240"/>
           </a:xfrm>
           <a:prstGeom prst="rect">
             <a:avLst/>
@@ -11824,19 +11870,19 @@
           <a:p>
             <a:pPr indent="0" marL="0">
               <a:lnSpc>
-                <a:spcPts val="1800"/>
+                <a:spcPts val="1600"/>
               </a:lnSpc>
               <a:buNone/>
             </a:pPr>
             <a:r>
-              <a:rPr lang="en-US" sz="1200" dirty="0">
+              <a:rPr lang="en-US" sz="1100" dirty="0">
                 <a:solidFill>
                   <a:srgbClr val="A0A0A0"/>
                 </a:solidFill>
               </a:rPr>
               <a:t>FeeCollector contract: 15% buy &amp; burn · 85% treasury distribution. Deployed on BSC.</a:t>
             </a:r>
-            <a:endParaRPr lang="en-US" sz="1200" dirty="0"/>
+            <a:endParaRPr lang="en-US" sz="1100" dirty="0"/>
           </a:p>
         </p:txBody>
       </p:sp>
@@ -11876,30 +11922,32 @@
         <p:spPr>
           <a:xfrm>
             <a:off x="6583680" y="4617720"/>
-            <a:ext cx="4937760" cy="320040"/>
-          </a:xfrm>
-          <a:prstGeom prst="rect">
-            <a:avLst/>
-          </a:prstGeom>
-          <a:noFill/>
-          <a:ln/>
-        </p:spPr>
-        <p:txBody>
-          <a:bodyPr wrap="square" rtlCol="0" anchor="ctr"/>
-          <a:lstStyle/>
-          <a:p>
-            <a:pPr indent="0" marL="0">
-              <a:buNone/>
-            </a:pPr>
-            <a:r>
-              <a:rPr lang="en-US" sz="1400" b="1" dirty="0">
+            <a:ext cx="4937760" cy="365760"/>
+          </a:xfrm>
+          <a:prstGeom prst="rect">
+            <a:avLst/>
+          </a:prstGeom>
+          <a:noFill/>
+          <a:ln/>
+        </p:spPr>
+        <p:txBody>
+          <a:bodyPr wrap="square" rtlCol="0" anchor="ctr">
+            <a:normAutofit/>
+          </a:bodyPr>
+          <a:lstStyle/>
+          <a:p>
+            <a:pPr indent="0" marL="0">
+              <a:buNone/>
+            </a:pPr>
+            <a:r>
+              <a:rPr lang="en-US" sz="1300" b="1" dirty="0">
                 <a:solidFill>
                   <a:srgbClr val="FFFFFF"/>
                 </a:solidFill>
               </a:rPr>
               <a:t>🤝  Referral incentives (Contracts)</a:t>
             </a:r>
-            <a:endParaRPr lang="en-US" sz="1400" dirty="0"/>
+            <a:endParaRPr lang="en-US" sz="1300" dirty="0"/>
           </a:p>
         </p:txBody>
       </p:sp>
@@ -11911,8 +11959,8 @@
         </p:nvSpPr>
         <p:spPr>
           <a:xfrm>
-            <a:off x="6583680" y="4937760"/>
-            <a:ext cx="4937760" cy="822960"/>
+            <a:off x="6583680" y="4983480"/>
+            <a:ext cx="4937760" cy="777240"/>
           </a:xfrm>
           <a:prstGeom prst="rect">
             <a:avLst/>
@@ -11926,19 +11974,19 @@
           <a:p>
             <a:pPr indent="0" marL="0">
               <a:lnSpc>
-                <a:spcPts val="1800"/>
+                <a:spcPts val="1600"/>
               </a:lnSpc>
               <a:buNone/>
             </a:pPr>
             <a:r>
-              <a:rPr lang="en-US" sz="1200" dirty="0">
+              <a:rPr lang="en-US" sz="1100" dirty="0">
                 <a:solidFill>
                   <a:srgbClr val="A0A0A0"/>
                 </a:solidFill>
               </a:rPr>
               <a:t>ReferralPool + ReferralRewards contracts support referral-based reward flows for growth.</a:t>
             </a:r>
-            <a:endParaRPr lang="en-US" sz="1200" dirty="0"/>
+            <a:endParaRPr lang="en-US" sz="1100" dirty="0"/>
           </a:p>
         </p:txBody>
       </p:sp>
@@ -13746,30 +13794,32 @@
         <p:spPr>
           <a:xfrm>
             <a:off x="6583680" y="4617720"/>
-            <a:ext cx="4937760" cy="320040"/>
-          </a:xfrm>
-          <a:prstGeom prst="rect">
-            <a:avLst/>
-          </a:prstGeom>
-          <a:noFill/>
-          <a:ln/>
-        </p:spPr>
-        <p:txBody>
-          <a:bodyPr wrap="square" rtlCol="0" anchor="ctr"/>
-          <a:lstStyle/>
-          <a:p>
-            <a:pPr indent="0" marL="0">
-              <a:buNone/>
-            </a:pPr>
-            <a:r>
-              <a:rPr lang="en-US" sz="1400" b="1" dirty="0">
+            <a:ext cx="4937760" cy="365760"/>
+          </a:xfrm>
+          <a:prstGeom prst="rect">
+            <a:avLst/>
+          </a:prstGeom>
+          <a:noFill/>
+          <a:ln/>
+        </p:spPr>
+        <p:txBody>
+          <a:bodyPr wrap="square" rtlCol="0" anchor="ctr">
+            <a:normAutofit/>
+          </a:bodyPr>
+          <a:lstStyle/>
+          <a:p>
+            <a:pPr indent="0" marL="0">
+              <a:buNone/>
+            </a:pPr>
+            <a:r>
+              <a:rPr lang="en-US" sz="1300" b="1" dirty="0">
                 <a:solidFill>
                   <a:srgbClr val="FFFFFF"/>
                 </a:solidFill>
               </a:rPr>
               <a:t>TGE Circulating Supply</a:t>
             </a:r>
-            <a:endParaRPr lang="en-US" sz="1400" dirty="0"/>
+            <a:endParaRPr lang="en-US" sz="1300" dirty="0"/>
           </a:p>
         </p:txBody>
       </p:sp>

</xml_diff>

<commit_message>
fix(pitch-deck): slides 6 & 13 - compact metrics grid, stacked disclaimers
</commit_message>
<xml_diff>
--- a/pitch-deck/SwapPilot-Professional-PitchDeck.pptx
+++ b/pitch-deck/SwapPilot-Professional-PitchDeck.pptx
@@ -7051,12 +7051,12 @@
         </p:nvSpPr>
         <p:spPr>
           <a:xfrm>
-            <a:off x="4389120" y="1188720"/>
-            <a:ext cx="3657600" cy="1554480"/>
+            <a:off x="6217920" y="1188720"/>
+            <a:ext cx="5303520" cy="1280160"/>
           </a:xfrm>
           <a:prstGeom prst="roundRect">
             <a:avLst>
-              <a:gd name="adj" fmla="val 7059"/>
+              <a:gd name="adj" fmla="val 8571"/>
             </a:avLst>
           </a:prstGeom>
           <a:solidFill>
@@ -7078,8 +7078,8 @@
         </p:nvSpPr>
         <p:spPr>
           <a:xfrm>
-            <a:off x="4572000" y="1325880"/>
-            <a:ext cx="3291840" cy="365760"/>
+            <a:off x="6400800" y="1325880"/>
+            <a:ext cx="4937760" cy="365760"/>
           </a:xfrm>
           <a:prstGeom prst="rect">
             <a:avLst/>
@@ -7116,8 +7116,8 @@
         </p:nvSpPr>
         <p:spPr>
           <a:xfrm>
-            <a:off x="4572000" y="1691640"/>
-            <a:ext cx="3291840" cy="868680"/>
+            <a:off x="6400800" y="1691640"/>
+            <a:ext cx="4937760" cy="594360"/>
           </a:xfrm>
           <a:prstGeom prst="rect">
             <a:avLst/>
@@ -7155,12 +7155,12 @@
         </p:nvSpPr>
         <p:spPr>
           <a:xfrm>
-            <a:off x="4389120" y="2834640"/>
-            <a:ext cx="3657600" cy="1554480"/>
+            <a:off x="6217920" y="2606040"/>
+            <a:ext cx="5303520" cy="1280160"/>
           </a:xfrm>
           <a:prstGeom prst="roundRect">
             <a:avLst>
-              <a:gd name="adj" fmla="val 7059"/>
+              <a:gd name="adj" fmla="val 8571"/>
             </a:avLst>
           </a:prstGeom>
           <a:solidFill>
@@ -7182,8 +7182,8 @@
         </p:nvSpPr>
         <p:spPr>
           <a:xfrm>
-            <a:off x="4572000" y="2971800"/>
-            <a:ext cx="3291840" cy="365760"/>
+            <a:off x="6400800" y="2743200"/>
+            <a:ext cx="4937760" cy="365760"/>
           </a:xfrm>
           <a:prstGeom prst="rect">
             <a:avLst/>
@@ -7220,8 +7220,8 @@
         </p:nvSpPr>
         <p:spPr>
           <a:xfrm>
-            <a:off x="4572000" y="3337560"/>
-            <a:ext cx="3291840" cy="868680"/>
+            <a:off x="6400800" y="3108960"/>
+            <a:ext cx="4937760" cy="594360"/>
           </a:xfrm>
           <a:prstGeom prst="rect">
             <a:avLst/>
@@ -7259,12 +7259,12 @@
         </p:nvSpPr>
         <p:spPr>
           <a:xfrm>
-            <a:off x="4389120" y="4480560"/>
-            <a:ext cx="3657600" cy="1554480"/>
+            <a:off x="6217920" y="4023360"/>
+            <a:ext cx="5303520" cy="1280160"/>
           </a:xfrm>
           <a:prstGeom prst="roundRect">
             <a:avLst>
-              <a:gd name="adj" fmla="val 7059"/>
+              <a:gd name="adj" fmla="val 8571"/>
             </a:avLst>
           </a:prstGeom>
           <a:solidFill>
@@ -7286,8 +7286,8 @@
         </p:nvSpPr>
         <p:spPr>
           <a:xfrm>
-            <a:off x="4572000" y="4617720"/>
-            <a:ext cx="3291840" cy="365760"/>
+            <a:off x="6400800" y="4160520"/>
+            <a:ext cx="4937760" cy="365760"/>
           </a:xfrm>
           <a:prstGeom prst="rect">
             <a:avLst/>
@@ -7324,8 +7324,8 @@
         </p:nvSpPr>
         <p:spPr>
           <a:xfrm>
-            <a:off x="4572000" y="4983480"/>
-            <a:ext cx="3291840" cy="868680"/>
+            <a:off x="6400800" y="4526280"/>
+            <a:ext cx="4937760" cy="594360"/>
           </a:xfrm>
           <a:prstGeom prst="rect">
             <a:avLst/>
@@ -7363,12 +7363,12 @@
         </p:nvSpPr>
         <p:spPr>
           <a:xfrm>
-            <a:off x="8229600" y="1188720"/>
-            <a:ext cx="3657600" cy="1554480"/>
+            <a:off x="6217920" y="5440680"/>
+            <a:ext cx="5303520" cy="1280160"/>
           </a:xfrm>
           <a:prstGeom prst="roundRect">
             <a:avLst>
-              <a:gd name="adj" fmla="val 7059"/>
+              <a:gd name="adj" fmla="val 8571"/>
             </a:avLst>
           </a:prstGeom>
           <a:solidFill>
@@ -7390,8 +7390,8 @@
         </p:nvSpPr>
         <p:spPr>
           <a:xfrm>
-            <a:off x="8412480" y="1325880"/>
-            <a:ext cx="3291840" cy="365760"/>
+            <a:off x="6400800" y="5577840"/>
+            <a:ext cx="4937760" cy="365760"/>
           </a:xfrm>
           <a:prstGeom prst="rect">
             <a:avLst/>
@@ -7428,8 +7428,8 @@
         </p:nvSpPr>
         <p:spPr>
           <a:xfrm>
-            <a:off x="8412480" y="1691640"/>
-            <a:ext cx="3291840" cy="868680"/>
+            <a:off x="6400800" y="5943600"/>
+            <a:ext cx="4937760" cy="594360"/>
           </a:xfrm>
           <a:prstGeom prst="rect">
             <a:avLst/>
@@ -7467,12 +7467,12 @@
         </p:nvSpPr>
         <p:spPr>
           <a:xfrm>
-            <a:off x="8229600" y="2834640"/>
-            <a:ext cx="3657600" cy="1554480"/>
+            <a:off x="6217920" y="6858000"/>
+            <a:ext cx="5303520" cy="1280160"/>
           </a:xfrm>
           <a:prstGeom prst="roundRect">
             <a:avLst>
-              <a:gd name="adj" fmla="val 7059"/>
+              <a:gd name="adj" fmla="val 8571"/>
             </a:avLst>
           </a:prstGeom>
           <a:solidFill>
@@ -7494,8 +7494,8 @@
         </p:nvSpPr>
         <p:spPr>
           <a:xfrm>
-            <a:off x="8412480" y="2971800"/>
-            <a:ext cx="3291840" cy="365760"/>
+            <a:off x="6400800" y="6995160"/>
+            <a:ext cx="4937760" cy="365760"/>
           </a:xfrm>
           <a:prstGeom prst="rect">
             <a:avLst/>
@@ -7518,7 +7518,7 @@
                   <a:srgbClr val="FFFFFF"/>
                 </a:solidFill>
               </a:rPr>
-              <a:t>🔮  Forward-looking statements</a:t>
+              <a:t>🔮  Forward-looking</a:t>
             </a:r>
             <a:endParaRPr lang="en-US" sz="1300" dirty="0"/>
           </a:p>
@@ -7532,8 +7532,8 @@
         </p:nvSpPr>
         <p:spPr>
           <a:xfrm>
-            <a:off x="8412480" y="3337560"/>
-            <a:ext cx="3291840" cy="868680"/>
+            <a:off x="6400800" y="7360920"/>
+            <a:ext cx="4937760" cy="594360"/>
           </a:xfrm>
           <a:prstGeom prst="rect">
             <a:avLst/>
@@ -7557,7 +7557,7 @@
                   <a:srgbClr val="A0A0A0"/>
                 </a:solidFill>
               </a:rPr>
-              <a:t>Roadmap and projections are subject to change.</a:t>
+              <a:t>Roadmap and projections are subject to change without notice.</a:t>
             </a:r>
             <a:endParaRPr lang="en-US" sz="1100" dirty="0"/>
           </a:p>
@@ -10670,12 +10670,12 @@
         </p:nvSpPr>
         <p:spPr>
           <a:xfrm>
-            <a:off x="457200" y="3291840"/>
-            <a:ext cx="5029200" cy="1280160"/>
+            <a:off x="457200" y="3108960"/>
+            <a:ext cx="5029200" cy="1188720"/>
           </a:xfrm>
           <a:prstGeom prst="roundRect">
             <a:avLst>
-              <a:gd name="adj" fmla="val 8571"/>
+              <a:gd name="adj" fmla="val 9231"/>
             </a:avLst>
           </a:prstGeom>
           <a:solidFill>
@@ -10697,7 +10697,7 @@
         </p:nvSpPr>
         <p:spPr>
           <a:xfrm>
-            <a:off x="640080" y="3429000"/>
+            <a:off x="640080" y="3246120"/>
             <a:ext cx="4663440" cy="365760"/>
           </a:xfrm>
           <a:prstGeom prst="rect">
@@ -10735,8 +10735,8 @@
         </p:nvSpPr>
         <p:spPr>
           <a:xfrm>
-            <a:off x="640080" y="3794760"/>
-            <a:ext cx="4663440" cy="594360"/>
+            <a:off x="640080" y="3611880"/>
+            <a:ext cx="4663440" cy="502920"/>
           </a:xfrm>
           <a:prstGeom prst="rect">
             <a:avLst/>
@@ -10774,12 +10774,12 @@
         </p:nvSpPr>
         <p:spPr>
           <a:xfrm>
-            <a:off x="5943600" y="1188720"/>
-            <a:ext cx="2834640" cy="1463040"/>
+            <a:off x="5760720" y="1188720"/>
+            <a:ext cx="1920240" cy="1188720"/>
           </a:xfrm>
           <a:prstGeom prst="roundRect">
             <a:avLst>
-              <a:gd name="adj" fmla="val 5000"/>
+              <a:gd name="adj" fmla="val 6154"/>
             </a:avLst>
           </a:prstGeom>
           <a:solidFill>
@@ -10801,8 +10801,8 @@
         </p:nvSpPr>
         <p:spPr>
           <a:xfrm>
-            <a:off x="6080760" y="1325880"/>
-            <a:ext cx="2560320" cy="228600"/>
+            <a:off x="5897880" y="1325880"/>
+            <a:ext cx="1645920" cy="228600"/>
           </a:xfrm>
           <a:prstGeom prst="rect">
             <a:avLst/>
@@ -10837,8 +10837,8 @@
         </p:nvSpPr>
         <p:spPr>
           <a:xfrm>
-            <a:off x="6080760" y="1554480"/>
-            <a:ext cx="2560320" cy="960120"/>
+            <a:off x="5897880" y="1554480"/>
+            <a:ext cx="1645920" cy="685800"/>
           </a:xfrm>
           <a:prstGeom prst="rect">
             <a:avLst/>
@@ -10873,12 +10873,12 @@
         </p:nvSpPr>
         <p:spPr>
           <a:xfrm>
-            <a:off x="8961120" y="1188720"/>
-            <a:ext cx="2834640" cy="1463040"/>
+            <a:off x="7863840" y="1188720"/>
+            <a:ext cx="1920240" cy="1188720"/>
           </a:xfrm>
           <a:prstGeom prst="roundRect">
             <a:avLst>
-              <a:gd name="adj" fmla="val 5000"/>
+              <a:gd name="adj" fmla="val 6154"/>
             </a:avLst>
           </a:prstGeom>
           <a:solidFill>
@@ -10900,8 +10900,8 @@
         </p:nvSpPr>
         <p:spPr>
           <a:xfrm>
-            <a:off x="9098280" y="1325880"/>
-            <a:ext cx="2560320" cy="228600"/>
+            <a:off x="8001000" y="1325880"/>
+            <a:ext cx="1645920" cy="228600"/>
           </a:xfrm>
           <a:prstGeom prst="rect">
             <a:avLst/>
@@ -10936,8 +10936,8 @@
         </p:nvSpPr>
         <p:spPr>
           <a:xfrm>
-            <a:off x="9098280" y="1554480"/>
-            <a:ext cx="2560320" cy="960120"/>
+            <a:off x="8001000" y="1554480"/>
+            <a:ext cx="1645920" cy="685800"/>
           </a:xfrm>
           <a:prstGeom prst="rect">
             <a:avLst/>
@@ -10972,12 +10972,12 @@
         </p:nvSpPr>
         <p:spPr>
           <a:xfrm>
-            <a:off x="5943600" y="2834640"/>
-            <a:ext cx="2834640" cy="1463040"/>
+            <a:off x="9966960" y="1188720"/>
+            <a:ext cx="1920240" cy="1188720"/>
           </a:xfrm>
           <a:prstGeom prst="roundRect">
             <a:avLst>
-              <a:gd name="adj" fmla="val 5000"/>
+              <a:gd name="adj" fmla="val 6154"/>
             </a:avLst>
           </a:prstGeom>
           <a:solidFill>
@@ -10999,8 +10999,8 @@
         </p:nvSpPr>
         <p:spPr>
           <a:xfrm>
-            <a:off x="6080760" y="2971800"/>
-            <a:ext cx="2560320" cy="228600"/>
+            <a:off x="10104120" y="1325880"/>
+            <a:ext cx="1645920" cy="228600"/>
           </a:xfrm>
           <a:prstGeom prst="rect">
             <a:avLst/>
@@ -11035,8 +11035,8 @@
         </p:nvSpPr>
         <p:spPr>
           <a:xfrm>
-            <a:off x="6080760" y="3200400"/>
-            <a:ext cx="2560320" cy="960120"/>
+            <a:off x="10104120" y="1554480"/>
+            <a:ext cx="1645920" cy="685800"/>
           </a:xfrm>
           <a:prstGeom prst="rect">
             <a:avLst/>
@@ -11071,12 +11071,12 @@
         </p:nvSpPr>
         <p:spPr>
           <a:xfrm>
-            <a:off x="8961120" y="2834640"/>
-            <a:ext cx="2834640" cy="1463040"/>
+            <a:off x="5760720" y="2560320"/>
+            <a:ext cx="1920240" cy="1188720"/>
           </a:xfrm>
           <a:prstGeom prst="roundRect">
             <a:avLst>
-              <a:gd name="adj" fmla="val 5000"/>
+              <a:gd name="adj" fmla="val 6154"/>
             </a:avLst>
           </a:prstGeom>
           <a:solidFill>
@@ -11098,8 +11098,8 @@
         </p:nvSpPr>
         <p:spPr>
           <a:xfrm>
-            <a:off x="9098280" y="2971800"/>
-            <a:ext cx="2560320" cy="228600"/>
+            <a:off x="5897880" y="2697480"/>
+            <a:ext cx="1645920" cy="228600"/>
           </a:xfrm>
           <a:prstGeom prst="rect">
             <a:avLst/>
@@ -11134,8 +11134,8 @@
         </p:nvSpPr>
         <p:spPr>
           <a:xfrm>
-            <a:off x="9098280" y="3200400"/>
-            <a:ext cx="2560320" cy="960120"/>
+            <a:off x="5897880" y="2926080"/>
+            <a:ext cx="1645920" cy="685800"/>
           </a:xfrm>
           <a:prstGeom prst="rect">
             <a:avLst/>
@@ -11170,12 +11170,12 @@
         </p:nvSpPr>
         <p:spPr>
           <a:xfrm>
-            <a:off x="5943600" y="4480560"/>
-            <a:ext cx="2834640" cy="1463040"/>
+            <a:off x="7863840" y="2560320"/>
+            <a:ext cx="1920240" cy="1188720"/>
           </a:xfrm>
           <a:prstGeom prst="roundRect">
             <a:avLst>
-              <a:gd name="adj" fmla="val 5000"/>
+              <a:gd name="adj" fmla="val 6154"/>
             </a:avLst>
           </a:prstGeom>
           <a:solidFill>
@@ -11197,8 +11197,8 @@
         </p:nvSpPr>
         <p:spPr>
           <a:xfrm>
-            <a:off x="6080760" y="4617720"/>
-            <a:ext cx="2560320" cy="228600"/>
+            <a:off x="8001000" y="2697480"/>
+            <a:ext cx="1645920" cy="228600"/>
           </a:xfrm>
           <a:prstGeom prst="rect">
             <a:avLst/>
@@ -11233,8 +11233,8 @@
         </p:nvSpPr>
         <p:spPr>
           <a:xfrm>
-            <a:off x="6080760" y="4846320"/>
-            <a:ext cx="2560320" cy="960120"/>
+            <a:off x="8001000" y="2926080"/>
+            <a:ext cx="1645920" cy="685800"/>
           </a:xfrm>
           <a:prstGeom prst="rect">
             <a:avLst/>
@@ -11269,12 +11269,12 @@
         </p:nvSpPr>
         <p:spPr>
           <a:xfrm>
-            <a:off x="8961120" y="4480560"/>
-            <a:ext cx="2834640" cy="1463040"/>
+            <a:off x="9966960" y="2560320"/>
+            <a:ext cx="1920240" cy="1188720"/>
           </a:xfrm>
           <a:prstGeom prst="roundRect">
             <a:avLst>
-              <a:gd name="adj" fmla="val 5000"/>
+              <a:gd name="adj" fmla="val 6154"/>
             </a:avLst>
           </a:prstGeom>
           <a:solidFill>
@@ -11296,8 +11296,8 @@
         </p:nvSpPr>
         <p:spPr>
           <a:xfrm>
-            <a:off x="9098280" y="4617720"/>
-            <a:ext cx="2560320" cy="228600"/>
+            <a:off x="10104120" y="2697480"/>
+            <a:ext cx="1645920" cy="228600"/>
           </a:xfrm>
           <a:prstGeom prst="rect">
             <a:avLst/>
@@ -11332,8 +11332,8 @@
         </p:nvSpPr>
         <p:spPr>
           <a:xfrm>
-            <a:off x="9098280" y="4846320"/>
-            <a:ext cx="2560320" cy="960120"/>
+            <a:off x="10104120" y="2926080"/>
+            <a:ext cx="1645920" cy="685800"/>
           </a:xfrm>
           <a:prstGeom prst="rect">
             <a:avLst/>

</xml_diff>

<commit_message>
fix: resolve pitch deck overlays on slides 5, 8, and 13
- Slide 5: reduced title size and repositioned donut chart
- Slide 8: compacted token allocation layout and reduced donut size
- Slide 13: optimized disclaimer cards spacing and footer position
- Removed duplicate pitch deck files
</commit_message>
<xml_diff>
--- a/pitch-deck/SwapPilot-Professional-PitchDeck.pptx
+++ b/pitch-deck/SwapPilot-Professional-PitchDeck.pptx
@@ -7052,11 +7052,11 @@
         <p:spPr>
           <a:xfrm>
             <a:off x="6217920" y="1188720"/>
-            <a:ext cx="5303520" cy="1280160"/>
+            <a:ext cx="5303520" cy="1188720"/>
           </a:xfrm>
           <a:prstGeom prst="roundRect">
             <a:avLst>
-              <a:gd name="adj" fmla="val 8571"/>
+              <a:gd name="adj" fmla="val 9231"/>
             </a:avLst>
           </a:prstGeom>
           <a:solidFill>
@@ -7117,7 +7117,7 @@
         <p:spPr>
           <a:xfrm>
             <a:off x="6400800" y="1691640"/>
-            <a:ext cx="4937760" cy="594360"/>
+            <a:ext cx="4937760" cy="502920"/>
           </a:xfrm>
           <a:prstGeom prst="rect">
             <a:avLst/>
@@ -7155,12 +7155,12 @@
         </p:nvSpPr>
         <p:spPr>
           <a:xfrm>
-            <a:off x="6217920" y="2606040"/>
-            <a:ext cx="5303520" cy="1280160"/>
+            <a:off x="6217920" y="2514600"/>
+            <a:ext cx="5303520" cy="1188720"/>
           </a:xfrm>
           <a:prstGeom prst="roundRect">
             <a:avLst>
-              <a:gd name="adj" fmla="val 8571"/>
+              <a:gd name="adj" fmla="val 9231"/>
             </a:avLst>
           </a:prstGeom>
           <a:solidFill>
@@ -7182,7 +7182,7 @@
         </p:nvSpPr>
         <p:spPr>
           <a:xfrm>
-            <a:off x="6400800" y="2743200"/>
+            <a:off x="6400800" y="2651760"/>
             <a:ext cx="4937760" cy="365760"/>
           </a:xfrm>
           <a:prstGeom prst="rect">
@@ -7220,8 +7220,8 @@
         </p:nvSpPr>
         <p:spPr>
           <a:xfrm>
-            <a:off x="6400800" y="3108960"/>
-            <a:ext cx="4937760" cy="594360"/>
+            <a:off x="6400800" y="3017520"/>
+            <a:ext cx="4937760" cy="502920"/>
           </a:xfrm>
           <a:prstGeom prst="rect">
             <a:avLst/>
@@ -7259,12 +7259,12 @@
         </p:nvSpPr>
         <p:spPr>
           <a:xfrm>
-            <a:off x="6217920" y="4023360"/>
-            <a:ext cx="5303520" cy="1280160"/>
+            <a:off x="6217920" y="3840480"/>
+            <a:ext cx="5303520" cy="1188720"/>
           </a:xfrm>
           <a:prstGeom prst="roundRect">
             <a:avLst>
-              <a:gd name="adj" fmla="val 8571"/>
+              <a:gd name="adj" fmla="val 9231"/>
             </a:avLst>
           </a:prstGeom>
           <a:solidFill>
@@ -7286,7 +7286,7 @@
         </p:nvSpPr>
         <p:spPr>
           <a:xfrm>
-            <a:off x="6400800" y="4160520"/>
+            <a:off x="6400800" y="3977640"/>
             <a:ext cx="4937760" cy="365760"/>
           </a:xfrm>
           <a:prstGeom prst="rect">
@@ -7324,8 +7324,8 @@
         </p:nvSpPr>
         <p:spPr>
           <a:xfrm>
-            <a:off x="6400800" y="4526280"/>
-            <a:ext cx="4937760" cy="594360"/>
+            <a:off x="6400800" y="4343400"/>
+            <a:ext cx="4937760" cy="502920"/>
           </a:xfrm>
           <a:prstGeom prst="rect">
             <a:avLst/>
@@ -7363,12 +7363,12 @@
         </p:nvSpPr>
         <p:spPr>
           <a:xfrm>
-            <a:off x="6217920" y="5440680"/>
-            <a:ext cx="5303520" cy="1280160"/>
+            <a:off x="6217920" y="5166360"/>
+            <a:ext cx="5303520" cy="1188720"/>
           </a:xfrm>
           <a:prstGeom prst="roundRect">
             <a:avLst>
-              <a:gd name="adj" fmla="val 8571"/>
+              <a:gd name="adj" fmla="val 9231"/>
             </a:avLst>
           </a:prstGeom>
           <a:solidFill>
@@ -7390,7 +7390,7 @@
         </p:nvSpPr>
         <p:spPr>
           <a:xfrm>
-            <a:off x="6400800" y="5577840"/>
+            <a:off x="6400800" y="5303520"/>
             <a:ext cx="4937760" cy="365760"/>
           </a:xfrm>
           <a:prstGeom prst="rect">
@@ -7428,8 +7428,8 @@
         </p:nvSpPr>
         <p:spPr>
           <a:xfrm>
-            <a:off x="6400800" y="5943600"/>
-            <a:ext cx="4937760" cy="594360"/>
+            <a:off x="6400800" y="5669280"/>
+            <a:ext cx="4937760" cy="502920"/>
           </a:xfrm>
           <a:prstGeom prst="rect">
             <a:avLst/>
@@ -7461,111 +7461,7 @@
       </p:sp>
       <p:sp>
         <p:nvSpPr>
-          <p:cNvPr id="22" name="Shape 20"/>
-          <p:cNvSpPr/>
-          <p:nvPr/>
-        </p:nvSpPr>
-        <p:spPr>
-          <a:xfrm>
-            <a:off x="6217920" y="6858000"/>
-            <a:ext cx="5303520" cy="1280160"/>
-          </a:xfrm>
-          <a:prstGeom prst="roundRect">
-            <a:avLst>
-              <a:gd name="adj" fmla="val 8571"/>
-            </a:avLst>
-          </a:prstGeom>
-          <a:solidFill>
-            <a:srgbClr val="0D1117"/>
-          </a:solidFill>
-          <a:ln w="6350">
-            <a:solidFill>
-              <a:srgbClr val="2A2A2A"/>
-            </a:solidFill>
-            <a:prstDash val="solid"/>
-          </a:ln>
-        </p:spPr>
-      </p:sp>
-      <p:sp>
-        <p:nvSpPr>
-          <p:cNvPr id="23" name="Text 21"/>
-          <p:cNvSpPr/>
-          <p:nvPr/>
-        </p:nvSpPr>
-        <p:spPr>
-          <a:xfrm>
-            <a:off x="6400800" y="6995160"/>
-            <a:ext cx="4937760" cy="365760"/>
-          </a:xfrm>
-          <a:prstGeom prst="rect">
-            <a:avLst/>
-          </a:prstGeom>
-          <a:noFill/>
-          <a:ln/>
-        </p:spPr>
-        <p:txBody>
-          <a:bodyPr wrap="square" rtlCol="0" anchor="ctr">
-            <a:normAutofit/>
-          </a:bodyPr>
-          <a:lstStyle/>
-          <a:p>
-            <a:pPr indent="0" marL="0">
-              <a:buNone/>
-            </a:pPr>
-            <a:r>
-              <a:rPr lang="en-US" sz="1300" b="1" dirty="0">
-                <a:solidFill>
-                  <a:srgbClr val="FFFFFF"/>
-                </a:solidFill>
-              </a:rPr>
-              <a:t>🔮  Forward-looking</a:t>
-            </a:r>
-            <a:endParaRPr lang="en-US" sz="1300" dirty="0"/>
-          </a:p>
-        </p:txBody>
-      </p:sp>
-      <p:sp>
-        <p:nvSpPr>
-          <p:cNvPr id="24" name="Text 22"/>
-          <p:cNvSpPr/>
-          <p:nvPr/>
-        </p:nvSpPr>
-        <p:spPr>
-          <a:xfrm>
-            <a:off x="6400800" y="7360920"/>
-            <a:ext cx="4937760" cy="594360"/>
-          </a:xfrm>
-          <a:prstGeom prst="rect">
-            <a:avLst/>
-          </a:prstGeom>
-          <a:noFill/>
-          <a:ln/>
-        </p:spPr>
-        <p:txBody>
-          <a:bodyPr wrap="square" rtlCol="0" anchor="t"/>
-          <a:lstStyle/>
-          <a:p>
-            <a:pPr indent="0" marL="0">
-              <a:lnSpc>
-                <a:spcPts val="1600"/>
-              </a:lnSpc>
-              <a:buNone/>
-            </a:pPr>
-            <a:r>
-              <a:rPr lang="en-US" sz="1100" dirty="0">
-                <a:solidFill>
-                  <a:srgbClr val="A0A0A0"/>
-                </a:solidFill>
-              </a:rPr>
-              <a:t>Roadmap and projections are subject to change without notice.</a:t>
-            </a:r>
-            <a:endParaRPr lang="en-US" sz="1100" dirty="0"/>
-          </a:p>
-        </p:txBody>
-      </p:sp>
-      <p:sp>
-        <p:nvSpPr>
-          <p:cNvPr id="25" name="Text 23"/>
+          <p:cNvPr id="22" name="Text 20"/>
           <p:cNvSpPr/>
           <p:nvPr/>
         </p:nvSpPr>
@@ -7588,14 +7484,14 @@
               <a:buNone/>
             </a:pPr>
             <a:r>
-              <a:rPr lang="en-US" sz="1000" dirty="0">
+              <a:rPr lang="en-US" sz="900" dirty="0">
                 <a:solidFill>
                   <a:srgbClr val="A0A0A0"/>
                 </a:solidFill>
               </a:rPr>
               <a:t>By participating in the Public Sale, you acknowledge that you have read and understood these disclosures.</a:t>
             </a:r>
-            <a:endParaRPr lang="en-US" sz="1000" dirty="0"/>
+            <a:endParaRPr lang="en-US" sz="900" dirty="0"/>
           </a:p>
         </p:txBody>
       </p:sp>
@@ -9802,7 +9698,7 @@
         </p:nvSpPr>
         <p:spPr>
           <a:xfrm>
-            <a:off x="457200" y="1170432"/>
+            <a:off x="457200" y="1078992"/>
             <a:ext cx="320040" cy="36576"/>
           </a:xfrm>
           <a:prstGeom prst="rect">
@@ -9822,7 +9718,7 @@
         </p:nvSpPr>
         <p:spPr>
           <a:xfrm>
-            <a:off x="868680" y="1097280"/>
+            <a:off x="868680" y="1005840"/>
             <a:ext cx="2743200" cy="274320"/>
           </a:xfrm>
           <a:prstGeom prst="rect">
@@ -9858,8 +9754,44 @@
         </p:nvSpPr>
         <p:spPr>
           <a:xfrm>
-            <a:off x="457200" y="1417320"/>
-            <a:ext cx="5486400" cy="914400"/>
+            <a:off x="457200" y="1371600"/>
+            <a:ext cx="5486400" cy="548640"/>
+          </a:xfrm>
+          <a:prstGeom prst="rect">
+            <a:avLst/>
+          </a:prstGeom>
+          <a:noFill/>
+          <a:ln/>
+        </p:spPr>
+        <p:txBody>
+          <a:bodyPr wrap="square" rtlCol="0" anchor="ctr"/>
+          <a:lstStyle/>
+          <a:p>
+            <a:pPr indent="0" marL="0">
+              <a:buNone/>
+            </a:pPr>
+            <a:r>
+              <a:rPr lang="en-US" sz="3200" b="1" dirty="0">
+                <a:solidFill>
+                  <a:srgbClr val="FFFFFF"/>
+                </a:solidFill>
+              </a:rPr>
+              <a:t>BNB Chain Coverage</a:t>
+            </a:r>
+            <a:endParaRPr lang="en-US" sz="3200" dirty="0"/>
+          </a:p>
+        </p:txBody>
+      </p:sp>
+      <p:sp>
+        <p:nvSpPr>
+          <p:cNvPr id="9" name="Text 7"/>
+          <p:cNvSpPr/>
+          <p:nvPr/>
+        </p:nvSpPr>
+        <p:spPr>
+          <a:xfrm>
+            <a:off x="457200" y="2011680"/>
+            <a:ext cx="5029200" cy="731520"/>
           </a:xfrm>
           <a:prstGeom prst="rect">
             <a:avLst/>
@@ -9873,75 +9805,19 @@
           <a:p>
             <a:pPr indent="0" marL="0">
               <a:lnSpc>
-                <a:spcPts val="4200"/>
+                <a:spcPts val="2200"/>
               </a:lnSpc>
               <a:buNone/>
             </a:pPr>
             <a:r>
-              <a:rPr lang="en-US" sz="3600" b="1" dirty="0">
-                <a:solidFill>
-                  <a:srgbClr val="FFFFFF"/>
-                </a:solidFill>
-              </a:rPr>
-              <a:t>Providers on</a:t>
-            </a:r>
-            <a:endParaRPr lang="en-US" sz="3600" dirty="0"/>
-          </a:p>
-          <a:p>
-            <a:pPr indent="0" marL="0">
-              <a:lnSpc>
-                <a:spcPts val="4200"/>
-              </a:lnSpc>
-              <a:buNone/>
-            </a:pPr>
-            <a:r>
-              <a:rPr lang="en-US" sz="3600" b="1" dirty="0">
-                <a:solidFill>
-                  <a:srgbClr val="FFFFFF"/>
-                </a:solidFill>
-              </a:rPr>
-              <a:t>BNB Chain</a:t>
-            </a:r>
-            <a:endParaRPr lang="en-US" sz="3600" dirty="0"/>
-          </a:p>
-        </p:txBody>
-      </p:sp>
-      <p:sp>
-        <p:nvSpPr>
-          <p:cNvPr id="9" name="Text 7"/>
-          <p:cNvSpPr/>
-          <p:nvPr/>
-        </p:nvSpPr>
-        <p:spPr>
-          <a:xfrm>
-            <a:off x="457200" y="2286000"/>
-            <a:ext cx="5029200" cy="914400"/>
-          </a:xfrm>
-          <a:prstGeom prst="rect">
-            <a:avLst/>
-          </a:prstGeom>
-          <a:noFill/>
-          <a:ln/>
-        </p:spPr>
-        <p:txBody>
-          <a:bodyPr wrap="square" rtlCol="0" anchor="ctr"/>
-          <a:lstStyle/>
-          <a:p>
-            <a:pPr indent="0" marL="0">
-              <a:lnSpc>
-                <a:spcPts val="2400"/>
-              </a:lnSpc>
-              <a:buNone/>
-            </a:pPr>
-            <a:r>
-              <a:rPr lang="en-US" sz="1600" dirty="0">
+              <a:rPr lang="en-US" sz="1500" dirty="0">
                 <a:solidFill>
                   <a:srgbClr val="A0A0A0"/>
                 </a:solidFill>
               </a:rPr>
               <a:t>Top aggregators and DEX routers. BEQ prioritizes executability over the best-looking number.</a:t>
             </a:r>
-            <a:endParaRPr lang="en-US" sz="1600" dirty="0"/>
+            <a:endParaRPr lang="en-US" sz="1500" dirty="0"/>
           </a:p>
         </p:txBody>
       </p:sp>
@@ -9953,7 +9829,7 @@
         </p:nvSpPr>
         <p:spPr>
           <a:xfrm>
-            <a:off x="6400800" y="1188720"/>
+            <a:off x="6400800" y="1280160"/>
             <a:ext cx="2560320" cy="2286000"/>
           </a:xfrm>
           <a:prstGeom prst="roundRect">
@@ -9980,7 +9856,7 @@
         </p:nvSpPr>
         <p:spPr>
           <a:xfrm>
-            <a:off x="6583680" y="1325880"/>
+            <a:off x="6583680" y="1417320"/>
             <a:ext cx="2194560" cy="365760"/>
           </a:xfrm>
           <a:prstGeom prst="rect">
@@ -10018,7 +9894,7 @@
         </p:nvSpPr>
         <p:spPr>
           <a:xfrm>
-            <a:off x="6583680" y="1691640"/>
+            <a:off x="6583680" y="1783080"/>
             <a:ext cx="2194560" cy="1600200"/>
           </a:xfrm>
           <a:prstGeom prst="rect">
@@ -10057,7 +9933,7 @@
         </p:nvSpPr>
         <p:spPr>
           <a:xfrm>
-            <a:off x="9144000" y="1188720"/>
+            <a:off x="9144000" y="1280160"/>
             <a:ext cx="2560320" cy="2286000"/>
           </a:xfrm>
           <a:prstGeom prst="roundRect">
@@ -10084,7 +9960,7 @@
         </p:nvSpPr>
         <p:spPr>
           <a:xfrm>
-            <a:off x="9326880" y="1325880"/>
+            <a:off x="9326880" y="1417320"/>
             <a:ext cx="2194560" cy="365760"/>
           </a:xfrm>
           <a:prstGeom prst="rect">
@@ -10122,7 +9998,7 @@
         </p:nvSpPr>
         <p:spPr>
           <a:xfrm>
-            <a:off x="9326880" y="1691640"/>
+            <a:off x="9326880" y="1783080"/>
             <a:ext cx="2194560" cy="1600200"/>
           </a:xfrm>
           <a:prstGeom prst="rect">
@@ -12165,7 +12041,7 @@
         </p:nvSpPr>
         <p:spPr>
           <a:xfrm>
-            <a:off x="457200" y="1170432"/>
+            <a:off x="457200" y="987552"/>
             <a:ext cx="320040" cy="36576"/>
           </a:xfrm>
           <a:prstGeom prst="rect">
@@ -12185,7 +12061,7 @@
         </p:nvSpPr>
         <p:spPr>
           <a:xfrm>
-            <a:off x="868680" y="1097280"/>
+            <a:off x="868680" y="914400"/>
             <a:ext cx="2743200" cy="274320"/>
           </a:xfrm>
           <a:prstGeom prst="rect">
@@ -12221,34 +12097,31 @@
         </p:nvSpPr>
         <p:spPr>
           <a:xfrm>
-            <a:off x="457200" y="1645920"/>
-            <a:ext cx="5486400" cy="914400"/>
-          </a:xfrm>
-          <a:prstGeom prst="rect">
-            <a:avLst/>
-          </a:prstGeom>
-          <a:noFill/>
-          <a:ln/>
-        </p:spPr>
-        <p:txBody>
-          <a:bodyPr wrap="square" rtlCol="0" anchor="ctr"/>
-          <a:lstStyle/>
-          <a:p>
-            <a:pPr indent="0" marL="0">
-              <a:lnSpc>
-                <a:spcPts val="4200"/>
-              </a:lnSpc>
-              <a:buNone/>
-            </a:pPr>
-            <a:r>
-              <a:rPr lang="en-US" sz="3600" b="1" dirty="0">
+            <a:off x="457200" y="1188720"/>
+            <a:ext cx="3657600" cy="365760"/>
+          </a:xfrm>
+          <a:prstGeom prst="rect">
+            <a:avLst/>
+          </a:prstGeom>
+          <a:noFill/>
+          <a:ln/>
+        </p:spPr>
+        <p:txBody>
+          <a:bodyPr wrap="square" rtlCol="0" anchor="ctr"/>
+          <a:lstStyle/>
+          <a:p>
+            <a:pPr indent="0" marL="0">
+              <a:buNone/>
+            </a:pPr>
+            <a:r>
+              <a:rPr lang="en-US" sz="2800" b="1" dirty="0">
                 <a:solidFill>
                   <a:srgbClr val="FFFFFF"/>
                 </a:solidFill>
               </a:rPr>
-              <a:t>Token allocation</a:t>
-            </a:r>
-            <a:endParaRPr lang="en-US" sz="3600" dirty="0"/>
+              <a:t>Token Allocation</a:t>
+            </a:r>
+            <a:endParaRPr lang="en-US" sz="2800" dirty="0"/>
           </a:p>
         </p:txBody>
       </p:sp>
@@ -12259,8 +12132,8 @@
           <p:nvPr/>
         </p:nvGraphicFramePr>
         <p:xfrm>
-          <a:off x="457200" y="2194560"/>
-          <a:ext cx="3840480" cy="3840480"/>
+          <a:off x="457200" y="1691640"/>
+          <a:ext cx="3474720" cy="3474720"/>
         </p:xfrm>
         <a:graphic xmlns:a="http://schemas.openxmlformats.org/drawingml/2006/main">
           <a:graphicData uri="http://schemas.openxmlformats.org/drawingml/2006/chart">
@@ -12276,8 +12149,8 @@
         </p:nvSpPr>
         <p:spPr>
           <a:xfrm>
-            <a:off x="457200" y="3657600"/>
-            <a:ext cx="3840480" cy="548640"/>
+            <a:off x="457200" y="3017520"/>
+            <a:ext cx="3474720" cy="457200"/>
           </a:xfrm>
           <a:prstGeom prst="rect">
             <a:avLst/>
@@ -12293,14 +12166,14 @@
               <a:buNone/>
             </a:pPr>
             <a:r>
-              <a:rPr lang="en-US" sz="3600" b="1" dirty="0">
+              <a:rPr lang="en-US" sz="3200" b="1" dirty="0">
                 <a:solidFill>
                   <a:srgbClr val="FFFFFF"/>
                 </a:solidFill>
               </a:rPr>
               <a:t>1B</a:t>
             </a:r>
-            <a:endParaRPr lang="en-US" sz="3600" dirty="0"/>
+            <a:endParaRPr lang="en-US" sz="3200" dirty="0"/>
           </a:p>
         </p:txBody>
       </p:sp>
@@ -12312,8 +12185,8 @@
         </p:nvSpPr>
         <p:spPr>
           <a:xfrm>
-            <a:off x="457200" y="4160520"/>
-            <a:ext cx="3840480" cy="320040"/>
+            <a:off x="457200" y="3429000"/>
+            <a:ext cx="3474720" cy="274320"/>
           </a:xfrm>
           <a:prstGeom prst="rect">
             <a:avLst/>
@@ -12329,14 +12202,14 @@
               <a:buNone/>
             </a:pPr>
             <a:r>
-              <a:rPr lang="en-US" sz="1200" b="1" dirty="0">
+              <a:rPr lang="en-US" sz="1100" b="1" dirty="0">
                 <a:solidFill>
                   <a:srgbClr val="A0A0A0"/>
                 </a:solidFill>
               </a:rPr>
               <a:t>PILOT</a:t>
             </a:r>
-            <a:endParaRPr lang="en-US" sz="1200" dirty="0"/>
+            <a:endParaRPr lang="en-US" sz="1100" dirty="0"/>
           </a:p>
         </p:txBody>
       </p:sp>
@@ -12348,8 +12221,8 @@
         </p:nvSpPr>
         <p:spPr>
           <a:xfrm>
-            <a:off x="274320" y="6126480"/>
-            <a:ext cx="4206240" cy="274320"/>
+            <a:off x="274320" y="5486400"/>
+            <a:ext cx="3657600" cy="274320"/>
           </a:xfrm>
           <a:prstGeom prst="rect">
             <a:avLst/>
@@ -12365,14 +12238,14 @@
               <a:buNone/>
             </a:pPr>
             <a:r>
-              <a:rPr lang="en-US" sz="1100" dirty="0">
+              <a:rPr lang="en-US" sz="1000" dirty="0">
                 <a:solidFill>
                   <a:srgbClr val="A0A0A0"/>
                 </a:solidFill>
               </a:rPr>
               <a:t>Fixed supply · No inflation · No mint function</a:t>
             </a:r>
-            <a:endParaRPr lang="en-US" sz="1100" dirty="0"/>
+            <a:endParaRPr lang="en-US" sz="1000" dirty="0"/>
           </a:p>
         </p:txBody>
       </p:sp>

</xml_diff>